<commit_message>
update logistic regression slides
</commit_message>
<xml_diff>
--- a/slides/09_logistic_regression_classification.pptx
+++ b/slides/09_logistic_regression_classification.pptx
@@ -5,7 +5,7 @@
     <p:sldMasterId id="2147483648" r:id="rId1"/>
   </p:sldMasterIdLst>
   <p:notesMasterIdLst>
-    <p:notesMasterId r:id="rId40"/>
+    <p:notesMasterId r:id="rId39"/>
   </p:notesMasterIdLst>
   <p:sldIdLst>
     <p:sldId id="256" r:id="rId2"/>
@@ -20,32 +20,31 @@
     <p:sldId id="737" r:id="rId11"/>
     <p:sldId id="764" r:id="rId12"/>
     <p:sldId id="765" r:id="rId13"/>
-    <p:sldId id="742" r:id="rId14"/>
-    <p:sldId id="773" r:id="rId15"/>
-    <p:sldId id="770" r:id="rId16"/>
-    <p:sldId id="809" r:id="rId17"/>
-    <p:sldId id="810" r:id="rId18"/>
-    <p:sldId id="784" r:id="rId19"/>
-    <p:sldId id="777" r:id="rId20"/>
-    <p:sldId id="778" r:id="rId21"/>
-    <p:sldId id="779" r:id="rId22"/>
-    <p:sldId id="741" r:id="rId23"/>
-    <p:sldId id="793" r:id="rId24"/>
-    <p:sldId id="811" r:id="rId25"/>
-    <p:sldId id="796" r:id="rId26"/>
-    <p:sldId id="812" r:id="rId27"/>
-    <p:sldId id="813" r:id="rId28"/>
-    <p:sldId id="798" r:id="rId29"/>
-    <p:sldId id="799" r:id="rId30"/>
-    <p:sldId id="787" r:id="rId31"/>
-    <p:sldId id="803" r:id="rId32"/>
-    <p:sldId id="804" r:id="rId33"/>
-    <p:sldId id="752" r:id="rId34"/>
-    <p:sldId id="785" r:id="rId35"/>
-    <p:sldId id="786" r:id="rId36"/>
-    <p:sldId id="790" r:id="rId37"/>
-    <p:sldId id="753" r:id="rId38"/>
-    <p:sldId id="805" r:id="rId39"/>
+    <p:sldId id="773" r:id="rId14"/>
+    <p:sldId id="770" r:id="rId15"/>
+    <p:sldId id="809" r:id="rId16"/>
+    <p:sldId id="810" r:id="rId17"/>
+    <p:sldId id="784" r:id="rId18"/>
+    <p:sldId id="777" r:id="rId19"/>
+    <p:sldId id="778" r:id="rId20"/>
+    <p:sldId id="779" r:id="rId21"/>
+    <p:sldId id="741" r:id="rId22"/>
+    <p:sldId id="793" r:id="rId23"/>
+    <p:sldId id="811" r:id="rId24"/>
+    <p:sldId id="796" r:id="rId25"/>
+    <p:sldId id="812" r:id="rId26"/>
+    <p:sldId id="813" r:id="rId27"/>
+    <p:sldId id="798" r:id="rId28"/>
+    <p:sldId id="799" r:id="rId29"/>
+    <p:sldId id="787" r:id="rId30"/>
+    <p:sldId id="803" r:id="rId31"/>
+    <p:sldId id="804" r:id="rId32"/>
+    <p:sldId id="752" r:id="rId33"/>
+    <p:sldId id="785" r:id="rId34"/>
+    <p:sldId id="786" r:id="rId35"/>
+    <p:sldId id="790" r:id="rId36"/>
+    <p:sldId id="753" r:id="rId37"/>
+    <p:sldId id="805" r:id="rId38"/>
   </p:sldIdLst>
   <p:sldSz cx="12192000" cy="6858000"/>
   <p:notesSz cx="6858000" cy="9144000"/>
@@ -234,7 +233,7 @@
           <a:p>
             <a:fld id="{3DB912AD-EA73-9140-98FC-984EB544AB7A}" type="datetimeFigureOut">
               <a:rPr lang="en-US" smtClean="0"/>
-              <a:t>8/5/18</a:t>
+              <a:t>9/29/18</a:t>
             </a:fld>
             <a:endParaRPr lang="en-US"/>
           </a:p>
@@ -815,7 +814,7 @@
     </p:spTree>
     <p:extLst>
       <p:ext uri="{BB962C8B-B14F-4D97-AF65-F5344CB8AC3E}">
-        <p14:creationId xmlns:p14="http://schemas.microsoft.com/office/powerpoint/2010/main" val="3879379484"/>
+        <p14:creationId xmlns:p14="http://schemas.microsoft.com/office/powerpoint/2010/main" val="1558592018"/>
       </p:ext>
     </p:extLst>
   </p:cSld>
@@ -925,7 +924,7 @@
     </p:spTree>
     <p:extLst>
       <p:ext uri="{BB962C8B-B14F-4D97-AF65-F5344CB8AC3E}">
-        <p14:creationId xmlns:p14="http://schemas.microsoft.com/office/powerpoint/2010/main" val="1558592018"/>
+        <p14:creationId xmlns:p14="http://schemas.microsoft.com/office/powerpoint/2010/main" val="992095122"/>
       </p:ext>
     </p:extLst>
   </p:cSld>
@@ -1035,7 +1034,7 @@
     </p:spTree>
     <p:extLst>
       <p:ext uri="{BB962C8B-B14F-4D97-AF65-F5344CB8AC3E}">
-        <p14:creationId xmlns:p14="http://schemas.microsoft.com/office/powerpoint/2010/main" val="992095122"/>
+        <p14:creationId xmlns:p14="http://schemas.microsoft.com/office/powerpoint/2010/main" val="3800405556"/>
       </p:ext>
     </p:extLst>
   </p:cSld>
@@ -1145,7 +1144,7 @@
     </p:spTree>
     <p:extLst>
       <p:ext uri="{BB962C8B-B14F-4D97-AF65-F5344CB8AC3E}">
-        <p14:creationId xmlns:p14="http://schemas.microsoft.com/office/powerpoint/2010/main" val="3800405556"/>
+        <p14:creationId xmlns:p14="http://schemas.microsoft.com/office/powerpoint/2010/main" val="3195290505"/>
       </p:ext>
     </p:extLst>
   </p:cSld>
@@ -1217,15 +1216,22 @@
               <a:defRPr/>
             </a:pPr>
             <a:r>
-              <a:rPr lang="en-US" sz="1200" baseline="0" dirty="0">
+              <a:rPr lang="en-US" sz="1200" baseline="0">
                 <a:solidFill>
                   <a:prstClr val="black"/>
                 </a:solidFill>
                 <a:latin typeface="ArialMT"/>
                 <a:sym typeface="Wingdings"/>
               </a:rPr>
-              <a:t>Complement: 1 – p</a:t>
-            </a:r>
+              <a:t> </a:t>
+            </a:r>
+            <a:endParaRPr lang="en-US" sz="1200" baseline="0" dirty="0">
+              <a:solidFill>
+                <a:prstClr val="black"/>
+              </a:solidFill>
+              <a:latin typeface="ArialMT"/>
+              <a:sym typeface="Wingdings"/>
+            </a:endParaRPr>
           </a:p>
         </p:txBody>
       </p:sp>
@@ -1246,6 +1252,7 @@
           <a:p>
             <a:fld id="{ADD4B5B7-85EF-4E48-AC80-2380FACD9C23}" type="slidenum">
               <a:rPr lang="en-US" smtClean="0"/>
+              <a:pPr/>
               <a:t>17</a:t>
             </a:fld>
             <a:endParaRPr lang="en-US"/>
@@ -1255,7 +1262,7 @@
     </p:spTree>
     <p:extLst>
       <p:ext uri="{BB962C8B-B14F-4D97-AF65-F5344CB8AC3E}">
-        <p14:creationId xmlns:p14="http://schemas.microsoft.com/office/powerpoint/2010/main" val="3195290505"/>
+        <p14:creationId xmlns:p14="http://schemas.microsoft.com/office/powerpoint/2010/main" val="2443620755"/>
       </p:ext>
     </p:extLst>
   </p:cSld>
@@ -1373,7 +1380,7 @@
     </p:spTree>
     <p:extLst>
       <p:ext uri="{BB962C8B-B14F-4D97-AF65-F5344CB8AC3E}">
-        <p14:creationId xmlns:p14="http://schemas.microsoft.com/office/powerpoint/2010/main" val="2443620755"/>
+        <p14:creationId xmlns:p14="http://schemas.microsoft.com/office/powerpoint/2010/main" val="2859817413"/>
       </p:ext>
     </p:extLst>
   </p:cSld>
@@ -1445,21 +1452,83 @@
               <a:defRPr/>
             </a:pPr>
             <a:r>
-              <a:rPr lang="en-US" sz="1200" baseline="0">
+              <a:rPr lang="en-US" sz="1200" baseline="0" dirty="0">
                 <a:solidFill>
                   <a:prstClr val="black"/>
                 </a:solidFill>
                 <a:latin typeface="ArialMT"/>
+                <a:cs typeface="+mn-cs"/>
                 <a:sym typeface="Wingdings"/>
               </a:rPr>
-              <a:t> </a:t>
-            </a:r>
-            <a:endParaRPr lang="en-US" sz="1200" baseline="0" dirty="0">
-              <a:solidFill>
-                <a:prstClr val="black"/>
-              </a:solidFill>
-              <a:latin typeface="ArialMT"/>
-              <a:sym typeface="Wingdings"/>
+              <a:t>The process we just went through is known as the </a:t>
+            </a:r>
+            <a:r>
+              <a:rPr lang="en-US" sz="1200" baseline="0" dirty="0" err="1">
+                <a:solidFill>
+                  <a:prstClr val="black"/>
+                </a:solidFill>
+                <a:latin typeface="ArialMT"/>
+                <a:cs typeface="+mn-cs"/>
+                <a:sym typeface="Wingdings"/>
+              </a:rPr>
+              <a:t>logit</a:t>
+            </a:r>
+            <a:r>
+              <a:rPr lang="en-US" sz="1200" baseline="0" dirty="0">
+                <a:solidFill>
+                  <a:prstClr val="black"/>
+                </a:solidFill>
+                <a:latin typeface="ArialMT"/>
+                <a:cs typeface="+mn-cs"/>
+                <a:sym typeface="Wingdings"/>
+              </a:rPr>
+              <a:t> transformation. The output form is </a:t>
+            </a:r>
+            <a:r>
+              <a:rPr lang="en-US" sz="1200" dirty="0">
+                <a:latin typeface="PFDinTextCompPro-Italic"/>
+                <a:cs typeface="PFDinTextCompPro-Italic"/>
+              </a:rPr>
+              <a:t>referred to as the </a:t>
+            </a:r>
+            <a:r>
+              <a:rPr lang="en-US" sz="1200" dirty="0" err="1">
+                <a:latin typeface="PFDinTextCompPro-Italic"/>
+                <a:cs typeface="PFDinTextCompPro-Italic"/>
+              </a:rPr>
+              <a:t>logit</a:t>
+            </a:r>
+            <a:r>
+              <a:rPr lang="en-US" sz="1200" dirty="0">
+                <a:latin typeface="PFDinTextCompPro-Italic"/>
+                <a:cs typeface="PFDinTextCompPro-Italic"/>
+              </a:rPr>
+              <a:t> function and also the log-odds</a:t>
+            </a:r>
+            <a:r>
+              <a:rPr lang="en-US" sz="1200" baseline="0" dirty="0">
+                <a:latin typeface="PFDinTextCompPro-Italic"/>
+                <a:cs typeface="PFDinTextCompPro-Italic"/>
+              </a:rPr>
+              <a:t> function. Note that the base used here is </a:t>
+            </a:r>
+            <a:r>
+              <a:rPr lang="en-US" sz="1200" baseline="0" dirty="0" err="1">
+                <a:latin typeface="PFDinTextCompPro-Italic"/>
+                <a:cs typeface="PFDinTextCompPro-Italic"/>
+              </a:rPr>
+              <a:t>Eulers</a:t>
+            </a:r>
+            <a:r>
+              <a:rPr lang="en-US" sz="1200" baseline="0" dirty="0">
+                <a:latin typeface="PFDinTextCompPro-Italic"/>
+                <a:cs typeface="PFDinTextCompPro-Italic"/>
+              </a:rPr>
+              <a:t> number (e). </a:t>
+            </a:r>
+            <a:endParaRPr lang="en-US" sz="1200" dirty="0">
+              <a:latin typeface="PFDinTextCompPro-Italic"/>
+              <a:cs typeface="PFDinTextCompPro-Italic"/>
             </a:endParaRPr>
           </a:p>
         </p:txBody>
@@ -1491,7 +1560,7 @@
     </p:spTree>
     <p:extLst>
       <p:ext uri="{BB962C8B-B14F-4D97-AF65-F5344CB8AC3E}">
-        <p14:creationId xmlns:p14="http://schemas.microsoft.com/office/powerpoint/2010/main" val="2859817413"/>
+        <p14:creationId xmlns:p14="http://schemas.microsoft.com/office/powerpoint/2010/main" val="941630148"/>
       </p:ext>
     </p:extLst>
   </p:cSld>
@@ -1621,21 +1690,7 @@
                 <a:latin typeface="PFDinTextCompPro-Italic"/>
                 <a:cs typeface="PFDinTextCompPro-Italic"/>
               </a:rPr>
-              <a:t> function. Note that the base used here is </a:t>
-            </a:r>
-            <a:r>
-              <a:rPr lang="en-US" sz="1200" baseline="0" dirty="0" err="1">
-                <a:latin typeface="PFDinTextCompPro-Italic"/>
-                <a:cs typeface="PFDinTextCompPro-Italic"/>
-              </a:rPr>
-              <a:t>Eulers</a:t>
-            </a:r>
-            <a:r>
-              <a:rPr lang="en-US" sz="1200" baseline="0" dirty="0">
-                <a:latin typeface="PFDinTextCompPro-Italic"/>
-                <a:cs typeface="PFDinTextCompPro-Italic"/>
-              </a:rPr>
-              <a:t> number (e). </a:t>
+              <a:t> function.</a:t>
             </a:r>
             <a:endParaRPr lang="en-US" sz="1200" dirty="0">
               <a:latin typeface="PFDinTextCompPro-Italic"/>
@@ -1671,7 +1726,7 @@
     </p:spTree>
     <p:extLst>
       <p:ext uri="{BB962C8B-B14F-4D97-AF65-F5344CB8AC3E}">
-        <p14:creationId xmlns:p14="http://schemas.microsoft.com/office/powerpoint/2010/main" val="941630148"/>
+        <p14:creationId xmlns:p14="http://schemas.microsoft.com/office/powerpoint/2010/main" val="2381427775"/>
       </p:ext>
     </p:extLst>
   </p:cSld>
@@ -1748,65 +1803,10 @@
                   <a:prstClr val="black"/>
                 </a:solidFill>
                 <a:latin typeface="ArialMT"/>
-                <a:cs typeface="+mn-cs"/>
                 <a:sym typeface="Wingdings"/>
               </a:rPr>
-              <a:t>The process we just went through is known as the </a:t>
-            </a:r>
-            <a:r>
-              <a:rPr lang="en-US" sz="1200" baseline="0" dirty="0" err="1">
-                <a:solidFill>
-                  <a:prstClr val="black"/>
-                </a:solidFill>
-                <a:latin typeface="ArialMT"/>
-                <a:cs typeface="+mn-cs"/>
-                <a:sym typeface="Wingdings"/>
-              </a:rPr>
-              <a:t>logit</a:t>
-            </a:r>
-            <a:r>
-              <a:rPr lang="en-US" sz="1200" baseline="0" dirty="0">
-                <a:solidFill>
-                  <a:prstClr val="black"/>
-                </a:solidFill>
-                <a:latin typeface="ArialMT"/>
-                <a:cs typeface="+mn-cs"/>
-                <a:sym typeface="Wingdings"/>
-              </a:rPr>
-              <a:t> transformation. The output form is </a:t>
-            </a:r>
-            <a:r>
-              <a:rPr lang="en-US" sz="1200" dirty="0">
-                <a:latin typeface="PFDinTextCompPro-Italic"/>
-                <a:cs typeface="PFDinTextCompPro-Italic"/>
-              </a:rPr>
-              <a:t>referred to as the </a:t>
-            </a:r>
-            <a:r>
-              <a:rPr lang="en-US" sz="1200" dirty="0" err="1">
-                <a:latin typeface="PFDinTextCompPro-Italic"/>
-                <a:cs typeface="PFDinTextCompPro-Italic"/>
-              </a:rPr>
-              <a:t>logit</a:t>
-            </a:r>
-            <a:r>
-              <a:rPr lang="en-US" sz="1200" dirty="0">
-                <a:latin typeface="PFDinTextCompPro-Italic"/>
-                <a:cs typeface="PFDinTextCompPro-Italic"/>
-              </a:rPr>
-              <a:t> function and also the log-odds</a:t>
-            </a:r>
-            <a:r>
-              <a:rPr lang="en-US" sz="1200" baseline="0" dirty="0">
-                <a:latin typeface="PFDinTextCompPro-Italic"/>
-                <a:cs typeface="PFDinTextCompPro-Italic"/>
-              </a:rPr>
-              <a:t> function.</a:t>
-            </a:r>
-            <a:endParaRPr lang="en-US" sz="1200" dirty="0">
-              <a:latin typeface="PFDinTextCompPro-Italic"/>
-              <a:cs typeface="PFDinTextCompPro-Italic"/>
-            </a:endParaRPr>
+              <a:t>Q: What do you think that the b1 represents in the case of the logistic function?</a:t>
+            </a:r>
           </a:p>
         </p:txBody>
       </p:sp>
@@ -1827,7 +1827,6 @@
           <a:p>
             <a:fld id="{ADD4B5B7-85EF-4E48-AC80-2380FACD9C23}" type="slidenum">
               <a:rPr lang="en-US" smtClean="0"/>
-              <a:pPr/>
               <a:t>21</a:t>
             </a:fld>
             <a:endParaRPr lang="en-US"/>
@@ -1837,7 +1836,7 @@
     </p:spTree>
     <p:extLst>
       <p:ext uri="{BB962C8B-B14F-4D97-AF65-F5344CB8AC3E}">
-        <p14:creationId xmlns:p14="http://schemas.microsoft.com/office/powerpoint/2010/main" val="2381427775"/>
+        <p14:creationId xmlns:p14="http://schemas.microsoft.com/office/powerpoint/2010/main" val="2444086150"/>
       </p:ext>
     </p:extLst>
   </p:cSld>
@@ -2026,7 +2025,7 @@
                 <a:latin typeface="ArialMT"/>
                 <a:sym typeface="Wingdings"/>
               </a:rPr>
-              <a:t>Q: What do you think that the b1 represents in the case of the logistic function?</a:t>
+              <a:t>Q: How to we change the b1 value from log-odds, to the odds?</a:t>
             </a:r>
           </a:p>
         </p:txBody>
@@ -2057,7 +2056,7 @@
     </p:spTree>
     <p:extLst>
       <p:ext uri="{BB962C8B-B14F-4D97-AF65-F5344CB8AC3E}">
-        <p14:creationId xmlns:p14="http://schemas.microsoft.com/office/powerpoint/2010/main" val="2444086150"/>
+        <p14:creationId xmlns:p14="http://schemas.microsoft.com/office/powerpoint/2010/main" val="119051304"/>
       </p:ext>
     </p:extLst>
   </p:cSld>
@@ -2167,7 +2166,7 @@
     </p:spTree>
     <p:extLst>
       <p:ext uri="{BB962C8B-B14F-4D97-AF65-F5344CB8AC3E}">
-        <p14:creationId xmlns:p14="http://schemas.microsoft.com/office/powerpoint/2010/main" val="119051304"/>
+        <p14:creationId xmlns:p14="http://schemas.microsoft.com/office/powerpoint/2010/main" val="1559782619"/>
       </p:ext>
     </p:extLst>
   </p:cSld>
@@ -2238,16 +2237,13 @@
               <a:tabLst/>
               <a:defRPr/>
             </a:pPr>
-            <a:r>
-              <a:rPr lang="en-US" sz="1200" baseline="0" dirty="0">
-                <a:solidFill>
-                  <a:prstClr val="black"/>
-                </a:solidFill>
-                <a:latin typeface="ArialMT"/>
-                <a:sym typeface="Wingdings"/>
-              </a:rPr>
-              <a:t>Q: How to we change the b1 value from log-odds, to the odds?</a:t>
-            </a:r>
+            <a:endParaRPr lang="en-US" sz="1200" baseline="0" dirty="0">
+              <a:solidFill>
+                <a:prstClr val="black"/>
+              </a:solidFill>
+              <a:latin typeface="ArialMT"/>
+              <a:sym typeface="Wingdings"/>
+            </a:endParaRPr>
           </a:p>
         </p:txBody>
       </p:sp>
@@ -2277,7 +2273,7 @@
     </p:spTree>
     <p:extLst>
       <p:ext uri="{BB962C8B-B14F-4D97-AF65-F5344CB8AC3E}">
-        <p14:creationId xmlns:p14="http://schemas.microsoft.com/office/powerpoint/2010/main" val="1559782619"/>
+        <p14:creationId xmlns:p14="http://schemas.microsoft.com/office/powerpoint/2010/main" val="3089560145"/>
       </p:ext>
     </p:extLst>
   </p:cSld>
@@ -2384,7 +2380,7 @@
     </p:spTree>
     <p:extLst>
       <p:ext uri="{BB962C8B-B14F-4D97-AF65-F5344CB8AC3E}">
-        <p14:creationId xmlns:p14="http://schemas.microsoft.com/office/powerpoint/2010/main" val="3089560145"/>
+        <p14:creationId xmlns:p14="http://schemas.microsoft.com/office/powerpoint/2010/main" val="1665649107"/>
       </p:ext>
     </p:extLst>
   </p:cSld>
@@ -2491,7 +2487,7 @@
     </p:spTree>
     <p:extLst>
       <p:ext uri="{BB962C8B-B14F-4D97-AF65-F5344CB8AC3E}">
-        <p14:creationId xmlns:p14="http://schemas.microsoft.com/office/powerpoint/2010/main" val="1665649107"/>
+        <p14:creationId xmlns:p14="http://schemas.microsoft.com/office/powerpoint/2010/main" val="1196228058"/>
       </p:ext>
     </p:extLst>
   </p:cSld>
@@ -2562,13 +2558,36 @@
               <a:tabLst/>
               <a:defRPr/>
             </a:pPr>
-            <a:endParaRPr lang="en-US" sz="1200" baseline="0" dirty="0">
-              <a:solidFill>
-                <a:prstClr val="black"/>
-              </a:solidFill>
-              <a:latin typeface="ArialMT"/>
-              <a:sym typeface="Wingdings"/>
-            </a:endParaRPr>
+            <a:r>
+              <a:rPr lang="en-US" sz="1200" baseline="0" dirty="0">
+                <a:solidFill>
+                  <a:prstClr val="black"/>
+                </a:solidFill>
+                <a:latin typeface="ArialMT"/>
+                <a:sym typeface="Wingdings"/>
+              </a:rPr>
+              <a:t>The </a:t>
+            </a:r>
+            <a:r>
+              <a:rPr lang="en-US" sz="1200" baseline="0" dirty="0" err="1">
+                <a:solidFill>
+                  <a:prstClr val="black"/>
+                </a:solidFill>
+                <a:latin typeface="ArialMT"/>
+                <a:sym typeface="Wingdings"/>
+              </a:rPr>
+              <a:t>logit</a:t>
+            </a:r>
+            <a:r>
+              <a:rPr lang="en-US" sz="1200" baseline="0" dirty="0">
+                <a:solidFill>
+                  <a:prstClr val="black"/>
+                </a:solidFill>
+                <a:latin typeface="ArialMT"/>
+                <a:sym typeface="Wingdings"/>
+              </a:rPr>
+              <a:t> function</a:t>
+            </a:r>
           </a:p>
         </p:txBody>
       </p:sp>
@@ -2598,7 +2617,7 @@
     </p:spTree>
     <p:extLst>
       <p:ext uri="{BB962C8B-B14F-4D97-AF65-F5344CB8AC3E}">
-        <p14:creationId xmlns:p14="http://schemas.microsoft.com/office/powerpoint/2010/main" val="1196228058"/>
+        <p14:creationId xmlns:p14="http://schemas.microsoft.com/office/powerpoint/2010/main" val="3646982675"/>
       </p:ext>
     </p:extLst>
   </p:cSld>
@@ -2677,27 +2696,7 @@
                 <a:latin typeface="ArialMT"/>
                 <a:sym typeface="Wingdings"/>
               </a:rPr>
-              <a:t>The </a:t>
-            </a:r>
-            <a:r>
-              <a:rPr lang="en-US" sz="1200" baseline="0" dirty="0" err="1">
-                <a:solidFill>
-                  <a:prstClr val="black"/>
-                </a:solidFill>
-                <a:latin typeface="ArialMT"/>
-                <a:sym typeface="Wingdings"/>
-              </a:rPr>
-              <a:t>logit</a:t>
-            </a:r>
-            <a:r>
-              <a:rPr lang="en-US" sz="1200" baseline="0" dirty="0">
-                <a:solidFill>
-                  <a:prstClr val="black"/>
-                </a:solidFill>
-                <a:latin typeface="ArialMT"/>
-                <a:sym typeface="Wingdings"/>
-              </a:rPr>
-              <a:t> function</a:t>
+              <a:t>The logistic regression equation</a:t>
             </a:r>
           </a:p>
         </p:txBody>
@@ -2728,7 +2727,7 @@
     </p:spTree>
     <p:extLst>
       <p:ext uri="{BB962C8B-B14F-4D97-AF65-F5344CB8AC3E}">
-        <p14:creationId xmlns:p14="http://schemas.microsoft.com/office/powerpoint/2010/main" val="3646982675"/>
+        <p14:creationId xmlns:p14="http://schemas.microsoft.com/office/powerpoint/2010/main" val="2604316012"/>
       </p:ext>
     </p:extLst>
   </p:cSld>
@@ -2799,16 +2798,13 @@
               <a:tabLst/>
               <a:defRPr/>
             </a:pPr>
-            <a:r>
-              <a:rPr lang="en-US" sz="1200" baseline="0" dirty="0">
-                <a:solidFill>
-                  <a:prstClr val="black"/>
-                </a:solidFill>
-                <a:latin typeface="ArialMT"/>
-                <a:sym typeface="Wingdings"/>
-              </a:rPr>
-              <a:t>The logistic regression equation</a:t>
-            </a:r>
+            <a:endParaRPr lang="en-US" sz="1200" baseline="0" dirty="0">
+              <a:solidFill>
+                <a:prstClr val="black"/>
+              </a:solidFill>
+              <a:latin typeface="ArialMT"/>
+              <a:sym typeface="Wingdings"/>
+            </a:endParaRPr>
           </a:p>
         </p:txBody>
       </p:sp>
@@ -2838,7 +2834,7 @@
     </p:spTree>
     <p:extLst>
       <p:ext uri="{BB962C8B-B14F-4D97-AF65-F5344CB8AC3E}">
-        <p14:creationId xmlns:p14="http://schemas.microsoft.com/office/powerpoint/2010/main" val="2604316012"/>
+        <p14:creationId xmlns:p14="http://schemas.microsoft.com/office/powerpoint/2010/main" val="1348396115"/>
       </p:ext>
     </p:extLst>
   </p:cSld>
@@ -2945,7 +2941,7 @@
     </p:spTree>
     <p:extLst>
       <p:ext uri="{BB962C8B-B14F-4D97-AF65-F5344CB8AC3E}">
-        <p14:creationId xmlns:p14="http://schemas.microsoft.com/office/powerpoint/2010/main" val="1348396115"/>
+        <p14:creationId xmlns:p14="http://schemas.microsoft.com/office/powerpoint/2010/main" val="2517309657"/>
       </p:ext>
     </p:extLst>
   </p:cSld>
@@ -3052,7 +3048,7 @@
     </p:spTree>
     <p:extLst>
       <p:ext uri="{BB962C8B-B14F-4D97-AF65-F5344CB8AC3E}">
-        <p14:creationId xmlns:p14="http://schemas.microsoft.com/office/powerpoint/2010/main" val="2517309657"/>
+        <p14:creationId xmlns:p14="http://schemas.microsoft.com/office/powerpoint/2010/main" val="1089851199"/>
       </p:ext>
     </p:extLst>
   </p:cSld>
@@ -3233,13 +3229,16 @@
               <a:tabLst/>
               <a:defRPr/>
             </a:pPr>
-            <a:endParaRPr lang="en-US" sz="1200" baseline="0" dirty="0">
-              <a:solidFill>
-                <a:prstClr val="black"/>
-              </a:solidFill>
-              <a:latin typeface="ArialMT"/>
-              <a:sym typeface="Wingdings"/>
-            </a:endParaRPr>
+            <a:r>
+              <a:rPr lang="en-US" sz="1200" baseline="0" dirty="0">
+                <a:solidFill>
+                  <a:prstClr val="black"/>
+                </a:solidFill>
+                <a:latin typeface="ArialMT"/>
+                <a:sym typeface="Wingdings"/>
+              </a:rPr>
+              <a:t> </a:t>
+            </a:r>
           </a:p>
         </p:txBody>
       </p:sp>
@@ -3269,7 +3268,7 @@
     </p:spTree>
     <p:extLst>
       <p:ext uri="{BB962C8B-B14F-4D97-AF65-F5344CB8AC3E}">
-        <p14:creationId xmlns:p14="http://schemas.microsoft.com/office/powerpoint/2010/main" val="1089851199"/>
+        <p14:creationId xmlns:p14="http://schemas.microsoft.com/office/powerpoint/2010/main" val="1875264665"/>
       </p:ext>
     </p:extLst>
   </p:cSld>
@@ -3340,16 +3339,13 @@
               <a:tabLst/>
               <a:defRPr/>
             </a:pPr>
-            <a:r>
-              <a:rPr lang="en-US" sz="1200" baseline="0" dirty="0">
-                <a:solidFill>
-                  <a:prstClr val="black"/>
-                </a:solidFill>
-                <a:latin typeface="ArialMT"/>
-                <a:sym typeface="Wingdings"/>
-              </a:rPr>
-              <a:t> </a:t>
-            </a:r>
+            <a:endParaRPr lang="en-US" sz="1200" baseline="0" dirty="0">
+              <a:solidFill>
+                <a:prstClr val="black"/>
+              </a:solidFill>
+              <a:latin typeface="ArialMT"/>
+              <a:sym typeface="Wingdings"/>
+            </a:endParaRPr>
           </a:p>
         </p:txBody>
       </p:sp>
@@ -3379,7 +3375,7 @@
     </p:spTree>
     <p:extLst>
       <p:ext uri="{BB962C8B-B14F-4D97-AF65-F5344CB8AC3E}">
-        <p14:creationId xmlns:p14="http://schemas.microsoft.com/office/powerpoint/2010/main" val="1875264665"/>
+        <p14:creationId xmlns:p14="http://schemas.microsoft.com/office/powerpoint/2010/main" val="143471683"/>
       </p:ext>
     </p:extLst>
   </p:cSld>
@@ -3450,13 +3446,16 @@
               <a:tabLst/>
               <a:defRPr/>
             </a:pPr>
-            <a:endParaRPr lang="en-US" sz="1200" baseline="0" dirty="0">
-              <a:solidFill>
-                <a:prstClr val="black"/>
-              </a:solidFill>
-              <a:latin typeface="ArialMT"/>
-              <a:sym typeface="Wingdings"/>
-            </a:endParaRPr>
+            <a:r>
+              <a:rPr lang="en-US" sz="1200" baseline="0" dirty="0">
+                <a:solidFill>
+                  <a:prstClr val="black"/>
+                </a:solidFill>
+                <a:latin typeface="ArialMT"/>
+                <a:sym typeface="Wingdings"/>
+              </a:rPr>
+              <a:t> </a:t>
+            </a:r>
           </a:p>
         </p:txBody>
       </p:sp>
@@ -3486,7 +3485,7 @@
     </p:spTree>
     <p:extLst>
       <p:ext uri="{BB962C8B-B14F-4D97-AF65-F5344CB8AC3E}">
-        <p14:creationId xmlns:p14="http://schemas.microsoft.com/office/powerpoint/2010/main" val="143471683"/>
+        <p14:creationId xmlns:p14="http://schemas.microsoft.com/office/powerpoint/2010/main" val="2039942227"/>
       </p:ext>
     </p:extLst>
   </p:cSld>
@@ -3596,7 +3595,7 @@
     </p:spTree>
     <p:extLst>
       <p:ext uri="{BB962C8B-B14F-4D97-AF65-F5344CB8AC3E}">
-        <p14:creationId xmlns:p14="http://schemas.microsoft.com/office/powerpoint/2010/main" val="2039942227"/>
+        <p14:creationId xmlns:p14="http://schemas.microsoft.com/office/powerpoint/2010/main" val="475404432"/>
       </p:ext>
     </p:extLst>
   </p:cSld>
@@ -3706,7 +3705,7 @@
     </p:spTree>
     <p:extLst>
       <p:ext uri="{BB962C8B-B14F-4D97-AF65-F5344CB8AC3E}">
-        <p14:creationId xmlns:p14="http://schemas.microsoft.com/office/powerpoint/2010/main" val="475404432"/>
+        <p14:creationId xmlns:p14="http://schemas.microsoft.com/office/powerpoint/2010/main" val="3865113638"/>
       </p:ext>
     </p:extLst>
   </p:cSld>
@@ -3808,116 +3807,6 @@
             <a:fld id="{ADD4B5B7-85EF-4E48-AC80-2380FACD9C23}" type="slidenum">
               <a:rPr lang="en-US" smtClean="0"/>
               <a:t>37</a:t>
-            </a:fld>
-            <a:endParaRPr lang="en-US"/>
-          </a:p>
-        </p:txBody>
-      </p:sp>
-    </p:spTree>
-    <p:extLst>
-      <p:ext uri="{BB962C8B-B14F-4D97-AF65-F5344CB8AC3E}">
-        <p14:creationId xmlns:p14="http://schemas.microsoft.com/office/powerpoint/2010/main" val="3865113638"/>
-      </p:ext>
-    </p:extLst>
-  </p:cSld>
-  <p:clrMapOvr>
-    <a:masterClrMapping/>
-  </p:clrMapOvr>
-</p:notes>
-</file>
-
-<file path=ppt/notesSlides/notesSlide36.xml><?xml version="1.0" encoding="utf-8"?>
-<p:notes xmlns:a="http://schemas.openxmlformats.org/drawingml/2006/main" xmlns:r="http://schemas.openxmlformats.org/officeDocument/2006/relationships" xmlns:p="http://schemas.openxmlformats.org/presentationml/2006/main">
-  <p:cSld>
-    <p:spTree>
-      <p:nvGrpSpPr>
-        <p:cNvPr id="1" name=""/>
-        <p:cNvGrpSpPr/>
-        <p:nvPr/>
-      </p:nvGrpSpPr>
-      <p:grpSpPr>
-        <a:xfrm>
-          <a:off x="0" y="0"/>
-          <a:ext cx="0" cy="0"/>
-          <a:chOff x="0" y="0"/>
-          <a:chExt cx="0" cy="0"/>
-        </a:xfrm>
-      </p:grpSpPr>
-      <p:sp>
-        <p:nvSpPr>
-          <p:cNvPr id="2" name="Slide Image Placeholder 1"/>
-          <p:cNvSpPr>
-            <a:spLocks noGrp="1" noRot="1" noChangeAspect="1"/>
-          </p:cNvSpPr>
-          <p:nvPr>
-            <p:ph type="sldImg"/>
-          </p:nvPr>
-        </p:nvSpPr>
-        <p:spPr/>
-      </p:sp>
-      <p:sp>
-        <p:nvSpPr>
-          <p:cNvPr id="3" name="Notes Placeholder 2"/>
-          <p:cNvSpPr>
-            <a:spLocks noGrp="1"/>
-          </p:cNvSpPr>
-          <p:nvPr>
-            <p:ph type="body" idx="1"/>
-          </p:nvPr>
-        </p:nvSpPr>
-        <p:spPr/>
-        <p:txBody>
-          <a:bodyPr/>
-          <a:lstStyle/>
-          <a:p>
-            <a:pPr marL="0" marR="0" indent="0" algn="l" defTabSz="457200" rtl="0" eaLnBrk="1" fontAlgn="auto" latinLnBrk="0" hangingPunct="1">
-              <a:lnSpc>
-                <a:spcPct val="100000"/>
-              </a:lnSpc>
-              <a:spcBef>
-                <a:spcPts val="0"/>
-              </a:spcBef>
-              <a:spcAft>
-                <a:spcPts val="0"/>
-              </a:spcAft>
-              <a:buClrTx/>
-              <a:buSzTx/>
-              <a:buFontTx/>
-              <a:buNone/>
-              <a:tabLst/>
-              <a:defRPr/>
-            </a:pPr>
-            <a:r>
-              <a:rPr lang="en-US" sz="1200" baseline="0" dirty="0">
-                <a:solidFill>
-                  <a:prstClr val="black"/>
-                </a:solidFill>
-                <a:latin typeface="ArialMT"/>
-                <a:sym typeface="Wingdings"/>
-              </a:rPr>
-              <a:t> </a:t>
-            </a:r>
-          </a:p>
-        </p:txBody>
-      </p:sp>
-      <p:sp>
-        <p:nvSpPr>
-          <p:cNvPr id="4" name="Slide Number Placeholder 3"/>
-          <p:cNvSpPr>
-            <a:spLocks noGrp="1"/>
-          </p:cNvSpPr>
-          <p:nvPr>
-            <p:ph type="sldNum" sz="quarter" idx="10"/>
-          </p:nvPr>
-        </p:nvSpPr>
-        <p:spPr/>
-        <p:txBody>
-          <a:bodyPr/>
-          <a:lstStyle/>
-          <a:p>
-            <a:fld id="{ADD4B5B7-85EF-4E48-AC80-2380FACD9C23}" type="slidenum">
-              <a:rPr lang="en-US" smtClean="0"/>
-              <a:t>38</a:t>
             </a:fld>
             <a:endParaRPr lang="en-US"/>
           </a:p>
@@ -4758,7 +4647,7 @@
           <a:p>
             <a:fld id="{02CE11C6-247B-0242-8651-D958C13D6FF0}" type="datetimeFigureOut">
               <a:rPr lang="en-US" smtClean="0"/>
-              <a:t>8/5/18</a:t>
+              <a:t>9/29/18</a:t>
             </a:fld>
             <a:endParaRPr lang="en-US"/>
           </a:p>
@@ -4986,7 +4875,7 @@
           <a:p>
             <a:fld id="{02CE11C6-247B-0242-8651-D958C13D6FF0}" type="datetimeFigureOut">
               <a:rPr lang="en-US" smtClean="0"/>
-              <a:t>8/5/18</a:t>
+              <a:t>9/29/18</a:t>
             </a:fld>
             <a:endParaRPr lang="en-US"/>
           </a:p>
@@ -5194,7 +5083,7 @@
           <a:p>
             <a:fld id="{02CE11C6-247B-0242-8651-D958C13D6FF0}" type="datetimeFigureOut">
               <a:rPr lang="en-US" smtClean="0"/>
-              <a:t>8/5/18</a:t>
+              <a:t>9/29/18</a:t>
             </a:fld>
             <a:endParaRPr lang="en-US"/>
           </a:p>
@@ -5659,7 +5548,7 @@
           <a:p>
             <a:fld id="{02CE11C6-247B-0242-8651-D958C13D6FF0}" type="datetimeFigureOut">
               <a:rPr lang="en-US" smtClean="0"/>
-              <a:t>8/5/18</a:t>
+              <a:t>9/29/18</a:t>
             </a:fld>
             <a:endParaRPr lang="en-US"/>
           </a:p>
@@ -5934,7 +5823,7 @@
           <a:p>
             <a:fld id="{02CE11C6-247B-0242-8651-D958C13D6FF0}" type="datetimeFigureOut">
               <a:rPr lang="en-US" smtClean="0"/>
-              <a:t>8/5/18</a:t>
+              <a:t>9/29/18</a:t>
             </a:fld>
             <a:endParaRPr lang="en-US"/>
           </a:p>
@@ -6199,7 +6088,7 @@
           <a:p>
             <a:fld id="{02CE11C6-247B-0242-8651-D958C13D6FF0}" type="datetimeFigureOut">
               <a:rPr lang="en-US" smtClean="0"/>
-              <a:t>8/5/18</a:t>
+              <a:t>9/29/18</a:t>
             </a:fld>
             <a:endParaRPr lang="en-US"/>
           </a:p>
@@ -6611,7 +6500,7 @@
           <a:p>
             <a:fld id="{02CE11C6-247B-0242-8651-D958C13D6FF0}" type="datetimeFigureOut">
               <a:rPr lang="en-US" smtClean="0"/>
-              <a:t>8/5/18</a:t>
+              <a:t>9/29/18</a:t>
             </a:fld>
             <a:endParaRPr lang="en-US"/>
           </a:p>
@@ -6752,7 +6641,7 @@
           <a:p>
             <a:fld id="{02CE11C6-247B-0242-8651-D958C13D6FF0}" type="datetimeFigureOut">
               <a:rPr lang="en-US" smtClean="0"/>
-              <a:t>8/5/18</a:t>
+              <a:t>9/29/18</a:t>
             </a:fld>
             <a:endParaRPr lang="en-US"/>
           </a:p>
@@ -6865,7 +6754,7 @@
           <a:p>
             <a:fld id="{02CE11C6-247B-0242-8651-D958C13D6FF0}" type="datetimeFigureOut">
               <a:rPr lang="en-US" smtClean="0"/>
-              <a:t>8/5/18</a:t>
+              <a:t>9/29/18</a:t>
             </a:fld>
             <a:endParaRPr lang="en-US"/>
           </a:p>
@@ -7176,7 +7065,7 @@
           <a:p>
             <a:fld id="{02CE11C6-247B-0242-8651-D958C13D6FF0}" type="datetimeFigureOut">
               <a:rPr lang="en-US" smtClean="0"/>
-              <a:t>8/5/18</a:t>
+              <a:t>9/29/18</a:t>
             </a:fld>
             <a:endParaRPr lang="en-US"/>
           </a:p>
@@ -7464,7 +7353,7 @@
           <a:p>
             <a:fld id="{02CE11C6-247B-0242-8651-D958C13D6FF0}" type="datetimeFigureOut">
               <a:rPr lang="en-US" smtClean="0"/>
-              <a:t>8/5/18</a:t>
+              <a:t>9/29/18</a:t>
             </a:fld>
             <a:endParaRPr lang="en-US"/>
           </a:p>
@@ -7705,7 +7594,7 @@
           <a:p>
             <a:fld id="{02CE11C6-247B-0242-8651-D958C13D6FF0}" type="datetimeFigureOut">
               <a:rPr lang="en-US" smtClean="0"/>
-              <a:t>8/5/18</a:t>
+              <a:t>9/29/18</a:t>
             </a:fld>
             <a:endParaRPr lang="en-US"/>
           </a:p>
@@ -8264,7 +8153,7 @@
           <a:graphicData uri="http://schemas.openxmlformats.org/presentationml/2006/ole">
             <mc:AlternateContent xmlns:mc="http://schemas.openxmlformats.org/markup-compatibility/2006">
               <mc:Choice xmlns:v="urn:schemas-microsoft-com:vml" Requires="v">
-                <p:oleObj spid="_x0000_s5128" name="Equation" r:id="rId4" imgW="876240" imgH="419040" progId="Equation.3">
+                <p:oleObj spid="_x0000_s5130" name="Equation" r:id="rId4" imgW="876240" imgH="419040" progId="Equation.3">
                   <p:embed/>
                 </p:oleObj>
               </mc:Choice>
@@ -8960,8 +8849,8 @@
         </p:nvSpPr>
         <p:spPr>
           <a:xfrm>
-            <a:off x="750495" y="1569805"/>
-            <a:ext cx="10914507" cy="954107"/>
+            <a:off x="737969" y="1444545"/>
+            <a:ext cx="10914507" cy="2246769"/>
           </a:xfrm>
           <a:prstGeom prst="rect">
             <a:avLst/>
@@ -8983,6 +8872,23 @@
               <a:t>In order to interpret the outputs of a logistic function we must understand the difference between probability and odds.</a:t>
             </a:r>
           </a:p>
+          <a:p>
+            <a:pPr algn="l"/>
+            <a:endParaRPr lang="en-US" sz="2800" dirty="0">
+              <a:latin typeface="PFDinTextCompPro-Italic"/>
+              <a:cs typeface="PFDinTextCompPro-Italic"/>
+            </a:endParaRPr>
+          </a:p>
+          <a:p>
+            <a:pPr algn="l"/>
+            <a:r>
+              <a:rPr lang="en-US" sz="2800" dirty="0">
+                <a:latin typeface="PFDinTextCompPro-Italic"/>
+                <a:cs typeface="PFDinTextCompPro-Italic"/>
+              </a:rPr>
+              <a:t>The odds of an event are given by the ratio of the probability of the event by its complement:</a:t>
+            </a:r>
+          </a:p>
         </p:txBody>
       </p:sp>
       <p:sp>
@@ -8990,7 +8896,7 @@
           <p:cNvPr id="7" name="Title 1">
             <a:extLst>
               <a:ext uri="{FF2B5EF4-FFF2-40B4-BE49-F238E27FC236}">
-                <a16:creationId xmlns:a16="http://schemas.microsoft.com/office/drawing/2014/main" id="{85F9D16A-45E7-E54B-B43A-9AA5CF49B5CA}"/>
+                <a16:creationId xmlns:a16="http://schemas.microsoft.com/office/drawing/2014/main" id="{2E1C6A06-924C-454E-B7EF-40CB469BF8D9}"/>
               </a:ext>
             </a:extLst>
           </p:cNvPr>
@@ -9039,170 +8945,6 @@
           </a:p>
         </p:txBody>
       </p:sp>
-    </p:spTree>
-    <p:extLst>
-      <p:ext uri="{BB962C8B-B14F-4D97-AF65-F5344CB8AC3E}">
-        <p14:creationId xmlns:p14="http://schemas.microsoft.com/office/powerpoint/2010/main" val="735548048"/>
-      </p:ext>
-    </p:extLst>
-  </p:cSld>
-  <p:clrMapOvr>
-    <a:masterClrMapping/>
-  </p:clrMapOvr>
-  <p:transition/>
-</p:sld>
-</file>
-
-<file path=ppt/slides/slide14.xml><?xml version="1.0" encoding="utf-8"?>
-<p:sld xmlns:a="http://schemas.openxmlformats.org/drawingml/2006/main" xmlns:r="http://schemas.openxmlformats.org/officeDocument/2006/relationships" xmlns:p="http://schemas.openxmlformats.org/presentationml/2006/main">
-  <p:cSld>
-    <p:spTree>
-      <p:nvGrpSpPr>
-        <p:cNvPr id="1" name=""/>
-        <p:cNvGrpSpPr/>
-        <p:nvPr/>
-      </p:nvGrpSpPr>
-      <p:grpSpPr>
-        <a:xfrm>
-          <a:off x="0" y="0"/>
-          <a:ext cx="0" cy="0"/>
-          <a:chOff x="0" y="0"/>
-          <a:chExt cx="0" cy="0"/>
-        </a:xfrm>
-      </p:grpSpPr>
-      <p:sp>
-        <p:nvSpPr>
-          <p:cNvPr id="8" name="Slide Number Placeholder 3"/>
-          <p:cNvSpPr>
-            <a:spLocks noGrp="1"/>
-          </p:cNvSpPr>
-          <p:nvPr>
-            <p:ph type="sldNum" sz="quarter" idx="13"/>
-          </p:nvPr>
-        </p:nvSpPr>
-        <p:spPr/>
-        <p:txBody>
-          <a:bodyPr/>
-          <a:lstStyle/>
-          <a:p>
-            <a:pPr>
-              <a:defRPr/>
-            </a:pPr>
-            <a:fld id="{BD5AD749-DAD1-6A4A-A2AA-CB20EAD0AEB7}" type="slidenum">
-              <a:rPr lang="en-US"/>
-              <a:pPr>
-                <a:defRPr/>
-              </a:pPr>
-              <a:t>14</a:t>
-            </a:fld>
-            <a:endParaRPr lang="en-US"/>
-          </a:p>
-        </p:txBody>
-      </p:sp>
-      <p:sp>
-        <p:nvSpPr>
-          <p:cNvPr id="9" name="TextBox 8"/>
-          <p:cNvSpPr txBox="1"/>
-          <p:nvPr/>
-        </p:nvSpPr>
-        <p:spPr>
-          <a:xfrm>
-            <a:off x="737969" y="1444545"/>
-            <a:ext cx="10914507" cy="2246769"/>
-          </a:xfrm>
-          <a:prstGeom prst="rect">
-            <a:avLst/>
-          </a:prstGeom>
-          <a:noFill/>
-        </p:spPr>
-        <p:txBody>
-          <a:bodyPr wrap="square" rtlCol="0">
-            <a:spAutoFit/>
-          </a:bodyPr>
-          <a:lstStyle/>
-          <a:p>
-            <a:pPr algn="l"/>
-            <a:r>
-              <a:rPr lang="en-US" sz="2800" dirty="0">
-                <a:latin typeface="PFDinTextCompPro-Italic"/>
-                <a:cs typeface="PFDinTextCompPro-Italic"/>
-              </a:rPr>
-              <a:t>In order to interpret the outputs of a logistic function we must understand the difference between probability and odds.</a:t>
-            </a:r>
-          </a:p>
-          <a:p>
-            <a:pPr algn="l"/>
-            <a:endParaRPr lang="en-US" sz="2800" dirty="0">
-              <a:latin typeface="PFDinTextCompPro-Italic"/>
-              <a:cs typeface="PFDinTextCompPro-Italic"/>
-            </a:endParaRPr>
-          </a:p>
-          <a:p>
-            <a:pPr algn="l"/>
-            <a:r>
-              <a:rPr lang="en-US" sz="2800" dirty="0">
-                <a:latin typeface="PFDinTextCompPro-Italic"/>
-                <a:cs typeface="PFDinTextCompPro-Italic"/>
-              </a:rPr>
-              <a:t>The odds of an event are given by the ratio of the probability of the event by its complement:</a:t>
-            </a:r>
-          </a:p>
-        </p:txBody>
-      </p:sp>
-      <p:sp>
-        <p:nvSpPr>
-          <p:cNvPr id="7" name="Title 1">
-            <a:extLst>
-              <a:ext uri="{FF2B5EF4-FFF2-40B4-BE49-F238E27FC236}">
-                <a16:creationId xmlns:a16="http://schemas.microsoft.com/office/drawing/2014/main" id="{2E1C6A06-924C-454E-B7EF-40CB469BF8D9}"/>
-              </a:ext>
-            </a:extLst>
-          </p:cNvPr>
-          <p:cNvSpPr txBox="1">
-            <a:spLocks/>
-          </p:cNvSpPr>
-          <p:nvPr/>
-        </p:nvSpPr>
-        <p:spPr>
-          <a:xfrm>
-            <a:off x="838200" y="365125"/>
-            <a:ext cx="10515600" cy="1325563"/>
-          </a:xfrm>
-          <a:prstGeom prst="rect">
-            <a:avLst/>
-          </a:prstGeom>
-        </p:spPr>
-        <p:txBody>
-          <a:bodyPr vert="horz" lIns="0" tIns="32914" rIns="65828" bIns="32914" rtlCol="0" anchor="ctr">
-            <a:normAutofit/>
-          </a:bodyPr>
-          <a:lstStyle>
-            <a:lvl1pPr algn="l" defTabSz="914400" rtl="0" eaLnBrk="1" latinLnBrk="0" hangingPunct="1">
-              <a:lnSpc>
-                <a:spcPts val="4686"/>
-              </a:lnSpc>
-              <a:spcBef>
-                <a:spcPct val="0"/>
-              </a:spcBef>
-              <a:buNone/>
-              <a:defRPr sz="5078" b="1" kern="1200" cap="all" baseline="0">
-                <a:solidFill>
-                  <a:schemeClr val="tx1"/>
-                </a:solidFill>
-                <a:latin typeface="+mj-lt"/>
-                <a:ea typeface="+mj-ea"/>
-                <a:cs typeface="+mj-cs"/>
-              </a:defRPr>
-            </a:lvl1pPr>
-          </a:lstStyle>
-          <a:p>
-            <a:r>
-              <a:rPr lang="en-US" sz="4000" b="0" cap="none" dirty="0"/>
-              <a:t>Interpreting results	</a:t>
-            </a:r>
-          </a:p>
-        </p:txBody>
-      </p:sp>
       <p:graphicFrame>
         <p:nvGraphicFramePr>
           <p:cNvPr id="10" name="Object 9">
@@ -9231,7 +8973,7 @@
           <a:graphicData uri="http://schemas.openxmlformats.org/presentationml/2006/ole">
             <mc:AlternateContent xmlns:mc="http://schemas.openxmlformats.org/markup-compatibility/2006">
               <mc:Choice xmlns:v="urn:schemas-microsoft-com:vml" Requires="v">
-                <p:oleObj spid="_x0000_s25607" name="Equation" r:id="rId4" imgW="825480" imgH="393480" progId="Equation.3">
+                <p:oleObj spid="_x0000_s25609" name="Equation" r:id="rId4" imgW="825480" imgH="393480" progId="Equation.3">
                   <p:embed/>
                 </p:oleObj>
               </mc:Choice>
@@ -9356,7 +9098,7 @@
 </p:sld>
 </file>
 
-<file path=ppt/slides/slide15.xml><?xml version="1.0" encoding="utf-8"?>
+<file path=ppt/slides/slide14.xml><?xml version="1.0" encoding="utf-8"?>
 <p:sld xmlns:a="http://schemas.openxmlformats.org/drawingml/2006/main" xmlns:r="http://schemas.openxmlformats.org/officeDocument/2006/relationships" xmlns:p="http://schemas.openxmlformats.org/presentationml/2006/main">
   <p:cSld>
     <p:spTree>
@@ -9396,7 +9138,7 @@
               <a:pPr>
                 <a:defRPr/>
               </a:pPr>
-              <a:t>15</a:t>
+              <a:t>14</a:t>
             </a:fld>
             <a:endParaRPr lang="en-US"/>
           </a:p>
@@ -9544,7 +9286,7 @@
 </p:sld>
 </file>
 
-<file path=ppt/slides/slide16.xml><?xml version="1.0" encoding="utf-8"?>
+<file path=ppt/slides/slide15.xml><?xml version="1.0" encoding="utf-8"?>
 <p:sld xmlns:a="http://schemas.openxmlformats.org/drawingml/2006/main" xmlns:r="http://schemas.openxmlformats.org/officeDocument/2006/relationships" xmlns:p="http://schemas.openxmlformats.org/presentationml/2006/main">
   <p:cSld>
     <p:spTree>
@@ -9584,7 +9326,7 @@
               <a:pPr>
                 <a:defRPr/>
               </a:pPr>
-              <a:t>16</a:t>
+              <a:t>15</a:t>
             </a:fld>
             <a:endParaRPr lang="en-US"/>
           </a:p>
@@ -9746,7 +9488,7 @@
           <a:graphicData uri="http://schemas.openxmlformats.org/presentationml/2006/ole">
             <mc:AlternateContent xmlns:mc="http://schemas.openxmlformats.org/markup-compatibility/2006">
               <mc:Choice xmlns:v="urn:schemas-microsoft-com:vml" Requires="v">
-                <p:oleObj spid="_x0000_s27655" name="Equation" r:id="rId4" imgW="825480" imgH="393480" progId="Equation.3">
+                <p:oleObj spid="_x0000_s27657" name="Equation" r:id="rId4" imgW="825480" imgH="393480" progId="Equation.3">
                   <p:embed/>
                 </p:oleObj>
               </mc:Choice>
@@ -9821,7 +9563,7 @@
 </p:sld>
 </file>
 
-<file path=ppt/slides/slide17.xml><?xml version="1.0" encoding="utf-8"?>
+<file path=ppt/slides/slide16.xml><?xml version="1.0" encoding="utf-8"?>
 <p:sld xmlns:a="http://schemas.openxmlformats.org/drawingml/2006/main" xmlns:r="http://schemas.openxmlformats.org/officeDocument/2006/relationships" xmlns:p="http://schemas.openxmlformats.org/presentationml/2006/main">
   <p:cSld>
     <p:spTree>
@@ -9861,7 +9603,7 @@
               <a:pPr>
                 <a:defRPr/>
               </a:pPr>
-              <a:t>17</a:t>
+              <a:t>16</a:t>
             </a:fld>
             <a:endParaRPr lang="en-US"/>
           </a:p>
@@ -10023,7 +9765,7 @@
           <a:graphicData uri="http://schemas.openxmlformats.org/presentationml/2006/ole">
             <mc:AlternateContent xmlns:mc="http://schemas.openxmlformats.org/markup-compatibility/2006">
               <mc:Choice xmlns:v="urn:schemas-microsoft-com:vml" Requires="v">
-                <p:oleObj spid="_x0000_s28680" name="Equation" r:id="rId4" imgW="1587240" imgH="393480" progId="Equation.3">
+                <p:oleObj spid="_x0000_s28682" name="Equation" r:id="rId4" imgW="1587240" imgH="393480" progId="Equation.3">
                   <p:embed/>
                 </p:oleObj>
               </mc:Choice>
@@ -10145,7 +9887,7 @@
 </p:sld>
 </file>
 
-<file path=ppt/slides/slide18.xml><?xml version="1.0" encoding="utf-8"?>
+<file path=ppt/slides/slide17.xml><?xml version="1.0" encoding="utf-8"?>
 <p:sld xmlns:a="http://schemas.openxmlformats.org/drawingml/2006/main" xmlns:r="http://schemas.openxmlformats.org/officeDocument/2006/relationships" xmlns:p="http://schemas.openxmlformats.org/presentationml/2006/main">
   <p:cSld>
     <p:spTree>
@@ -10189,7 +9931,7 @@
               <a:pPr>
                 <a:defRPr/>
               </a:pPr>
-              <a:t>18</a:t>
+              <a:t>17</a:t>
             </a:fld>
             <a:endParaRPr lang="en-US">
               <a:solidFill>
@@ -10271,7 +10013,7 @@
           <a:graphicData uri="http://schemas.openxmlformats.org/presentationml/2006/ole">
             <mc:AlternateContent xmlns:mc="http://schemas.openxmlformats.org/markup-compatibility/2006">
               <mc:Choice xmlns:v="urn:schemas-microsoft-com:vml" Requires="v">
-                <p:oleObj spid="_x0000_s12297" name="Equation" r:id="rId4" imgW="1815840" imgH="457200" progId="Equation.3">
+                <p:oleObj spid="_x0000_s12299" name="Equation" r:id="rId4" imgW="1815840" imgH="457200" progId="Equation.3">
                   <p:embed/>
                 </p:oleObj>
               </mc:Choice>
@@ -10400,7 +10142,7 @@
 </p:sld>
 </file>
 
-<file path=ppt/slides/slide19.xml><?xml version="1.0" encoding="utf-8"?>
+<file path=ppt/slides/slide18.xml><?xml version="1.0" encoding="utf-8"?>
 <p:sld xmlns:a="http://schemas.openxmlformats.org/drawingml/2006/main" xmlns:r="http://schemas.openxmlformats.org/officeDocument/2006/relationships" xmlns:p="http://schemas.openxmlformats.org/presentationml/2006/main">
   <p:cSld>
     <p:spTree>
@@ -10444,7 +10186,7 @@
               <a:pPr>
                 <a:defRPr/>
               </a:pPr>
-              <a:t>19</a:t>
+              <a:t>18</a:t>
             </a:fld>
             <a:endParaRPr lang="en-US">
               <a:solidFill>
@@ -10530,7 +10272,7 @@
           <a:graphicData uri="http://schemas.openxmlformats.org/presentationml/2006/ole">
             <mc:AlternateContent xmlns:mc="http://schemas.openxmlformats.org/markup-compatibility/2006">
               <mc:Choice xmlns:v="urn:schemas-microsoft-com:vml" Requires="v">
-                <p:oleObj spid="_x0000_s13329" name="Equation" r:id="rId4" imgW="1815840" imgH="457200" progId="Equation.3">
+                <p:oleObj spid="_x0000_s13333" name="Equation" r:id="rId4" imgW="1815840" imgH="457200" progId="Equation.3">
                   <p:embed/>
                 </p:oleObj>
               </mc:Choice>
@@ -10613,7 +10355,7 @@
           <a:graphicData uri="http://schemas.openxmlformats.org/presentationml/2006/ole">
             <mc:AlternateContent xmlns:mc="http://schemas.openxmlformats.org/markup-compatibility/2006">
               <mc:Choice xmlns:v="urn:schemas-microsoft-com:vml" Requires="v">
-                <p:oleObj spid="_x0000_s13330" name="Equation" r:id="rId6" imgW="3340080" imgH="457200" progId="Equation.3">
+                <p:oleObj spid="_x0000_s13334" name="Equation" r:id="rId6" imgW="3340080" imgH="457200" progId="Equation.3">
                   <p:embed/>
                 </p:oleObj>
               </mc:Choice>
@@ -10742,7 +10484,7 @@
 </p:sld>
 </file>
 
-<file path=ppt/slides/slide2.xml><?xml version="1.0" encoding="utf-8"?>
+<file path=ppt/slides/slide19.xml><?xml version="1.0" encoding="utf-8"?>
 <p:sld xmlns:a="http://schemas.openxmlformats.org/drawingml/2006/main" xmlns:r="http://schemas.openxmlformats.org/officeDocument/2006/relationships" xmlns:p="http://schemas.openxmlformats.org/presentationml/2006/main">
   <p:cSld>
     <p:spTree>
@@ -10761,116 +10503,6 @@
       </p:grpSpPr>
       <p:sp>
         <p:nvSpPr>
-          <p:cNvPr id="2" name="Title 1">
-            <a:extLst>
-              <a:ext uri="{FF2B5EF4-FFF2-40B4-BE49-F238E27FC236}">
-                <a16:creationId xmlns:a16="http://schemas.microsoft.com/office/drawing/2014/main" id="{5F2B5E13-80FA-914C-9186-E1F1A98E5340}"/>
-              </a:ext>
-            </a:extLst>
-          </p:cNvPr>
-          <p:cNvSpPr>
-            <a:spLocks noGrp="1"/>
-          </p:cNvSpPr>
-          <p:nvPr>
-            <p:ph type="title"/>
-          </p:nvPr>
-        </p:nvSpPr>
-        <p:spPr/>
-        <p:txBody>
-          <a:bodyPr>
-            <a:normAutofit/>
-          </a:bodyPr>
-          <a:lstStyle/>
-          <a:p>
-            <a:r>
-              <a:rPr lang="en-US" dirty="0"/>
-              <a:t>Topics	</a:t>
-            </a:r>
-          </a:p>
-        </p:txBody>
-      </p:sp>
-      <p:sp>
-        <p:nvSpPr>
-          <p:cNvPr id="3" name="Content Placeholder 2">
-            <a:extLst>
-              <a:ext uri="{FF2B5EF4-FFF2-40B4-BE49-F238E27FC236}">
-                <a16:creationId xmlns:a16="http://schemas.microsoft.com/office/drawing/2014/main" id="{A22FDBCF-9E8F-6F4B-B28E-152F058D98EF}"/>
-              </a:ext>
-            </a:extLst>
-          </p:cNvPr>
-          <p:cNvSpPr>
-            <a:spLocks noGrp="1"/>
-          </p:cNvSpPr>
-          <p:nvPr>
-            <p:ph idx="1"/>
-          </p:nvPr>
-        </p:nvSpPr>
-        <p:spPr/>
-        <p:txBody>
-          <a:bodyPr/>
-          <a:lstStyle/>
-          <a:p>
-            <a:r>
-              <a:rPr lang="en-US" dirty="0"/>
-              <a:t>Logistic regression</a:t>
-            </a:r>
-          </a:p>
-          <a:p>
-            <a:r>
-              <a:rPr lang="en-US" dirty="0">
-                <a:effectLst/>
-              </a:rPr>
-              <a:t>Model interpretation</a:t>
-            </a:r>
-          </a:p>
-          <a:p>
-            <a:r>
-              <a:rPr lang="en-US" dirty="0"/>
-              <a:t>Predicting default rates</a:t>
-            </a:r>
-          </a:p>
-          <a:p>
-            <a:r>
-              <a:rPr lang="en-US" dirty="0">
-                <a:effectLst/>
-              </a:rPr>
-              <a:t>Q &amp; A</a:t>
-            </a:r>
-          </a:p>
-        </p:txBody>
-      </p:sp>
-    </p:spTree>
-    <p:extLst>
-      <p:ext uri="{BB962C8B-B14F-4D97-AF65-F5344CB8AC3E}">
-        <p14:creationId xmlns:p14="http://schemas.microsoft.com/office/powerpoint/2010/main" val="1701353346"/>
-      </p:ext>
-    </p:extLst>
-  </p:cSld>
-  <p:clrMapOvr>
-    <a:masterClrMapping/>
-  </p:clrMapOvr>
-</p:sld>
-</file>
-
-<file path=ppt/slides/slide20.xml><?xml version="1.0" encoding="utf-8"?>
-<p:sld xmlns:a="http://schemas.openxmlformats.org/drawingml/2006/main" xmlns:r="http://schemas.openxmlformats.org/officeDocument/2006/relationships" xmlns:p="http://schemas.openxmlformats.org/presentationml/2006/main">
-  <p:cSld>
-    <p:spTree>
-      <p:nvGrpSpPr>
-        <p:cNvPr id="1" name=""/>
-        <p:cNvGrpSpPr/>
-        <p:nvPr/>
-      </p:nvGrpSpPr>
-      <p:grpSpPr>
-        <a:xfrm>
-          <a:off x="0" y="0"/>
-          <a:ext cx="0" cy="0"/>
-          <a:chOff x="0" y="0"/>
-          <a:chExt cx="0" cy="0"/>
-        </a:xfrm>
-      </p:grpSpPr>
-      <p:sp>
-        <p:nvSpPr>
           <p:cNvPr id="8" name="Slide Number Placeholder 3"/>
           <p:cNvSpPr>
             <a:spLocks noGrp="1"/>
@@ -10896,7 +10528,7 @@
               <a:pPr>
                 <a:defRPr/>
               </a:pPr>
-              <a:t>20</a:t>
+              <a:t>19</a:t>
             </a:fld>
             <a:endParaRPr lang="en-US">
               <a:solidFill>
@@ -10982,7 +10614,7 @@
           <a:graphicData uri="http://schemas.openxmlformats.org/presentationml/2006/ole">
             <mc:AlternateContent xmlns:mc="http://schemas.openxmlformats.org/markup-compatibility/2006">
               <mc:Choice xmlns:v="urn:schemas-microsoft-com:vml" Requires="v">
-                <p:oleObj spid="_x0000_s14345" name="Equation" r:id="rId4" imgW="2120760" imgH="393480" progId="Equation.3">
+                <p:oleObj spid="_x0000_s14347" name="Equation" r:id="rId4" imgW="2120760" imgH="393480" progId="Equation.3">
                   <p:embed/>
                 </p:oleObj>
               </mc:Choice>
@@ -11141,6 +10773,90 @@
           </a:p>
         </p:txBody>
       </p:sp>
+      <p:sp>
+        <p:nvSpPr>
+          <p:cNvPr id="2" name="TextBox 1">
+            <a:extLst>
+              <a:ext uri="{FF2B5EF4-FFF2-40B4-BE49-F238E27FC236}">
+                <a16:creationId xmlns:a16="http://schemas.microsoft.com/office/drawing/2014/main" id="{350C53B8-797E-C44A-9750-805AF877364E}"/>
+              </a:ext>
+            </a:extLst>
+          </p:cNvPr>
+          <p:cNvSpPr txBox="1"/>
+          <p:nvPr/>
+        </p:nvSpPr>
+        <p:spPr>
+          <a:xfrm>
+            <a:off x="2642992" y="7202466"/>
+            <a:ext cx="6821611" cy="369332"/>
+          </a:xfrm>
+          <a:prstGeom prst="rect">
+            <a:avLst/>
+          </a:prstGeom>
+          <a:noFill/>
+        </p:spPr>
+        <p:txBody>
+          <a:bodyPr wrap="none" rtlCol="0">
+            <a:spAutoFit/>
+          </a:bodyPr>
+          <a:lstStyle/>
+          <a:p>
+            <a:r>
+              <a:rPr lang="en-US" dirty="0"/>
+              <a:t>the </a:t>
+            </a:r>
+            <a:r>
+              <a:rPr lang="en-US" b="1" dirty="0"/>
+              <a:t>logit function</a:t>
+            </a:r>
+            <a:r>
+              <a:rPr lang="en-US" dirty="0"/>
+              <a:t> or the log-odds is the logarithm of the odds p/(1 − p)</a:t>
+            </a:r>
+          </a:p>
+        </p:txBody>
+      </p:sp>
+      <p:cxnSp>
+        <p:nvCxnSpPr>
+          <p:cNvPr id="4" name="Straight Arrow Connector 3">
+            <a:extLst>
+              <a:ext uri="{FF2B5EF4-FFF2-40B4-BE49-F238E27FC236}">
+                <a16:creationId xmlns:a16="http://schemas.microsoft.com/office/drawing/2014/main" id="{22057891-2E41-B947-8C1E-1001EBFCBB2F}"/>
+              </a:ext>
+            </a:extLst>
+          </p:cNvPr>
+          <p:cNvCxnSpPr>
+            <a:cxnSpLocks/>
+          </p:cNvCxnSpPr>
+          <p:nvPr/>
+        </p:nvCxnSpPr>
+        <p:spPr>
+          <a:xfrm flipH="1" flipV="1">
+            <a:off x="4335333" y="3770952"/>
+            <a:ext cx="2022436" cy="983928"/>
+          </a:xfrm>
+          <a:prstGeom prst="straightConnector1">
+            <a:avLst/>
+          </a:prstGeom>
+          <a:ln>
+            <a:tailEnd type="triangle"/>
+          </a:ln>
+        </p:spPr>
+        <p:style>
+          <a:lnRef idx="1">
+            <a:schemeClr val="accent1"/>
+          </a:lnRef>
+          <a:fillRef idx="0">
+            <a:schemeClr val="accent1"/>
+          </a:fillRef>
+          <a:effectRef idx="0">
+            <a:schemeClr val="accent1"/>
+          </a:effectRef>
+          <a:fontRef idx="minor">
+            <a:schemeClr val="tx1"/>
+          </a:fontRef>
+        </p:style>
+      </p:cxnSp>
     </p:spTree>
     <p:extLst>
       <p:ext uri="{BB962C8B-B14F-4D97-AF65-F5344CB8AC3E}">
@@ -11155,7 +10871,7 @@
 </p:sld>
 </file>
 
-<file path=ppt/slides/slide21.xml><?xml version="1.0" encoding="utf-8"?>
+<file path=ppt/slides/slide2.xml><?xml version="1.0" encoding="utf-8"?>
 <p:sld xmlns:a="http://schemas.openxmlformats.org/drawingml/2006/main" xmlns:r="http://schemas.openxmlformats.org/officeDocument/2006/relationships" xmlns:p="http://schemas.openxmlformats.org/presentationml/2006/main">
   <p:cSld>
     <p:spTree>
@@ -11174,6 +10890,116 @@
       </p:grpSpPr>
       <p:sp>
         <p:nvSpPr>
+          <p:cNvPr id="2" name="Title 1">
+            <a:extLst>
+              <a:ext uri="{FF2B5EF4-FFF2-40B4-BE49-F238E27FC236}">
+                <a16:creationId xmlns:a16="http://schemas.microsoft.com/office/drawing/2014/main" id="{5F2B5E13-80FA-914C-9186-E1F1A98E5340}"/>
+              </a:ext>
+            </a:extLst>
+          </p:cNvPr>
+          <p:cNvSpPr>
+            <a:spLocks noGrp="1"/>
+          </p:cNvSpPr>
+          <p:nvPr>
+            <p:ph type="title"/>
+          </p:nvPr>
+        </p:nvSpPr>
+        <p:spPr/>
+        <p:txBody>
+          <a:bodyPr>
+            <a:normAutofit/>
+          </a:bodyPr>
+          <a:lstStyle/>
+          <a:p>
+            <a:r>
+              <a:rPr lang="en-US" dirty="0"/>
+              <a:t>Topics	</a:t>
+            </a:r>
+          </a:p>
+        </p:txBody>
+      </p:sp>
+      <p:sp>
+        <p:nvSpPr>
+          <p:cNvPr id="3" name="Content Placeholder 2">
+            <a:extLst>
+              <a:ext uri="{FF2B5EF4-FFF2-40B4-BE49-F238E27FC236}">
+                <a16:creationId xmlns:a16="http://schemas.microsoft.com/office/drawing/2014/main" id="{A22FDBCF-9E8F-6F4B-B28E-152F058D98EF}"/>
+              </a:ext>
+            </a:extLst>
+          </p:cNvPr>
+          <p:cNvSpPr>
+            <a:spLocks noGrp="1"/>
+          </p:cNvSpPr>
+          <p:nvPr>
+            <p:ph idx="1"/>
+          </p:nvPr>
+        </p:nvSpPr>
+        <p:spPr/>
+        <p:txBody>
+          <a:bodyPr/>
+          <a:lstStyle/>
+          <a:p>
+            <a:r>
+              <a:rPr lang="en-US" dirty="0"/>
+              <a:t>Logistic regression</a:t>
+            </a:r>
+          </a:p>
+          <a:p>
+            <a:r>
+              <a:rPr lang="en-US" dirty="0">
+                <a:effectLst/>
+              </a:rPr>
+              <a:t>Model interpretation</a:t>
+            </a:r>
+          </a:p>
+          <a:p>
+            <a:r>
+              <a:rPr lang="en-US" dirty="0"/>
+              <a:t>Predicting default rates</a:t>
+            </a:r>
+          </a:p>
+          <a:p>
+            <a:r>
+              <a:rPr lang="en-US" dirty="0">
+                <a:effectLst/>
+              </a:rPr>
+              <a:t>Q &amp; A</a:t>
+            </a:r>
+          </a:p>
+        </p:txBody>
+      </p:sp>
+    </p:spTree>
+    <p:extLst>
+      <p:ext uri="{BB962C8B-B14F-4D97-AF65-F5344CB8AC3E}">
+        <p14:creationId xmlns:p14="http://schemas.microsoft.com/office/powerpoint/2010/main" val="1701353346"/>
+      </p:ext>
+    </p:extLst>
+  </p:cSld>
+  <p:clrMapOvr>
+    <a:masterClrMapping/>
+  </p:clrMapOvr>
+</p:sld>
+</file>
+
+<file path=ppt/slides/slide20.xml><?xml version="1.0" encoding="utf-8"?>
+<p:sld xmlns:a="http://schemas.openxmlformats.org/drawingml/2006/main" xmlns:r="http://schemas.openxmlformats.org/officeDocument/2006/relationships" xmlns:p="http://schemas.openxmlformats.org/presentationml/2006/main">
+  <p:cSld>
+    <p:spTree>
+      <p:nvGrpSpPr>
+        <p:cNvPr id="1" name=""/>
+        <p:cNvGrpSpPr/>
+        <p:nvPr/>
+      </p:nvGrpSpPr>
+      <p:grpSpPr>
+        <a:xfrm>
+          <a:off x="0" y="0"/>
+          <a:ext cx="0" cy="0"/>
+          <a:chOff x="0" y="0"/>
+          <a:chExt cx="0" cy="0"/>
+        </a:xfrm>
+      </p:grpSpPr>
+      <p:sp>
+        <p:nvSpPr>
           <p:cNvPr id="8" name="Slide Number Placeholder 3"/>
           <p:cNvSpPr>
             <a:spLocks noGrp="1"/>
@@ -11199,7 +11025,7 @@
               <a:pPr>
                 <a:defRPr/>
               </a:pPr>
-              <a:t>21</a:t>
+              <a:t>20</a:t>
             </a:fld>
             <a:endParaRPr lang="en-US">
               <a:solidFill>
@@ -11316,7 +11142,7 @@
           <a:graphicData uri="http://schemas.openxmlformats.org/presentationml/2006/ole">
             <mc:AlternateContent xmlns:mc="http://schemas.openxmlformats.org/markup-compatibility/2006">
               <mc:Choice xmlns:v="urn:schemas-microsoft-com:vml" Requires="v">
-                <p:oleObj spid="_x0000_s16393" name="Equation" r:id="rId4" imgW="2120760" imgH="393480" progId="Equation.3">
+                <p:oleObj spid="_x0000_s16395" name="Equation" r:id="rId4" imgW="2120760" imgH="393480" progId="Equation.3">
                   <p:embed/>
                 </p:oleObj>
               </mc:Choice>
@@ -11431,10 +11257,222 @@
           </a:p>
         </p:txBody>
       </p:sp>
+      <p:pic>
+        <p:nvPicPr>
+          <p:cNvPr id="2" name="Picture 1">
+            <a:extLst>
+              <a:ext uri="{FF2B5EF4-FFF2-40B4-BE49-F238E27FC236}">
+                <a16:creationId xmlns:a16="http://schemas.microsoft.com/office/drawing/2014/main" id="{E9FBDE44-5EB6-1A4B-B430-CC78B4F09177}"/>
+              </a:ext>
+            </a:extLst>
+          </p:cNvPr>
+          <p:cNvPicPr>
+            <a:picLocks noChangeAspect="1"/>
+          </p:cNvPicPr>
+          <p:nvPr/>
+        </p:nvPicPr>
+        <p:blipFill>
+          <a:blip r:embed="rId6"/>
+          <a:stretch>
+            <a:fillRect/>
+          </a:stretch>
+        </p:blipFill>
+        <p:spPr>
+          <a:xfrm>
+            <a:off x="4531522" y="4546658"/>
+            <a:ext cx="3327400" cy="2171700"/>
+          </a:xfrm>
+          <a:prstGeom prst="rect">
+            <a:avLst/>
+          </a:prstGeom>
+        </p:spPr>
+      </p:pic>
     </p:spTree>
     <p:extLst>
       <p:ext uri="{BB962C8B-B14F-4D97-AF65-F5344CB8AC3E}">
         <p14:creationId xmlns:p14="http://schemas.microsoft.com/office/powerpoint/2010/main" val="1610909518"/>
+      </p:ext>
+    </p:extLst>
+  </p:cSld>
+  <p:clrMapOvr>
+    <a:masterClrMapping/>
+  </p:clrMapOvr>
+  <p:transition/>
+</p:sld>
+</file>
+
+<file path=ppt/slides/slide21.xml><?xml version="1.0" encoding="utf-8"?>
+<p:sld xmlns:a="http://schemas.openxmlformats.org/drawingml/2006/main" xmlns:r="http://schemas.openxmlformats.org/officeDocument/2006/relationships" xmlns:p="http://schemas.openxmlformats.org/presentationml/2006/main">
+  <p:cSld>
+    <p:spTree>
+      <p:nvGrpSpPr>
+        <p:cNvPr id="1" name=""/>
+        <p:cNvGrpSpPr/>
+        <p:nvPr/>
+      </p:nvGrpSpPr>
+      <p:grpSpPr>
+        <a:xfrm>
+          <a:off x="0" y="0"/>
+          <a:ext cx="0" cy="0"/>
+          <a:chOff x="0" y="0"/>
+          <a:chExt cx="0" cy="0"/>
+        </a:xfrm>
+      </p:grpSpPr>
+      <p:sp>
+        <p:nvSpPr>
+          <p:cNvPr id="8" name="Slide Number Placeholder 3"/>
+          <p:cNvSpPr>
+            <a:spLocks noGrp="1"/>
+          </p:cNvSpPr>
+          <p:nvPr>
+            <p:ph type="sldNum" sz="quarter" idx="13"/>
+          </p:nvPr>
+        </p:nvSpPr>
+        <p:spPr/>
+        <p:txBody>
+          <a:bodyPr/>
+          <a:lstStyle/>
+          <a:p>
+            <a:pPr>
+              <a:defRPr/>
+            </a:pPr>
+            <a:fld id="{BD5AD749-DAD1-6A4A-A2AA-CB20EAD0AEB7}" type="slidenum">
+              <a:rPr lang="en-US"/>
+              <a:pPr>
+                <a:defRPr/>
+              </a:pPr>
+              <a:t>21</a:t>
+            </a:fld>
+            <a:endParaRPr lang="en-US"/>
+          </a:p>
+        </p:txBody>
+      </p:sp>
+      <p:sp>
+        <p:nvSpPr>
+          <p:cNvPr id="9" name="TextBox 8"/>
+          <p:cNvSpPr txBox="1"/>
+          <p:nvPr/>
+        </p:nvSpPr>
+        <p:spPr>
+          <a:xfrm>
+            <a:off x="737969" y="1444545"/>
+            <a:ext cx="10914507" cy="954107"/>
+          </a:xfrm>
+          <a:prstGeom prst="rect">
+            <a:avLst/>
+          </a:prstGeom>
+          <a:noFill/>
+        </p:spPr>
+        <p:txBody>
+          <a:bodyPr wrap="square" rtlCol="0">
+            <a:spAutoFit/>
+          </a:bodyPr>
+          <a:lstStyle/>
+          <a:p>
+            <a:pPr algn="l"/>
+            <a:r>
+              <a:rPr lang="en-US" sz="2800" dirty="0">
+                <a:latin typeface="PFDinTextCompPro-Italic"/>
+                <a:cs typeface="PFDinTextCompPro-Italic"/>
+              </a:rPr>
+              <a:t>In linear regression, the parameter </a:t>
+            </a:r>
+            <a:r>
+              <a:rPr lang="en-US" sz="2800" i="1" dirty="0">
+                <a:latin typeface="Symbol" charset="2"/>
+                <a:cs typeface="Symbol" charset="2"/>
+              </a:rPr>
+              <a:t>b</a:t>
+            </a:r>
+            <a:r>
+              <a:rPr lang="en-US" sz="2800" i="1" baseline="-25000" dirty="0">
+                <a:latin typeface="Symbol" charset="2"/>
+                <a:cs typeface="Symbol" charset="2"/>
+              </a:rPr>
+              <a:t>1</a:t>
+            </a:r>
+            <a:r>
+              <a:rPr lang="en-US" sz="2800" dirty="0">
+                <a:latin typeface="PFDinTextCompPro-Italic"/>
+                <a:cs typeface="PFDinTextCompPro-Italic"/>
+              </a:rPr>
+              <a:t> represents the change in the </a:t>
+            </a:r>
+            <a:r>
+              <a:rPr lang="en-US" sz="2800" b="1" dirty="0">
+                <a:latin typeface="PFDinTextCompPro-Italic"/>
+                <a:cs typeface="PFDinTextCompPro-Italic"/>
+              </a:rPr>
+              <a:t>response variable </a:t>
+            </a:r>
+            <a:r>
+              <a:rPr lang="en-US" sz="2800" dirty="0">
+                <a:latin typeface="PFDinTextCompPro-Italic"/>
+                <a:cs typeface="PFDinTextCompPro-Italic"/>
+              </a:rPr>
+              <a:t>for a unit change in x.</a:t>
+            </a:r>
+          </a:p>
+        </p:txBody>
+      </p:sp>
+      <p:sp>
+        <p:nvSpPr>
+          <p:cNvPr id="7" name="Title 1">
+            <a:extLst>
+              <a:ext uri="{FF2B5EF4-FFF2-40B4-BE49-F238E27FC236}">
+                <a16:creationId xmlns:a16="http://schemas.microsoft.com/office/drawing/2014/main" id="{6AD72E12-025A-A041-85F6-6A9E00E346EF}"/>
+              </a:ext>
+            </a:extLst>
+          </p:cNvPr>
+          <p:cNvSpPr txBox="1">
+            <a:spLocks/>
+          </p:cNvSpPr>
+          <p:nvPr/>
+        </p:nvSpPr>
+        <p:spPr>
+          <a:xfrm>
+            <a:off x="838200" y="365125"/>
+            <a:ext cx="10515600" cy="1325563"/>
+          </a:xfrm>
+          <a:prstGeom prst="rect">
+            <a:avLst/>
+          </a:prstGeom>
+        </p:spPr>
+        <p:txBody>
+          <a:bodyPr vert="horz" lIns="0" tIns="32914" rIns="65828" bIns="32914" rtlCol="0" anchor="ctr">
+            <a:normAutofit/>
+          </a:bodyPr>
+          <a:lstStyle>
+            <a:lvl1pPr algn="l" defTabSz="914400" rtl="0" eaLnBrk="1" latinLnBrk="0" hangingPunct="1">
+              <a:lnSpc>
+                <a:spcPts val="4686"/>
+              </a:lnSpc>
+              <a:spcBef>
+                <a:spcPct val="0"/>
+              </a:spcBef>
+              <a:buNone/>
+              <a:defRPr sz="5078" b="1" kern="1200" cap="all" baseline="0">
+                <a:solidFill>
+                  <a:schemeClr val="tx1"/>
+                </a:solidFill>
+                <a:latin typeface="+mj-lt"/>
+                <a:ea typeface="+mj-ea"/>
+                <a:cs typeface="+mj-cs"/>
+              </a:defRPr>
+            </a:lvl1pPr>
+          </a:lstStyle>
+          <a:p>
+            <a:r>
+              <a:rPr lang="en-US" sz="4000" b="0" cap="none" dirty="0"/>
+              <a:t>Interpreting results	</a:t>
+            </a:r>
+          </a:p>
+        </p:txBody>
+      </p:sp>
+    </p:spTree>
+    <p:extLst>
+      <p:ext uri="{BB962C8B-B14F-4D97-AF65-F5344CB8AC3E}">
+        <p14:creationId xmlns:p14="http://schemas.microsoft.com/office/powerpoint/2010/main" val="1214872923"/>
       </p:ext>
     </p:extLst>
   </p:cSld>
@@ -11500,7 +11538,7 @@
         <p:spPr>
           <a:xfrm>
             <a:off x="737969" y="1444545"/>
-            <a:ext cx="10914507" cy="954107"/>
+            <a:ext cx="10914507" cy="2246769"/>
           </a:xfrm>
           <a:prstGeom prst="rect">
             <a:avLst/>
@@ -11557,6 +11595,58 @@
               <a:t>for a unit change in x.</a:t>
             </a:r>
           </a:p>
+          <a:p>
+            <a:pPr algn="l"/>
+            <a:endParaRPr lang="en-US" sz="2800" dirty="0">
+              <a:latin typeface="PFDinTextCompPro-Italic"/>
+              <a:cs typeface="PFDinTextCompPro-Italic"/>
+            </a:endParaRPr>
+          </a:p>
+          <a:p>
+            <a:pPr algn="l"/>
+            <a:r>
+              <a:rPr lang="en-US" sz="2800" dirty="0">
+                <a:latin typeface="PFDinTextCompPro-Italic"/>
+                <a:cs typeface="PFDinTextCompPro-Italic"/>
+              </a:rPr>
+              <a:t>In logistic regression, </a:t>
+            </a:r>
+            <a:r>
+              <a:rPr lang="en-US" sz="2800" i="1" dirty="0">
+                <a:latin typeface="Symbol" charset="2"/>
+                <a:cs typeface="Symbol" charset="2"/>
+              </a:rPr>
+              <a:t>b</a:t>
+            </a:r>
+            <a:r>
+              <a:rPr lang="en-US" sz="2800" i="1" baseline="-25000" dirty="0">
+                <a:latin typeface="Symbol" charset="2"/>
+                <a:cs typeface="Symbol" charset="2"/>
+              </a:rPr>
+              <a:t>1</a:t>
+            </a:r>
+            <a:r>
+              <a:rPr lang="en-US" sz="2800" dirty="0">
+                <a:latin typeface="PFDinTextCompPro-Italic"/>
+                <a:cs typeface="PFDinTextCompPro-Italic"/>
+              </a:rPr>
+              <a:t> represents the change in the </a:t>
+            </a:r>
+            <a:r>
+              <a:rPr lang="en-US" sz="2800" b="1" dirty="0">
+                <a:latin typeface="PFDinTextCompPro-Italic"/>
+                <a:cs typeface="PFDinTextCompPro-Italic"/>
+              </a:rPr>
+              <a:t>log-odds </a:t>
+            </a:r>
+            <a:r>
+              <a:rPr lang="en-US" sz="2800" dirty="0">
+                <a:latin typeface="PFDinTextCompPro-Italic"/>
+                <a:cs typeface="PFDinTextCompPro-Italic"/>
+              </a:rPr>
+              <a:t>for a unit change in x.</a:t>
+            </a:r>
+          </a:p>
         </p:txBody>
       </p:sp>
       <p:sp>
@@ -11564,7 +11654,7 @@
           <p:cNvPr id="7" name="Title 1">
             <a:extLst>
               <a:ext uri="{FF2B5EF4-FFF2-40B4-BE49-F238E27FC236}">
-                <a16:creationId xmlns:a16="http://schemas.microsoft.com/office/drawing/2014/main" id="{6AD72E12-025A-A041-85F6-6A9E00E346EF}"/>
+                <a16:creationId xmlns:a16="http://schemas.microsoft.com/office/drawing/2014/main" id="{ECB81EE5-4CBA-424D-B483-290AEFA97C85}"/>
               </a:ext>
             </a:extLst>
           </p:cNvPr>
@@ -11616,7 +11706,7 @@
     </p:spTree>
     <p:extLst>
       <p:ext uri="{BB962C8B-B14F-4D97-AF65-F5344CB8AC3E}">
-        <p14:creationId xmlns:p14="http://schemas.microsoft.com/office/powerpoint/2010/main" val="1214872923"/>
+        <p14:creationId xmlns:p14="http://schemas.microsoft.com/office/powerpoint/2010/main" val="371799518"/>
       </p:ext>
     </p:extLst>
   </p:cSld>
@@ -11682,7 +11772,7 @@
         <p:spPr>
           <a:xfrm>
             <a:off x="737969" y="1444545"/>
-            <a:ext cx="10914507" cy="2246769"/>
+            <a:ext cx="10914507" cy="3539430"/>
           </a:xfrm>
           <a:prstGeom prst="rect">
             <a:avLst/>
@@ -11790,6 +11880,43 @@
               </a:rPr>
               <a:t>for a unit change in x.</a:t>
             </a:r>
+          </a:p>
+          <a:p>
+            <a:pPr algn="l"/>
+            <a:endParaRPr lang="en-US" sz="2800" dirty="0">
+              <a:latin typeface="PFDinTextCompPro-Italic"/>
+              <a:cs typeface="PFDinTextCompPro-Italic"/>
+            </a:endParaRPr>
+          </a:p>
+          <a:p>
+            <a:r>
+              <a:rPr lang="en-US" sz="2800" dirty="0">
+                <a:latin typeface="PFDinTextCompPro-Italic"/>
+                <a:cs typeface="PFDinTextCompPro-Italic"/>
+              </a:rPr>
+              <a:t>This means that        gives us the change in the </a:t>
+            </a:r>
+            <a:r>
+              <a:rPr lang="en-US" sz="2800" b="1" dirty="0">
+                <a:latin typeface="PFDinTextCompPro-Italic"/>
+                <a:cs typeface="PFDinTextCompPro-Italic"/>
+              </a:rPr>
+              <a:t>odds</a:t>
+            </a:r>
+            <a:r>
+              <a:rPr lang="en-US" sz="2800" dirty="0">
+                <a:latin typeface="PFDinTextCompPro-Italic"/>
+                <a:cs typeface="PFDinTextCompPro-Italic"/>
+              </a:rPr>
+              <a:t> for a unit change in x. </a:t>
+            </a:r>
+          </a:p>
+          <a:p>
+            <a:pPr algn="l"/>
+            <a:endParaRPr lang="en-US" sz="2800" dirty="0">
+              <a:latin typeface="PFDinTextCompPro-Italic"/>
+              <a:cs typeface="PFDinTextCompPro-Italic"/>
+            </a:endParaRPr>
           </a:p>
         </p:txBody>
       </p:sp>
@@ -11847,277 +11974,6 @@
           </a:p>
         </p:txBody>
       </p:sp>
-    </p:spTree>
-    <p:extLst>
-      <p:ext uri="{BB962C8B-B14F-4D97-AF65-F5344CB8AC3E}">
-        <p14:creationId xmlns:p14="http://schemas.microsoft.com/office/powerpoint/2010/main" val="371799518"/>
-      </p:ext>
-    </p:extLst>
-  </p:cSld>
-  <p:clrMapOvr>
-    <a:masterClrMapping/>
-  </p:clrMapOvr>
-  <p:transition/>
-</p:sld>
-</file>
-
-<file path=ppt/slides/slide24.xml><?xml version="1.0" encoding="utf-8"?>
-<p:sld xmlns:a="http://schemas.openxmlformats.org/drawingml/2006/main" xmlns:r="http://schemas.openxmlformats.org/officeDocument/2006/relationships" xmlns:p="http://schemas.openxmlformats.org/presentationml/2006/main">
-  <p:cSld>
-    <p:spTree>
-      <p:nvGrpSpPr>
-        <p:cNvPr id="1" name=""/>
-        <p:cNvGrpSpPr/>
-        <p:nvPr/>
-      </p:nvGrpSpPr>
-      <p:grpSpPr>
-        <a:xfrm>
-          <a:off x="0" y="0"/>
-          <a:ext cx="0" cy="0"/>
-          <a:chOff x="0" y="0"/>
-          <a:chExt cx="0" cy="0"/>
-        </a:xfrm>
-      </p:grpSpPr>
-      <p:sp>
-        <p:nvSpPr>
-          <p:cNvPr id="8" name="Slide Number Placeholder 3"/>
-          <p:cNvSpPr>
-            <a:spLocks noGrp="1"/>
-          </p:cNvSpPr>
-          <p:nvPr>
-            <p:ph type="sldNum" sz="quarter" idx="13"/>
-          </p:nvPr>
-        </p:nvSpPr>
-        <p:spPr/>
-        <p:txBody>
-          <a:bodyPr/>
-          <a:lstStyle/>
-          <a:p>
-            <a:pPr>
-              <a:defRPr/>
-            </a:pPr>
-            <a:fld id="{BD5AD749-DAD1-6A4A-A2AA-CB20EAD0AEB7}" type="slidenum">
-              <a:rPr lang="en-US"/>
-              <a:pPr>
-                <a:defRPr/>
-              </a:pPr>
-              <a:t>24</a:t>
-            </a:fld>
-            <a:endParaRPr lang="en-US"/>
-          </a:p>
-        </p:txBody>
-      </p:sp>
-      <p:sp>
-        <p:nvSpPr>
-          <p:cNvPr id="9" name="TextBox 8"/>
-          <p:cNvSpPr txBox="1"/>
-          <p:nvPr/>
-        </p:nvSpPr>
-        <p:spPr>
-          <a:xfrm>
-            <a:off x="737969" y="1444545"/>
-            <a:ext cx="10914507" cy="3539430"/>
-          </a:xfrm>
-          <a:prstGeom prst="rect">
-            <a:avLst/>
-          </a:prstGeom>
-          <a:noFill/>
-        </p:spPr>
-        <p:txBody>
-          <a:bodyPr wrap="square" rtlCol="0">
-            <a:spAutoFit/>
-          </a:bodyPr>
-          <a:lstStyle/>
-          <a:p>
-            <a:pPr algn="l"/>
-            <a:r>
-              <a:rPr lang="en-US" sz="2800" dirty="0">
-                <a:latin typeface="PFDinTextCompPro-Italic"/>
-                <a:cs typeface="PFDinTextCompPro-Italic"/>
-              </a:rPr>
-              <a:t>In linear regression, the parameter </a:t>
-            </a:r>
-            <a:r>
-              <a:rPr lang="en-US" sz="2800" i="1" dirty="0">
-                <a:latin typeface="Symbol" charset="2"/>
-                <a:cs typeface="Symbol" charset="2"/>
-              </a:rPr>
-              <a:t>b</a:t>
-            </a:r>
-            <a:r>
-              <a:rPr lang="en-US" sz="2800" i="1" baseline="-25000" dirty="0">
-                <a:latin typeface="Symbol" charset="2"/>
-                <a:cs typeface="Symbol" charset="2"/>
-              </a:rPr>
-              <a:t>1</a:t>
-            </a:r>
-            <a:r>
-              <a:rPr lang="en-US" sz="2800" dirty="0">
-                <a:latin typeface="PFDinTextCompPro-Italic"/>
-                <a:cs typeface="PFDinTextCompPro-Italic"/>
-              </a:rPr>
-              <a:t> represents the change in the </a:t>
-            </a:r>
-            <a:r>
-              <a:rPr lang="en-US" sz="2800" b="1" dirty="0">
-                <a:latin typeface="PFDinTextCompPro-Italic"/>
-                <a:cs typeface="PFDinTextCompPro-Italic"/>
-              </a:rPr>
-              <a:t>response variable </a:t>
-            </a:r>
-            <a:r>
-              <a:rPr lang="en-US" sz="2800" dirty="0">
-                <a:latin typeface="PFDinTextCompPro-Italic"/>
-                <a:cs typeface="PFDinTextCompPro-Italic"/>
-              </a:rPr>
-              <a:t>for a unit change in x.</a:t>
-            </a:r>
-          </a:p>
-          <a:p>
-            <a:pPr algn="l"/>
-            <a:endParaRPr lang="en-US" sz="2800" dirty="0">
-              <a:latin typeface="PFDinTextCompPro-Italic"/>
-              <a:cs typeface="PFDinTextCompPro-Italic"/>
-            </a:endParaRPr>
-          </a:p>
-          <a:p>
-            <a:pPr algn="l"/>
-            <a:r>
-              <a:rPr lang="en-US" sz="2800" dirty="0">
-                <a:latin typeface="PFDinTextCompPro-Italic"/>
-                <a:cs typeface="PFDinTextCompPro-Italic"/>
-              </a:rPr>
-              <a:t>In logistic regression, </a:t>
-            </a:r>
-            <a:r>
-              <a:rPr lang="en-US" sz="2800" i="1" dirty="0">
-                <a:latin typeface="Symbol" charset="2"/>
-                <a:cs typeface="Symbol" charset="2"/>
-              </a:rPr>
-              <a:t>b</a:t>
-            </a:r>
-            <a:r>
-              <a:rPr lang="en-US" sz="2800" i="1" baseline="-25000" dirty="0">
-                <a:latin typeface="Symbol" charset="2"/>
-                <a:cs typeface="Symbol" charset="2"/>
-              </a:rPr>
-              <a:t>1</a:t>
-            </a:r>
-            <a:r>
-              <a:rPr lang="en-US" sz="2800" dirty="0">
-                <a:latin typeface="PFDinTextCompPro-Italic"/>
-                <a:cs typeface="PFDinTextCompPro-Italic"/>
-              </a:rPr>
-              <a:t> represents the change in the </a:t>
-            </a:r>
-            <a:r>
-              <a:rPr lang="en-US" sz="2800" b="1" dirty="0">
-                <a:latin typeface="PFDinTextCompPro-Italic"/>
-                <a:cs typeface="PFDinTextCompPro-Italic"/>
-              </a:rPr>
-              <a:t>log-odds </a:t>
-            </a:r>
-            <a:r>
-              <a:rPr lang="en-US" sz="2800" dirty="0">
-                <a:latin typeface="PFDinTextCompPro-Italic"/>
-                <a:cs typeface="PFDinTextCompPro-Italic"/>
-              </a:rPr>
-              <a:t>for a unit change in x.</a:t>
-            </a:r>
-          </a:p>
-          <a:p>
-            <a:pPr algn="l"/>
-            <a:endParaRPr lang="en-US" sz="2800" dirty="0">
-              <a:latin typeface="PFDinTextCompPro-Italic"/>
-              <a:cs typeface="PFDinTextCompPro-Italic"/>
-            </a:endParaRPr>
-          </a:p>
-          <a:p>
-            <a:r>
-              <a:rPr lang="en-US" sz="2800" dirty="0">
-                <a:latin typeface="PFDinTextCompPro-Italic"/>
-                <a:cs typeface="PFDinTextCompPro-Italic"/>
-              </a:rPr>
-              <a:t>This means that        gives us the change in the </a:t>
-            </a:r>
-            <a:r>
-              <a:rPr lang="en-US" sz="2800" b="1" dirty="0">
-                <a:latin typeface="PFDinTextCompPro-Italic"/>
-                <a:cs typeface="PFDinTextCompPro-Italic"/>
-              </a:rPr>
-              <a:t>odds</a:t>
-            </a:r>
-            <a:r>
-              <a:rPr lang="en-US" sz="2800" dirty="0">
-                <a:latin typeface="PFDinTextCompPro-Italic"/>
-                <a:cs typeface="PFDinTextCompPro-Italic"/>
-              </a:rPr>
-              <a:t> for a unit change in x. </a:t>
-            </a:r>
-          </a:p>
-          <a:p>
-            <a:pPr algn="l"/>
-            <a:endParaRPr lang="en-US" sz="2800" dirty="0">
-              <a:latin typeface="PFDinTextCompPro-Italic"/>
-              <a:cs typeface="PFDinTextCompPro-Italic"/>
-            </a:endParaRPr>
-          </a:p>
-        </p:txBody>
-      </p:sp>
-      <p:sp>
-        <p:nvSpPr>
-          <p:cNvPr id="7" name="Title 1">
-            <a:extLst>
-              <a:ext uri="{FF2B5EF4-FFF2-40B4-BE49-F238E27FC236}">
-                <a16:creationId xmlns:a16="http://schemas.microsoft.com/office/drawing/2014/main" id="{ECB81EE5-4CBA-424D-B483-290AEFA97C85}"/>
-              </a:ext>
-            </a:extLst>
-          </p:cNvPr>
-          <p:cNvSpPr txBox="1">
-            <a:spLocks/>
-          </p:cNvSpPr>
-          <p:nvPr/>
-        </p:nvSpPr>
-        <p:spPr>
-          <a:xfrm>
-            <a:off x="838200" y="365125"/>
-            <a:ext cx="10515600" cy="1325563"/>
-          </a:xfrm>
-          <a:prstGeom prst="rect">
-            <a:avLst/>
-          </a:prstGeom>
-        </p:spPr>
-        <p:txBody>
-          <a:bodyPr vert="horz" lIns="0" tIns="32914" rIns="65828" bIns="32914" rtlCol="0" anchor="ctr">
-            <a:normAutofit/>
-          </a:bodyPr>
-          <a:lstStyle>
-            <a:lvl1pPr algn="l" defTabSz="914400" rtl="0" eaLnBrk="1" latinLnBrk="0" hangingPunct="1">
-              <a:lnSpc>
-                <a:spcPts val="4686"/>
-              </a:lnSpc>
-              <a:spcBef>
-                <a:spcPct val="0"/>
-              </a:spcBef>
-              <a:buNone/>
-              <a:defRPr sz="5078" b="1" kern="1200" cap="all" baseline="0">
-                <a:solidFill>
-                  <a:schemeClr val="tx1"/>
-                </a:solidFill>
-                <a:latin typeface="+mj-lt"/>
-                <a:ea typeface="+mj-ea"/>
-                <a:cs typeface="+mj-cs"/>
-              </a:defRPr>
-            </a:lvl1pPr>
-          </a:lstStyle>
-          <a:p>
-            <a:r>
-              <a:rPr lang="en-US" sz="4000" b="0" cap="none" dirty="0"/>
-              <a:t>Interpreting results	</a:t>
-            </a:r>
-          </a:p>
-        </p:txBody>
-      </p:sp>
       <p:graphicFrame>
         <p:nvGraphicFramePr>
           <p:cNvPr id="5" name="Object 4">
@@ -12146,7 +12002,7 @@
           <a:graphicData uri="http://schemas.openxmlformats.org/presentationml/2006/ole">
             <mc:AlternateContent xmlns:mc="http://schemas.openxmlformats.org/markup-compatibility/2006">
               <mc:Choice xmlns:v="urn:schemas-microsoft-com:vml" Requires="v">
-                <p:oleObj spid="_x0000_s31751" name="Equation" r:id="rId4" imgW="215640" imgH="203040" progId="Equation.3">
+                <p:oleObj spid="_x0000_s31753" name="Equation" r:id="rId4" imgW="215640" imgH="203040" progId="Equation.3">
                   <p:embed/>
                 </p:oleObj>
               </mc:Choice>
@@ -12202,7 +12058,7 @@
 </p:sld>
 </file>
 
-<file path=ppt/slides/slide25.xml><?xml version="1.0" encoding="utf-8"?>
+<file path=ppt/slides/slide24.xml><?xml version="1.0" encoding="utf-8"?>
 <p:sld xmlns:a="http://schemas.openxmlformats.org/drawingml/2006/main" xmlns:r="http://schemas.openxmlformats.org/officeDocument/2006/relationships" xmlns:p="http://schemas.openxmlformats.org/presentationml/2006/main">
   <p:cSld>
     <p:spTree>
@@ -12242,7 +12098,7 @@
               <a:pPr>
                 <a:defRPr/>
               </a:pPr>
-              <a:t>25</a:t>
+              <a:t>24</a:t>
             </a:fld>
             <a:endParaRPr lang="en-US"/>
           </a:p>
@@ -12373,6 +12229,228 @@
     <p:extLst>
       <p:ext uri="{BB962C8B-B14F-4D97-AF65-F5344CB8AC3E}">
         <p14:creationId xmlns:p14="http://schemas.microsoft.com/office/powerpoint/2010/main" val="2118288806"/>
+      </p:ext>
+    </p:extLst>
+  </p:cSld>
+  <p:clrMapOvr>
+    <a:masterClrMapping/>
+  </p:clrMapOvr>
+  <p:transition/>
+</p:sld>
+</file>
+
+<file path=ppt/slides/slide25.xml><?xml version="1.0" encoding="utf-8"?>
+<p:sld xmlns:a="http://schemas.openxmlformats.org/drawingml/2006/main" xmlns:r="http://schemas.openxmlformats.org/officeDocument/2006/relationships" xmlns:p="http://schemas.openxmlformats.org/presentationml/2006/main">
+  <p:cSld>
+    <p:spTree>
+      <p:nvGrpSpPr>
+        <p:cNvPr id="1" name=""/>
+        <p:cNvGrpSpPr/>
+        <p:nvPr/>
+      </p:nvGrpSpPr>
+      <p:grpSpPr>
+        <a:xfrm>
+          <a:off x="0" y="0"/>
+          <a:ext cx="0" cy="0"/>
+          <a:chOff x="0" y="0"/>
+          <a:chExt cx="0" cy="0"/>
+        </a:xfrm>
+      </p:grpSpPr>
+      <p:sp>
+        <p:nvSpPr>
+          <p:cNvPr id="8" name="Slide Number Placeholder 3"/>
+          <p:cNvSpPr>
+            <a:spLocks noGrp="1"/>
+          </p:cNvSpPr>
+          <p:nvPr>
+            <p:ph type="sldNum" sz="quarter" idx="13"/>
+          </p:nvPr>
+        </p:nvSpPr>
+        <p:spPr/>
+        <p:txBody>
+          <a:bodyPr/>
+          <a:lstStyle/>
+          <a:p>
+            <a:pPr>
+              <a:defRPr/>
+            </a:pPr>
+            <a:fld id="{BD5AD749-DAD1-6A4A-A2AA-CB20EAD0AEB7}" type="slidenum">
+              <a:rPr lang="en-US"/>
+              <a:pPr>
+                <a:defRPr/>
+              </a:pPr>
+              <a:t>25</a:t>
+            </a:fld>
+            <a:endParaRPr lang="en-US"/>
+          </a:p>
+        </p:txBody>
+      </p:sp>
+      <p:sp>
+        <p:nvSpPr>
+          <p:cNvPr id="9" name="TextBox 8"/>
+          <p:cNvSpPr txBox="1"/>
+          <p:nvPr/>
+        </p:nvSpPr>
+        <p:spPr>
+          <a:xfrm>
+            <a:off x="737969" y="1444545"/>
+            <a:ext cx="10615831" cy="3970318"/>
+          </a:xfrm>
+          <a:prstGeom prst="rect">
+            <a:avLst/>
+          </a:prstGeom>
+          <a:noFill/>
+        </p:spPr>
+        <p:txBody>
+          <a:bodyPr wrap="square" rtlCol="0">
+            <a:spAutoFit/>
+          </a:bodyPr>
+          <a:lstStyle/>
+          <a:p>
+            <a:pPr algn="l"/>
+            <a:r>
+              <a:rPr lang="en-US" sz="2800" b="1" dirty="0">
+                <a:latin typeface="PFDinTextCompPro-Italic"/>
+                <a:cs typeface="PFDinTextCompPro-Italic"/>
+              </a:rPr>
+              <a:t>Example: </a:t>
+            </a:r>
+            <a:r>
+              <a:rPr lang="en-US" sz="2800" dirty="0">
+                <a:latin typeface="PFDinTextCompPro-Italic"/>
+                <a:cs typeface="PFDinTextCompPro-Italic"/>
+              </a:rPr>
+              <a:t>Suppose we are interested in mobile purchase behavior. Let y be a class label denoting purchase/no purchase, and let x denote whether phone was an iPhone.</a:t>
+            </a:r>
+          </a:p>
+          <a:p>
+            <a:pPr algn="l"/>
+            <a:endParaRPr lang="en-US" sz="2800" dirty="0">
+              <a:latin typeface="PFDinTextCompPro-Italic"/>
+              <a:cs typeface="PFDinTextCompPro-Italic"/>
+            </a:endParaRPr>
+          </a:p>
+          <a:p>
+            <a:r>
+              <a:rPr lang="en-US" sz="2800" dirty="0">
+                <a:latin typeface="PFDinTextCompPro-Italic"/>
+                <a:cs typeface="PFDinTextCompPro-Italic"/>
+              </a:rPr>
+              <a:t>We perform a logistic regression, and we get </a:t>
+            </a:r>
+            <a:r>
+              <a:rPr lang="en-US" sz="2800" i="1" dirty="0">
+                <a:latin typeface="Symbol" charset="2"/>
+                <a:cs typeface="Symbol" charset="2"/>
+              </a:rPr>
+              <a:t>b</a:t>
+            </a:r>
+            <a:r>
+              <a:rPr lang="en-US" sz="2800" i="1" baseline="-25000" dirty="0">
+                <a:latin typeface="Symbol" charset="2"/>
+                <a:cs typeface="Symbol" charset="2"/>
+              </a:rPr>
+              <a:t>1 </a:t>
+            </a:r>
+            <a:r>
+              <a:rPr lang="en-US" sz="2800" dirty="0">
+                <a:latin typeface="PFDinTextCompPro-Italic"/>
+                <a:cs typeface="PFDinTextCompPro-Italic"/>
+              </a:rPr>
+              <a:t>= 0.693. </a:t>
+            </a:r>
+          </a:p>
+          <a:p>
+            <a:endParaRPr lang="en-US" sz="2800" dirty="0">
+              <a:latin typeface="PFDinTextCompPro-Italic"/>
+              <a:cs typeface="PFDinTextCompPro-Italic"/>
+            </a:endParaRPr>
+          </a:p>
+          <a:p>
+            <a:r>
+              <a:rPr lang="en-US" sz="2800" i="1" dirty="0">
+                <a:solidFill>
+                  <a:srgbClr val="FF0000"/>
+                </a:solidFill>
+                <a:latin typeface="PFDinTextCompPro-Italic"/>
+                <a:cs typeface="PFDinTextCompPro-Italic"/>
+              </a:rPr>
+              <a:t>Q: What does this mean?</a:t>
+            </a:r>
+          </a:p>
+          <a:p>
+            <a:endParaRPr lang="en-US" sz="2800" dirty="0">
+              <a:latin typeface="PFDinTextCompPro-Italic"/>
+              <a:cs typeface="PFDinTextCompPro-Italic"/>
+            </a:endParaRPr>
+          </a:p>
+          <a:p>
+            <a:pPr algn="l"/>
+            <a:endParaRPr lang="en-US" sz="2800" dirty="0">
+              <a:latin typeface="PFDinTextCompPro-Italic"/>
+              <a:cs typeface="PFDinTextCompPro-Italic"/>
+            </a:endParaRPr>
+          </a:p>
+        </p:txBody>
+      </p:sp>
+      <p:sp>
+        <p:nvSpPr>
+          <p:cNvPr id="7" name="Title 1">
+            <a:extLst>
+              <a:ext uri="{FF2B5EF4-FFF2-40B4-BE49-F238E27FC236}">
+                <a16:creationId xmlns:a16="http://schemas.microsoft.com/office/drawing/2014/main" id="{386CF521-526C-F74D-A43A-3D13FB020E4C}"/>
+              </a:ext>
+            </a:extLst>
+          </p:cNvPr>
+          <p:cNvSpPr txBox="1">
+            <a:spLocks/>
+          </p:cNvSpPr>
+          <p:nvPr/>
+        </p:nvSpPr>
+        <p:spPr>
+          <a:xfrm>
+            <a:off x="838200" y="365125"/>
+            <a:ext cx="10515600" cy="1325563"/>
+          </a:xfrm>
+          <a:prstGeom prst="rect">
+            <a:avLst/>
+          </a:prstGeom>
+        </p:spPr>
+        <p:txBody>
+          <a:bodyPr vert="horz" lIns="0" tIns="32914" rIns="65828" bIns="32914" rtlCol="0" anchor="ctr">
+            <a:normAutofit/>
+          </a:bodyPr>
+          <a:lstStyle>
+            <a:lvl1pPr algn="l" defTabSz="914400" rtl="0" eaLnBrk="1" latinLnBrk="0" hangingPunct="1">
+              <a:lnSpc>
+                <a:spcPts val="4686"/>
+              </a:lnSpc>
+              <a:spcBef>
+                <a:spcPct val="0"/>
+              </a:spcBef>
+              <a:buNone/>
+              <a:defRPr sz="5078" b="1" kern="1200" cap="all" baseline="0">
+                <a:solidFill>
+                  <a:schemeClr val="tx1"/>
+                </a:solidFill>
+                <a:latin typeface="+mj-lt"/>
+                <a:ea typeface="+mj-ea"/>
+                <a:cs typeface="+mj-cs"/>
+              </a:defRPr>
+            </a:lvl1pPr>
+          </a:lstStyle>
+          <a:p>
+            <a:r>
+              <a:rPr lang="en-US" sz="4000" b="0" cap="none" dirty="0"/>
+              <a:t>Interpreting results	</a:t>
+            </a:r>
+          </a:p>
+        </p:txBody>
+      </p:sp>
+    </p:spTree>
+    <p:extLst>
+      <p:ext uri="{BB962C8B-B14F-4D97-AF65-F5344CB8AC3E}">
+        <p14:creationId xmlns:p14="http://schemas.microsoft.com/office/powerpoint/2010/main" val="1258470820"/>
       </p:ext>
     </p:extLst>
   </p:cSld>
@@ -12438,7 +12516,7 @@
         <p:spPr>
           <a:xfrm>
             <a:off x="737969" y="1444545"/>
-            <a:ext cx="10615831" cy="3970318"/>
+            <a:ext cx="10615831" cy="4832092"/>
           </a:xfrm>
           <a:prstGeom prst="rect">
             <a:avLst/>
@@ -12527,6 +12605,36 @@
               <a:latin typeface="PFDinTextCompPro-Italic"/>
               <a:cs typeface="PFDinTextCompPro-Italic"/>
             </a:endParaRPr>
+          </a:p>
+          <a:p>
+            <a:r>
+              <a:rPr lang="en-US" sz="2800" dirty="0">
+                <a:latin typeface="PFDinTextCompPro-Italic"/>
+                <a:cs typeface="PFDinTextCompPro-Italic"/>
+              </a:rPr>
+              <a:t>In this case the odds ratio is </a:t>
+            </a:r>
+            <a:r>
+              <a:rPr lang="en-US" sz="2800" i="1" dirty="0" err="1">
+                <a:latin typeface="PFDinTextCompPro-Italic"/>
+                <a:cs typeface="PFDinTextCompPro-Italic"/>
+              </a:rPr>
+              <a:t>exp</a:t>
+            </a:r>
+            <a:r>
+              <a:rPr lang="en-US" sz="2800" i="1" dirty="0">
+                <a:latin typeface="PFDinTextCompPro-Italic"/>
+                <a:cs typeface="PFDinTextCompPro-Italic"/>
+              </a:rPr>
+              <a:t>(0.693) = 2</a:t>
+            </a:r>
+            <a:r>
+              <a:rPr lang="en-US" sz="2800" dirty="0">
+                <a:latin typeface="PFDinTextCompPro-Italic"/>
+                <a:cs typeface="PFDinTextCompPro-Italic"/>
+              </a:rPr>
+              <a:t>, meaning the likelihood of purchase is twice as high if the phone is an iPhone.</a:t>
+            </a:r>
           </a:p>
           <a:p>
             <a:pPr algn="l"/>
@@ -12594,7 +12702,7 @@
     </p:spTree>
     <p:extLst>
       <p:ext uri="{BB962C8B-B14F-4D97-AF65-F5344CB8AC3E}">
-        <p14:creationId xmlns:p14="http://schemas.microsoft.com/office/powerpoint/2010/main" val="1258470820"/>
+        <p14:creationId xmlns:p14="http://schemas.microsoft.com/office/powerpoint/2010/main" val="3197161377"/>
       </p:ext>
     </p:extLst>
   </p:cSld>
@@ -12660,258 +12768,6 @@
         <p:spPr>
           <a:xfrm>
             <a:off x="737969" y="1444545"/>
-            <a:ext cx="10615831" cy="4832092"/>
-          </a:xfrm>
-          <a:prstGeom prst="rect">
-            <a:avLst/>
-          </a:prstGeom>
-          <a:noFill/>
-        </p:spPr>
-        <p:txBody>
-          <a:bodyPr wrap="square" rtlCol="0">
-            <a:spAutoFit/>
-          </a:bodyPr>
-          <a:lstStyle/>
-          <a:p>
-            <a:pPr algn="l"/>
-            <a:r>
-              <a:rPr lang="en-US" sz="2800" b="1" dirty="0">
-                <a:latin typeface="PFDinTextCompPro-Italic"/>
-                <a:cs typeface="PFDinTextCompPro-Italic"/>
-              </a:rPr>
-              <a:t>Example: </a:t>
-            </a:r>
-            <a:r>
-              <a:rPr lang="en-US" sz="2800" dirty="0">
-                <a:latin typeface="PFDinTextCompPro-Italic"/>
-                <a:cs typeface="PFDinTextCompPro-Italic"/>
-              </a:rPr>
-              <a:t>Suppose we are interested in mobile purchase behavior. Let y be a class label denoting purchase/no purchase, and let x denote whether phone was an iPhone.</a:t>
-            </a:r>
-          </a:p>
-          <a:p>
-            <a:pPr algn="l"/>
-            <a:endParaRPr lang="en-US" sz="2800" dirty="0">
-              <a:latin typeface="PFDinTextCompPro-Italic"/>
-              <a:cs typeface="PFDinTextCompPro-Italic"/>
-            </a:endParaRPr>
-          </a:p>
-          <a:p>
-            <a:r>
-              <a:rPr lang="en-US" sz="2800" dirty="0">
-                <a:latin typeface="PFDinTextCompPro-Italic"/>
-                <a:cs typeface="PFDinTextCompPro-Italic"/>
-              </a:rPr>
-              <a:t>We perform a logistic regression, and we get </a:t>
-            </a:r>
-            <a:r>
-              <a:rPr lang="en-US" sz="2800" i="1" dirty="0">
-                <a:latin typeface="Symbol" charset="2"/>
-                <a:cs typeface="Symbol" charset="2"/>
-              </a:rPr>
-              <a:t>b</a:t>
-            </a:r>
-            <a:r>
-              <a:rPr lang="en-US" sz="2800" i="1" baseline="-25000" dirty="0">
-                <a:latin typeface="Symbol" charset="2"/>
-                <a:cs typeface="Symbol" charset="2"/>
-              </a:rPr>
-              <a:t>1 </a:t>
-            </a:r>
-            <a:r>
-              <a:rPr lang="en-US" sz="2800" dirty="0">
-                <a:latin typeface="PFDinTextCompPro-Italic"/>
-                <a:cs typeface="PFDinTextCompPro-Italic"/>
-              </a:rPr>
-              <a:t>= 0.693. </a:t>
-            </a:r>
-          </a:p>
-          <a:p>
-            <a:endParaRPr lang="en-US" sz="2800" dirty="0">
-              <a:latin typeface="PFDinTextCompPro-Italic"/>
-              <a:cs typeface="PFDinTextCompPro-Italic"/>
-            </a:endParaRPr>
-          </a:p>
-          <a:p>
-            <a:r>
-              <a:rPr lang="en-US" sz="2800" i="1" dirty="0">
-                <a:solidFill>
-                  <a:srgbClr val="FF0000"/>
-                </a:solidFill>
-                <a:latin typeface="PFDinTextCompPro-Italic"/>
-                <a:cs typeface="PFDinTextCompPro-Italic"/>
-              </a:rPr>
-              <a:t>Q: What does this mean?</a:t>
-            </a:r>
-          </a:p>
-          <a:p>
-            <a:endParaRPr lang="en-US" sz="2800" dirty="0">
-              <a:latin typeface="PFDinTextCompPro-Italic"/>
-              <a:cs typeface="PFDinTextCompPro-Italic"/>
-            </a:endParaRPr>
-          </a:p>
-          <a:p>
-            <a:r>
-              <a:rPr lang="en-US" sz="2800" dirty="0">
-                <a:latin typeface="PFDinTextCompPro-Italic"/>
-                <a:cs typeface="PFDinTextCompPro-Italic"/>
-              </a:rPr>
-              <a:t>In this case the odds ratio is </a:t>
-            </a:r>
-            <a:r>
-              <a:rPr lang="en-US" sz="2800" i="1" dirty="0" err="1">
-                <a:latin typeface="PFDinTextCompPro-Italic"/>
-                <a:cs typeface="PFDinTextCompPro-Italic"/>
-              </a:rPr>
-              <a:t>exp</a:t>
-            </a:r>
-            <a:r>
-              <a:rPr lang="en-US" sz="2800" i="1" dirty="0">
-                <a:latin typeface="PFDinTextCompPro-Italic"/>
-                <a:cs typeface="PFDinTextCompPro-Italic"/>
-              </a:rPr>
-              <a:t>(0.693) = 2</a:t>
-            </a:r>
-            <a:r>
-              <a:rPr lang="en-US" sz="2800" dirty="0">
-                <a:latin typeface="PFDinTextCompPro-Italic"/>
-                <a:cs typeface="PFDinTextCompPro-Italic"/>
-              </a:rPr>
-              <a:t>, meaning the likelihood of purchase is twice as high if the phone is an iPhone.</a:t>
-            </a:r>
-          </a:p>
-          <a:p>
-            <a:pPr algn="l"/>
-            <a:endParaRPr lang="en-US" sz="2800" dirty="0">
-              <a:latin typeface="PFDinTextCompPro-Italic"/>
-              <a:cs typeface="PFDinTextCompPro-Italic"/>
-            </a:endParaRPr>
-          </a:p>
-        </p:txBody>
-      </p:sp>
-      <p:sp>
-        <p:nvSpPr>
-          <p:cNvPr id="7" name="Title 1">
-            <a:extLst>
-              <a:ext uri="{FF2B5EF4-FFF2-40B4-BE49-F238E27FC236}">
-                <a16:creationId xmlns:a16="http://schemas.microsoft.com/office/drawing/2014/main" id="{386CF521-526C-F74D-A43A-3D13FB020E4C}"/>
-              </a:ext>
-            </a:extLst>
-          </p:cNvPr>
-          <p:cNvSpPr txBox="1">
-            <a:spLocks/>
-          </p:cNvSpPr>
-          <p:nvPr/>
-        </p:nvSpPr>
-        <p:spPr>
-          <a:xfrm>
-            <a:off x="838200" y="365125"/>
-            <a:ext cx="10515600" cy="1325563"/>
-          </a:xfrm>
-          <a:prstGeom prst="rect">
-            <a:avLst/>
-          </a:prstGeom>
-        </p:spPr>
-        <p:txBody>
-          <a:bodyPr vert="horz" lIns="0" tIns="32914" rIns="65828" bIns="32914" rtlCol="0" anchor="ctr">
-            <a:normAutofit/>
-          </a:bodyPr>
-          <a:lstStyle>
-            <a:lvl1pPr algn="l" defTabSz="914400" rtl="0" eaLnBrk="1" latinLnBrk="0" hangingPunct="1">
-              <a:lnSpc>
-                <a:spcPts val="4686"/>
-              </a:lnSpc>
-              <a:spcBef>
-                <a:spcPct val="0"/>
-              </a:spcBef>
-              <a:buNone/>
-              <a:defRPr sz="5078" b="1" kern="1200" cap="all" baseline="0">
-                <a:solidFill>
-                  <a:schemeClr val="tx1"/>
-                </a:solidFill>
-                <a:latin typeface="+mj-lt"/>
-                <a:ea typeface="+mj-ea"/>
-                <a:cs typeface="+mj-cs"/>
-              </a:defRPr>
-            </a:lvl1pPr>
-          </a:lstStyle>
-          <a:p>
-            <a:r>
-              <a:rPr lang="en-US" sz="4000" b="0" cap="none" dirty="0"/>
-              <a:t>Interpreting results	</a:t>
-            </a:r>
-          </a:p>
-        </p:txBody>
-      </p:sp>
-    </p:spTree>
-    <p:extLst>
-      <p:ext uri="{BB962C8B-B14F-4D97-AF65-F5344CB8AC3E}">
-        <p14:creationId xmlns:p14="http://schemas.microsoft.com/office/powerpoint/2010/main" val="3197161377"/>
-      </p:ext>
-    </p:extLst>
-  </p:cSld>
-  <p:clrMapOvr>
-    <a:masterClrMapping/>
-  </p:clrMapOvr>
-  <p:transition/>
-</p:sld>
-</file>
-
-<file path=ppt/slides/slide28.xml><?xml version="1.0" encoding="utf-8"?>
-<p:sld xmlns:a="http://schemas.openxmlformats.org/drawingml/2006/main" xmlns:r="http://schemas.openxmlformats.org/officeDocument/2006/relationships" xmlns:p="http://schemas.openxmlformats.org/presentationml/2006/main">
-  <p:cSld>
-    <p:spTree>
-      <p:nvGrpSpPr>
-        <p:cNvPr id="1" name=""/>
-        <p:cNvGrpSpPr/>
-        <p:nvPr/>
-      </p:nvGrpSpPr>
-      <p:grpSpPr>
-        <a:xfrm>
-          <a:off x="0" y="0"/>
-          <a:ext cx="0" cy="0"/>
-          <a:chOff x="0" y="0"/>
-          <a:chExt cx="0" cy="0"/>
-        </a:xfrm>
-      </p:grpSpPr>
-      <p:sp>
-        <p:nvSpPr>
-          <p:cNvPr id="8" name="Slide Number Placeholder 3"/>
-          <p:cNvSpPr>
-            <a:spLocks noGrp="1"/>
-          </p:cNvSpPr>
-          <p:nvPr>
-            <p:ph type="sldNum" sz="quarter" idx="13"/>
-          </p:nvPr>
-        </p:nvSpPr>
-        <p:spPr/>
-        <p:txBody>
-          <a:bodyPr/>
-          <a:lstStyle/>
-          <a:p>
-            <a:pPr>
-              <a:defRPr/>
-            </a:pPr>
-            <a:fld id="{BD5AD749-DAD1-6A4A-A2AA-CB20EAD0AEB7}" type="slidenum">
-              <a:rPr lang="en-US"/>
-              <a:pPr>
-                <a:defRPr/>
-              </a:pPr>
-              <a:t>28</a:t>
-            </a:fld>
-            <a:endParaRPr lang="en-US"/>
-          </a:p>
-        </p:txBody>
-      </p:sp>
-      <p:sp>
-        <p:nvSpPr>
-          <p:cNvPr id="9" name="TextBox 8"/>
-          <p:cNvSpPr txBox="1"/>
-          <p:nvPr/>
-        </p:nvSpPr>
-        <p:spPr>
-          <a:xfrm>
-            <a:off x="737969" y="1444545"/>
             <a:ext cx="10914507" cy="830997"/>
           </a:xfrm>
           <a:prstGeom prst="rect">
@@ -12954,7 +12810,7 @@
           <a:graphicData uri="http://schemas.openxmlformats.org/presentationml/2006/ole">
             <mc:AlternateContent xmlns:mc="http://schemas.openxmlformats.org/markup-compatibility/2006">
               <mc:Choice xmlns:v="urn:schemas-microsoft-com:vml" Requires="v">
-                <p:oleObj spid="_x0000_s18442" name="Equation" r:id="rId4" imgW="2425680" imgH="393480" progId="Equation.3">
+                <p:oleObj spid="_x0000_s18444" name="Equation" r:id="rId4" imgW="2425680" imgH="393480" progId="Equation.3">
                   <p:embed/>
                 </p:oleObj>
               </mc:Choice>
@@ -13164,7 +13020,7 @@
 </p:sld>
 </file>
 
-<file path=ppt/slides/slide29.xml><?xml version="1.0" encoding="utf-8"?>
+<file path=ppt/slides/slide28.xml><?xml version="1.0" encoding="utf-8"?>
 <p:sld xmlns:a="http://schemas.openxmlformats.org/drawingml/2006/main" xmlns:r="http://schemas.openxmlformats.org/officeDocument/2006/relationships" xmlns:p="http://schemas.openxmlformats.org/presentationml/2006/main">
   <p:cSld>
     <p:spTree>
@@ -13204,7 +13060,7 @@
               <a:pPr>
                 <a:defRPr/>
               </a:pPr>
-              <a:t>29</a:t>
+              <a:t>28</a:t>
             </a:fld>
             <a:endParaRPr lang="en-US"/>
           </a:p>
@@ -13265,7 +13121,7 @@
           <a:graphicData uri="http://schemas.openxmlformats.org/presentationml/2006/ole">
             <mc:AlternateContent xmlns:mc="http://schemas.openxmlformats.org/markup-compatibility/2006">
               <mc:Choice xmlns:v="urn:schemas-microsoft-com:vml" Requires="v">
-                <p:oleObj spid="_x0000_s19473" name="Equation" r:id="rId4" imgW="2425680" imgH="393480" progId="Equation.3">
+                <p:oleObj spid="_x0000_s19477" name="Equation" r:id="rId4" imgW="2425680" imgH="393480" progId="Equation.3">
                   <p:embed/>
                 </p:oleObj>
               </mc:Choice>
@@ -13344,7 +13200,7 @@
           <a:graphicData uri="http://schemas.openxmlformats.org/presentationml/2006/ole">
             <mc:AlternateContent xmlns:mc="http://schemas.openxmlformats.org/markup-compatibility/2006">
               <mc:Choice xmlns:v="urn:schemas-microsoft-com:vml" Requires="v">
-                <p:oleObj spid="_x0000_s19474" name="Equation" r:id="rId6" imgW="1523880" imgH="444240" progId="Equation.3">
+                <p:oleObj spid="_x0000_s19478" name="Equation" r:id="rId6" imgW="1523880" imgH="444240" progId="Equation.3">
                   <p:embed/>
                 </p:oleObj>
               </mc:Choice>
@@ -13547,7 +13403,7 @@
 </p:sld>
 </file>
 
-<file path=ppt/slides/slide3.xml><?xml version="1.0" encoding="utf-8"?>
+<file path=ppt/slides/slide29.xml><?xml version="1.0" encoding="utf-8"?>
 <p:sld xmlns:a="http://schemas.openxmlformats.org/drawingml/2006/main" xmlns:r="http://schemas.openxmlformats.org/officeDocument/2006/relationships" xmlns:p="http://schemas.openxmlformats.org/presentationml/2006/main">
   <p:cSld>
     <p:spTree>
@@ -13587,203 +13443,7 @@
               <a:pPr>
                 <a:defRPr/>
               </a:pPr>
-              <a:t>3</a:t>
-            </a:fld>
-            <a:endParaRPr lang="en-US"/>
-          </a:p>
-        </p:txBody>
-      </p:sp>
-      <p:sp>
-        <p:nvSpPr>
-          <p:cNvPr id="9" name="TextBox 8"/>
-          <p:cNvSpPr txBox="1"/>
-          <p:nvPr/>
-        </p:nvSpPr>
-        <p:spPr>
-          <a:xfrm>
-            <a:off x="737969" y="1444545"/>
-            <a:ext cx="10914507" cy="1815882"/>
-          </a:xfrm>
-          <a:prstGeom prst="rect">
-            <a:avLst/>
-          </a:prstGeom>
-          <a:noFill/>
-        </p:spPr>
-        <p:txBody>
-          <a:bodyPr wrap="square" rtlCol="0">
-            <a:spAutoFit/>
-          </a:bodyPr>
-          <a:lstStyle/>
-          <a:p>
-            <a:pPr algn="l"/>
-            <a:r>
-              <a:rPr lang="en-US" sz="2800" dirty="0">
-                <a:latin typeface="PFDinTextCompPro-Italic"/>
-                <a:cs typeface="PFDinTextCompPro-Italic"/>
-              </a:rPr>
-              <a:t>Q:  What is </a:t>
-            </a:r>
-            <a:r>
-              <a:rPr lang="en-US" sz="2800" dirty="0">
-                <a:latin typeface="PFDinTextCompPro-Medium"/>
-                <a:cs typeface="PFDinTextCompPro-Medium"/>
-              </a:rPr>
-              <a:t>logistic regression</a:t>
-            </a:r>
-            <a:r>
-              <a:rPr lang="en-US" sz="2800" dirty="0">
-                <a:latin typeface="PFDinTextCompPro-Italic"/>
-                <a:cs typeface="PFDinTextCompPro-Italic"/>
-              </a:rPr>
-              <a:t>?</a:t>
-            </a:r>
-          </a:p>
-          <a:p>
-            <a:pPr algn="l"/>
-            <a:endParaRPr lang="en-US" sz="2800" dirty="0">
-              <a:latin typeface="PFDinTextCompPro-Italic"/>
-              <a:cs typeface="PFDinTextCompPro-Italic"/>
-            </a:endParaRPr>
-          </a:p>
-          <a:p>
-            <a:pPr algn="l"/>
-            <a:r>
-              <a:rPr lang="en-US" sz="2800" dirty="0">
-                <a:latin typeface="PFDinTextCompPro-Italic"/>
-                <a:cs typeface="PFDinTextCompPro-Italic"/>
-              </a:rPr>
-              <a:t>A:  A generalization of the linear regression model to </a:t>
-            </a:r>
-            <a:r>
-              <a:rPr lang="en-US" sz="2800" i="1" dirty="0">
-                <a:latin typeface="PFDinTextCompPro-Italic"/>
-                <a:cs typeface="PFDinTextCompPro-Italic"/>
-              </a:rPr>
-              <a:t>classification</a:t>
-            </a:r>
-            <a:r>
-              <a:rPr lang="en-US" sz="2800" dirty="0">
-                <a:latin typeface="PFDinTextCompPro-Italic"/>
-                <a:cs typeface="PFDinTextCompPro-Italic"/>
-              </a:rPr>
-              <a:t> problems.</a:t>
-            </a:r>
-          </a:p>
-        </p:txBody>
-      </p:sp>
-      <p:sp>
-        <p:nvSpPr>
-          <p:cNvPr id="7" name="Title 1">
-            <a:extLst>
-              <a:ext uri="{FF2B5EF4-FFF2-40B4-BE49-F238E27FC236}">
-                <a16:creationId xmlns:a16="http://schemas.microsoft.com/office/drawing/2014/main" id="{45FB7D67-50C4-CE4C-A4BC-5F26B5AACD42}"/>
-              </a:ext>
-            </a:extLst>
-          </p:cNvPr>
-          <p:cNvSpPr txBox="1">
-            <a:spLocks/>
-          </p:cNvSpPr>
-          <p:nvPr/>
-        </p:nvSpPr>
-        <p:spPr>
-          <a:xfrm>
-            <a:off x="838200" y="365125"/>
-            <a:ext cx="10515600" cy="1325563"/>
-          </a:xfrm>
-          <a:prstGeom prst="rect">
-            <a:avLst/>
-          </a:prstGeom>
-        </p:spPr>
-        <p:txBody>
-          <a:bodyPr vert="horz" lIns="0" tIns="32914" rIns="65828" bIns="32914" rtlCol="0" anchor="ctr">
-            <a:normAutofit/>
-          </a:bodyPr>
-          <a:lstStyle>
-            <a:lvl1pPr algn="l" defTabSz="914400" rtl="0" eaLnBrk="1" latinLnBrk="0" hangingPunct="1">
-              <a:lnSpc>
-                <a:spcPts val="4686"/>
-              </a:lnSpc>
-              <a:spcBef>
-                <a:spcPct val="0"/>
-              </a:spcBef>
-              <a:buNone/>
-              <a:defRPr sz="5078" b="1" kern="1200" cap="all" baseline="0">
-                <a:solidFill>
-                  <a:schemeClr val="tx1"/>
-                </a:solidFill>
-                <a:latin typeface="+mj-lt"/>
-                <a:ea typeface="+mj-ea"/>
-                <a:cs typeface="+mj-cs"/>
-              </a:defRPr>
-            </a:lvl1pPr>
-          </a:lstStyle>
-          <a:p>
-            <a:r>
-              <a:rPr lang="en-US" sz="4400" b="0" cap="none" dirty="0"/>
-              <a:t>Logistic</a:t>
-            </a:r>
-            <a:r>
-              <a:rPr lang="en-US" b="0" cap="none" dirty="0"/>
-              <a:t> Regression	</a:t>
-            </a:r>
-          </a:p>
-        </p:txBody>
-      </p:sp>
-    </p:spTree>
-    <p:extLst>
-      <p:ext uri="{BB962C8B-B14F-4D97-AF65-F5344CB8AC3E}">
-        <p14:creationId xmlns:p14="http://schemas.microsoft.com/office/powerpoint/2010/main" val="613315195"/>
-      </p:ext>
-    </p:extLst>
-  </p:cSld>
-  <p:clrMapOvr>
-    <a:masterClrMapping/>
-  </p:clrMapOvr>
-  <p:transition/>
-</p:sld>
-</file>
-
-<file path=ppt/slides/slide30.xml><?xml version="1.0" encoding="utf-8"?>
-<p:sld xmlns:a="http://schemas.openxmlformats.org/drawingml/2006/main" xmlns:r="http://schemas.openxmlformats.org/officeDocument/2006/relationships" xmlns:p="http://schemas.openxmlformats.org/presentationml/2006/main">
-  <p:cSld>
-    <p:spTree>
-      <p:nvGrpSpPr>
-        <p:cNvPr id="1" name=""/>
-        <p:cNvGrpSpPr/>
-        <p:nvPr/>
-      </p:nvGrpSpPr>
-      <p:grpSpPr>
-        <a:xfrm>
-          <a:off x="0" y="0"/>
-          <a:ext cx="0" cy="0"/>
-          <a:chOff x="0" y="0"/>
-          <a:chExt cx="0" cy="0"/>
-        </a:xfrm>
-      </p:grpSpPr>
-      <p:sp>
-        <p:nvSpPr>
-          <p:cNvPr id="8" name="Slide Number Placeholder 3"/>
-          <p:cNvSpPr>
-            <a:spLocks noGrp="1"/>
-          </p:cNvSpPr>
-          <p:nvPr>
-            <p:ph type="sldNum" sz="quarter" idx="13"/>
-          </p:nvPr>
-        </p:nvSpPr>
-        <p:spPr/>
-        <p:txBody>
-          <a:bodyPr/>
-          <a:lstStyle/>
-          <a:p>
-            <a:pPr>
-              <a:defRPr/>
-            </a:pPr>
-            <a:fld id="{BD5AD749-DAD1-6A4A-A2AA-CB20EAD0AEB7}" type="slidenum">
-              <a:rPr lang="en-US"/>
-              <a:pPr>
-                <a:defRPr/>
-              </a:pPr>
-              <a:t>30</a:t>
+              <a:t>29</a:t>
             </a:fld>
             <a:endParaRPr lang="en-US"/>
           </a:p>
@@ -14149,9 +13809,53 @@
           </a:lstStyle>
           <a:p>
             <a:r>
+              <a:rPr lang="en-US" sz="4000" b="0" cap="none"/>
+              <a:t>Predicting default - </a:t>
+            </a:r>
+            <a:r>
+              <a:rPr lang="en-US" sz="4000" b="0" cap="none">
+                <a:solidFill>
+                  <a:srgbClr val="FF0000"/>
+                </a:solidFill>
+              </a:rPr>
+              <a:t>Optional</a:t>
+            </a:r>
+            <a:r>
               <a:rPr lang="en-US" sz="4000" b="0" cap="none" dirty="0"/>
-              <a:t>Predicting default	</a:t>
-            </a:r>
+              <a:t>	</a:t>
+            </a:r>
+          </a:p>
+        </p:txBody>
+      </p:sp>
+      <p:sp>
+        <p:nvSpPr>
+          <p:cNvPr id="3" name="TextBox 2">
+            <a:extLst>
+              <a:ext uri="{FF2B5EF4-FFF2-40B4-BE49-F238E27FC236}">
+                <a16:creationId xmlns:a16="http://schemas.microsoft.com/office/drawing/2014/main" id="{D97FD616-A9B1-8B48-8820-0E1B73853179}"/>
+              </a:ext>
+            </a:extLst>
+          </p:cNvPr>
+          <p:cNvSpPr txBox="1"/>
+          <p:nvPr/>
+        </p:nvSpPr>
+        <p:spPr>
+          <a:xfrm>
+            <a:off x="4572000" y="957431"/>
+            <a:ext cx="184731" cy="369332"/>
+          </a:xfrm>
+          <a:prstGeom prst="rect">
+            <a:avLst/>
+          </a:prstGeom>
+          <a:noFill/>
+        </p:spPr>
+        <p:txBody>
+          <a:bodyPr wrap="none" rtlCol="0">
+            <a:spAutoFit/>
+          </a:bodyPr>
+          <a:lstStyle/>
+          <a:p>
+            <a:endParaRPr lang="en-US" dirty="0"/>
           </a:p>
         </p:txBody>
       </p:sp>
@@ -14159,6 +13863,421 @@
     <p:extLst>
       <p:ext uri="{BB962C8B-B14F-4D97-AF65-F5344CB8AC3E}">
         <p14:creationId xmlns:p14="http://schemas.microsoft.com/office/powerpoint/2010/main" val="32281959"/>
+      </p:ext>
+    </p:extLst>
+  </p:cSld>
+  <p:clrMapOvr>
+    <a:masterClrMapping/>
+  </p:clrMapOvr>
+  <p:transition/>
+</p:sld>
+</file>
+
+<file path=ppt/slides/slide3.xml><?xml version="1.0" encoding="utf-8"?>
+<p:sld xmlns:a="http://schemas.openxmlformats.org/drawingml/2006/main" xmlns:r="http://schemas.openxmlformats.org/officeDocument/2006/relationships" xmlns:p="http://schemas.openxmlformats.org/presentationml/2006/main">
+  <p:cSld>
+    <p:spTree>
+      <p:nvGrpSpPr>
+        <p:cNvPr id="1" name=""/>
+        <p:cNvGrpSpPr/>
+        <p:nvPr/>
+      </p:nvGrpSpPr>
+      <p:grpSpPr>
+        <a:xfrm>
+          <a:off x="0" y="0"/>
+          <a:ext cx="0" cy="0"/>
+          <a:chOff x="0" y="0"/>
+          <a:chExt cx="0" cy="0"/>
+        </a:xfrm>
+      </p:grpSpPr>
+      <p:sp>
+        <p:nvSpPr>
+          <p:cNvPr id="8" name="Slide Number Placeholder 3"/>
+          <p:cNvSpPr>
+            <a:spLocks noGrp="1"/>
+          </p:cNvSpPr>
+          <p:nvPr>
+            <p:ph type="sldNum" sz="quarter" idx="13"/>
+          </p:nvPr>
+        </p:nvSpPr>
+        <p:spPr/>
+        <p:txBody>
+          <a:bodyPr/>
+          <a:lstStyle/>
+          <a:p>
+            <a:pPr>
+              <a:defRPr/>
+            </a:pPr>
+            <a:fld id="{BD5AD749-DAD1-6A4A-A2AA-CB20EAD0AEB7}" type="slidenum">
+              <a:rPr lang="en-US"/>
+              <a:pPr>
+                <a:defRPr/>
+              </a:pPr>
+              <a:t>3</a:t>
+            </a:fld>
+            <a:endParaRPr lang="en-US"/>
+          </a:p>
+        </p:txBody>
+      </p:sp>
+      <p:sp>
+        <p:nvSpPr>
+          <p:cNvPr id="9" name="TextBox 8"/>
+          <p:cNvSpPr txBox="1"/>
+          <p:nvPr/>
+        </p:nvSpPr>
+        <p:spPr>
+          <a:xfrm>
+            <a:off x="737969" y="1444545"/>
+            <a:ext cx="10914507" cy="1815882"/>
+          </a:xfrm>
+          <a:prstGeom prst="rect">
+            <a:avLst/>
+          </a:prstGeom>
+          <a:noFill/>
+        </p:spPr>
+        <p:txBody>
+          <a:bodyPr wrap="square" rtlCol="0">
+            <a:spAutoFit/>
+          </a:bodyPr>
+          <a:lstStyle/>
+          <a:p>
+            <a:pPr algn="l"/>
+            <a:r>
+              <a:rPr lang="en-US" sz="2800" dirty="0">
+                <a:latin typeface="PFDinTextCompPro-Italic"/>
+                <a:cs typeface="PFDinTextCompPro-Italic"/>
+              </a:rPr>
+              <a:t>Q:  What is </a:t>
+            </a:r>
+            <a:r>
+              <a:rPr lang="en-US" sz="2800" dirty="0">
+                <a:latin typeface="PFDinTextCompPro-Medium"/>
+                <a:cs typeface="PFDinTextCompPro-Medium"/>
+              </a:rPr>
+              <a:t>logistic regression</a:t>
+            </a:r>
+            <a:r>
+              <a:rPr lang="en-US" sz="2800" dirty="0">
+                <a:latin typeface="PFDinTextCompPro-Italic"/>
+                <a:cs typeface="PFDinTextCompPro-Italic"/>
+              </a:rPr>
+              <a:t>?</a:t>
+            </a:r>
+          </a:p>
+          <a:p>
+            <a:pPr algn="l"/>
+            <a:endParaRPr lang="en-US" sz="2800" dirty="0">
+              <a:latin typeface="PFDinTextCompPro-Italic"/>
+              <a:cs typeface="PFDinTextCompPro-Italic"/>
+            </a:endParaRPr>
+          </a:p>
+          <a:p>
+            <a:pPr algn="l"/>
+            <a:r>
+              <a:rPr lang="en-US" sz="2800" dirty="0">
+                <a:latin typeface="PFDinTextCompPro-Italic"/>
+                <a:cs typeface="PFDinTextCompPro-Italic"/>
+              </a:rPr>
+              <a:t>A:  A generalization of the linear regression model to </a:t>
+            </a:r>
+            <a:r>
+              <a:rPr lang="en-US" sz="2800" i="1" dirty="0">
+                <a:latin typeface="PFDinTextCompPro-Italic"/>
+                <a:cs typeface="PFDinTextCompPro-Italic"/>
+              </a:rPr>
+              <a:t>classification</a:t>
+            </a:r>
+            <a:r>
+              <a:rPr lang="en-US" sz="2800" dirty="0">
+                <a:latin typeface="PFDinTextCompPro-Italic"/>
+                <a:cs typeface="PFDinTextCompPro-Italic"/>
+              </a:rPr>
+              <a:t> problems.</a:t>
+            </a:r>
+          </a:p>
+        </p:txBody>
+      </p:sp>
+      <p:sp>
+        <p:nvSpPr>
+          <p:cNvPr id="7" name="Title 1">
+            <a:extLst>
+              <a:ext uri="{FF2B5EF4-FFF2-40B4-BE49-F238E27FC236}">
+                <a16:creationId xmlns:a16="http://schemas.microsoft.com/office/drawing/2014/main" id="{45FB7D67-50C4-CE4C-A4BC-5F26B5AACD42}"/>
+              </a:ext>
+            </a:extLst>
+          </p:cNvPr>
+          <p:cNvSpPr txBox="1">
+            <a:spLocks/>
+          </p:cNvSpPr>
+          <p:nvPr/>
+        </p:nvSpPr>
+        <p:spPr>
+          <a:xfrm>
+            <a:off x="838200" y="365125"/>
+            <a:ext cx="10515600" cy="1325563"/>
+          </a:xfrm>
+          <a:prstGeom prst="rect">
+            <a:avLst/>
+          </a:prstGeom>
+        </p:spPr>
+        <p:txBody>
+          <a:bodyPr vert="horz" lIns="0" tIns="32914" rIns="65828" bIns="32914" rtlCol="0" anchor="ctr">
+            <a:normAutofit/>
+          </a:bodyPr>
+          <a:lstStyle>
+            <a:lvl1pPr algn="l" defTabSz="914400" rtl="0" eaLnBrk="1" latinLnBrk="0" hangingPunct="1">
+              <a:lnSpc>
+                <a:spcPts val="4686"/>
+              </a:lnSpc>
+              <a:spcBef>
+                <a:spcPct val="0"/>
+              </a:spcBef>
+              <a:buNone/>
+              <a:defRPr sz="5078" b="1" kern="1200" cap="all" baseline="0">
+                <a:solidFill>
+                  <a:schemeClr val="tx1"/>
+                </a:solidFill>
+                <a:latin typeface="+mj-lt"/>
+                <a:ea typeface="+mj-ea"/>
+                <a:cs typeface="+mj-cs"/>
+              </a:defRPr>
+            </a:lvl1pPr>
+          </a:lstStyle>
+          <a:p>
+            <a:r>
+              <a:rPr lang="en-US" sz="4400" b="0" cap="none" dirty="0"/>
+              <a:t>Logistic</a:t>
+            </a:r>
+            <a:r>
+              <a:rPr lang="en-US" b="0" cap="none" dirty="0"/>
+              <a:t> Regression	</a:t>
+            </a:r>
+          </a:p>
+        </p:txBody>
+      </p:sp>
+    </p:spTree>
+    <p:extLst>
+      <p:ext uri="{BB962C8B-B14F-4D97-AF65-F5344CB8AC3E}">
+        <p14:creationId xmlns:p14="http://schemas.microsoft.com/office/powerpoint/2010/main" val="613315195"/>
+      </p:ext>
+    </p:extLst>
+  </p:cSld>
+  <p:clrMapOvr>
+    <a:masterClrMapping/>
+  </p:clrMapOvr>
+  <p:transition/>
+</p:sld>
+</file>
+
+<file path=ppt/slides/slide30.xml><?xml version="1.0" encoding="utf-8"?>
+<p:sld xmlns:a="http://schemas.openxmlformats.org/drawingml/2006/main" xmlns:r="http://schemas.openxmlformats.org/officeDocument/2006/relationships" xmlns:p="http://schemas.openxmlformats.org/presentationml/2006/main">
+  <p:cSld>
+    <p:spTree>
+      <p:nvGrpSpPr>
+        <p:cNvPr id="1" name=""/>
+        <p:cNvGrpSpPr/>
+        <p:nvPr/>
+      </p:nvGrpSpPr>
+      <p:grpSpPr>
+        <a:xfrm>
+          <a:off x="0" y="0"/>
+          <a:ext cx="0" cy="0"/>
+          <a:chOff x="0" y="0"/>
+          <a:chExt cx="0" cy="0"/>
+        </a:xfrm>
+      </p:grpSpPr>
+      <p:sp>
+        <p:nvSpPr>
+          <p:cNvPr id="8" name="Slide Number Placeholder 3"/>
+          <p:cNvSpPr>
+            <a:spLocks noGrp="1"/>
+          </p:cNvSpPr>
+          <p:nvPr>
+            <p:ph type="sldNum" sz="quarter" idx="13"/>
+          </p:nvPr>
+        </p:nvSpPr>
+        <p:spPr/>
+        <p:txBody>
+          <a:bodyPr/>
+          <a:lstStyle/>
+          <a:p>
+            <a:pPr>
+              <a:defRPr/>
+            </a:pPr>
+            <a:fld id="{BD5AD749-DAD1-6A4A-A2AA-CB20EAD0AEB7}" type="slidenum">
+              <a:rPr lang="en-US"/>
+              <a:pPr>
+                <a:defRPr/>
+              </a:pPr>
+              <a:t>30</a:t>
+            </a:fld>
+            <a:endParaRPr lang="en-US"/>
+          </a:p>
+        </p:txBody>
+      </p:sp>
+      <p:sp>
+        <p:nvSpPr>
+          <p:cNvPr id="9" name="TextBox 8"/>
+          <p:cNvSpPr txBox="1"/>
+          <p:nvPr/>
+        </p:nvSpPr>
+        <p:spPr>
+          <a:xfrm>
+            <a:off x="737969" y="1444545"/>
+            <a:ext cx="10914507" cy="3108543"/>
+          </a:xfrm>
+          <a:prstGeom prst="rect">
+            <a:avLst/>
+          </a:prstGeom>
+          <a:noFill/>
+        </p:spPr>
+        <p:txBody>
+          <a:bodyPr wrap="square" rtlCol="0">
+            <a:spAutoFit/>
+          </a:bodyPr>
+          <a:lstStyle/>
+          <a:p>
+            <a:pPr algn="l"/>
+            <a:r>
+              <a:rPr lang="en-US" sz="2800" b="1" dirty="0">
+                <a:latin typeface="PFDinTextCompPro-Italic"/>
+                <a:cs typeface="PFDinTextCompPro-Italic"/>
+              </a:rPr>
+              <a:t>Part I: Exploration</a:t>
+            </a:r>
+          </a:p>
+          <a:p>
+            <a:pPr marL="669735" indent="-669735">
+              <a:buAutoNum type="arabicParenR"/>
+            </a:pPr>
+            <a:r>
+              <a:rPr lang="en-US" sz="2800" dirty="0">
+                <a:latin typeface="PFDinTextCompPro-Italic"/>
+                <a:cs typeface="PFDinTextCompPro-Italic"/>
+              </a:rPr>
+              <a:t>Read in Default.csv and convert all data to numeric</a:t>
+            </a:r>
+          </a:p>
+          <a:p>
+            <a:pPr marL="669735" indent="-669735">
+              <a:buAutoNum type="arabicParenR"/>
+            </a:pPr>
+            <a:r>
+              <a:rPr lang="en-US" sz="2800" dirty="0">
+                <a:latin typeface="PFDinTextCompPro-Italic"/>
+                <a:cs typeface="PFDinTextCompPro-Italic"/>
+              </a:rPr>
+              <a:t>Split the data into train and test sets</a:t>
+            </a:r>
+          </a:p>
+          <a:p>
+            <a:pPr marL="669735" indent="-669735">
+              <a:buAutoNum type="arabicParenR"/>
+            </a:pPr>
+            <a:r>
+              <a:rPr lang="en-US" sz="2800" dirty="0">
+                <a:latin typeface="PFDinTextCompPro-Italic"/>
+                <a:cs typeface="PFDinTextCompPro-Italic"/>
+              </a:rPr>
+              <a:t>Create a histogram of all variables</a:t>
+            </a:r>
+          </a:p>
+          <a:p>
+            <a:pPr marL="669735" indent="-669735">
+              <a:buAutoNum type="arabicParenR"/>
+            </a:pPr>
+            <a:r>
+              <a:rPr lang="en-US" sz="2800" dirty="0">
+                <a:latin typeface="PFDinTextCompPro-Italic"/>
+                <a:cs typeface="PFDinTextCompPro-Italic"/>
+              </a:rPr>
+              <a:t>Create a scatter plot of the income vs. balance</a:t>
+            </a:r>
+          </a:p>
+          <a:p>
+            <a:pPr marL="669735" indent="-669735">
+              <a:buAutoNum type="arabicParenR"/>
+            </a:pPr>
+            <a:r>
+              <a:rPr lang="en-US" sz="2800" dirty="0">
+                <a:latin typeface="PFDinTextCompPro-Italic"/>
+                <a:cs typeface="PFDinTextCompPro-Italic"/>
+              </a:rPr>
+              <a:t>Mark defaults with a different color (and symbol)</a:t>
+            </a:r>
+          </a:p>
+          <a:p>
+            <a:pPr marL="669735" indent="-669735">
+              <a:buAutoNum type="arabicParenR"/>
+            </a:pPr>
+            <a:r>
+              <a:rPr lang="en-US" sz="2800" dirty="0">
+                <a:latin typeface="PFDinTextCompPro-Italic"/>
+                <a:cs typeface="PFDinTextCompPro-Italic"/>
+              </a:rPr>
+              <a:t>What can you infer from this plot?</a:t>
+            </a:r>
+          </a:p>
+        </p:txBody>
+      </p:sp>
+      <p:sp>
+        <p:nvSpPr>
+          <p:cNvPr id="7" name="Title 1">
+            <a:extLst>
+              <a:ext uri="{FF2B5EF4-FFF2-40B4-BE49-F238E27FC236}">
+                <a16:creationId xmlns:a16="http://schemas.microsoft.com/office/drawing/2014/main" id="{14250560-088A-FA43-9375-3D0559AC0C9F}"/>
+              </a:ext>
+            </a:extLst>
+          </p:cNvPr>
+          <p:cNvSpPr txBox="1">
+            <a:spLocks/>
+          </p:cNvSpPr>
+          <p:nvPr/>
+        </p:nvSpPr>
+        <p:spPr>
+          <a:xfrm>
+            <a:off x="838200" y="365125"/>
+            <a:ext cx="10515600" cy="1325563"/>
+          </a:xfrm>
+          <a:prstGeom prst="rect">
+            <a:avLst/>
+          </a:prstGeom>
+        </p:spPr>
+        <p:txBody>
+          <a:bodyPr vert="horz" lIns="0" tIns="32914" rIns="65828" bIns="32914" rtlCol="0" anchor="ctr">
+            <a:normAutofit/>
+          </a:bodyPr>
+          <a:lstStyle>
+            <a:lvl1pPr algn="l" defTabSz="914400" rtl="0" eaLnBrk="1" latinLnBrk="0" hangingPunct="1">
+              <a:lnSpc>
+                <a:spcPts val="4686"/>
+              </a:lnSpc>
+              <a:spcBef>
+                <a:spcPct val="0"/>
+              </a:spcBef>
+              <a:buNone/>
+              <a:defRPr sz="5078" b="1" kern="1200" cap="all" baseline="0">
+                <a:solidFill>
+                  <a:schemeClr val="tx1"/>
+                </a:solidFill>
+                <a:latin typeface="+mj-lt"/>
+                <a:ea typeface="+mj-ea"/>
+                <a:cs typeface="+mj-cs"/>
+              </a:defRPr>
+            </a:lvl1pPr>
+          </a:lstStyle>
+          <a:p>
+            <a:r>
+              <a:rPr lang="en-US" sz="4000" b="0" cap="none" dirty="0"/>
+              <a:t>Predicting default	</a:t>
+            </a:r>
+          </a:p>
+        </p:txBody>
+      </p:sp>
+    </p:spTree>
+    <p:extLst>
+      <p:ext uri="{BB962C8B-B14F-4D97-AF65-F5344CB8AC3E}">
+        <p14:creationId xmlns:p14="http://schemas.microsoft.com/office/powerpoint/2010/main" val="1445576111"/>
       </p:ext>
     </p:extLst>
   </p:cSld>
@@ -14223,8 +14342,8 @@
         </p:nvSpPr>
         <p:spPr>
           <a:xfrm>
-            <a:off x="737969" y="1444545"/>
-            <a:ext cx="10914507" cy="3108543"/>
+            <a:off x="737969" y="1444544"/>
+            <a:ext cx="10914507" cy="4901342"/>
           </a:xfrm>
           <a:prstGeom prst="rect">
             <a:avLst/>
@@ -14243,7 +14362,7 @@
                 <a:latin typeface="PFDinTextCompPro-Italic"/>
                 <a:cs typeface="PFDinTextCompPro-Italic"/>
               </a:rPr>
-              <a:t>Part I: Exploration</a:t>
+              <a:t>Part II: Logistic Regression</a:t>
             </a:r>
           </a:p>
           <a:p>
@@ -14255,59 +14374,80 @@
                 <a:latin typeface="PFDinTextCompPro-Italic"/>
                 <a:cs typeface="PFDinTextCompPro-Italic"/>
               </a:rPr>
-              <a:t>Read in Default.csv and convert all data to numeric</a:t>
-            </a:r>
-          </a:p>
-          <a:p>
-            <a:pPr marL="669735" indent="-669735">
-              <a:buAutoNum type="arabicParenR"/>
+              <a:t>Run a logistic regression on the balance variable </a:t>
+            </a:r>
+          </a:p>
+          <a:p>
+            <a:pPr marL="1482100" lvl="1" indent="-669735">
+              <a:buFont typeface="Arial" panose="020B0604020202020204" pitchFamily="34" charset="0"/>
+              <a:buChar char="•"/>
             </a:pPr>
             <a:r>
               <a:rPr lang="en-US" sz="2800" dirty="0">
                 <a:latin typeface="PFDinTextCompPro-Italic"/>
                 <a:cs typeface="PFDinTextCompPro-Italic"/>
               </a:rPr>
-              <a:t>Split the data into train and test sets</a:t>
-            </a:r>
-          </a:p>
-          <a:p>
-            <a:pPr marL="669735" indent="-669735">
-              <a:buAutoNum type="arabicParenR"/>
+              <a:t>Use the training set</a:t>
+            </a:r>
+          </a:p>
+          <a:p>
+            <a:pPr marL="1482100" lvl="1" indent="-669735">
+              <a:buFont typeface="Arial" panose="020B0604020202020204" pitchFamily="34" charset="0"/>
+              <a:buChar char="•"/>
             </a:pPr>
             <a:r>
               <a:rPr lang="en-US" sz="2800" dirty="0">
                 <a:latin typeface="PFDinTextCompPro-Italic"/>
                 <a:cs typeface="PFDinTextCompPro-Italic"/>
               </a:rPr>
-              <a:t>Create a histogram of all variables</a:t>
-            </a:r>
-          </a:p>
-          <a:p>
-            <a:pPr marL="669735" indent="-669735">
-              <a:buAutoNum type="arabicParenR"/>
-            </a:pPr>
+              <a:t>Use the </a:t>
+            </a:r>
+            <a:r>
+              <a:rPr lang="en-US" sz="2800" dirty="0" err="1">
+                <a:latin typeface="Courier MonoThai" panose="02070309020205020404" pitchFamily="49" charset="0"/>
+                <a:cs typeface="Courier MonoThai" panose="02070309020205020404" pitchFamily="49" charset="0"/>
+              </a:rPr>
+              <a:t>statsmodels.formula.api</a:t>
+            </a:r>
+            <a:r>
+              <a:rPr lang="en-US" sz="2800" dirty="0">
+                <a:latin typeface="Courier MonoThai" panose="02070309020205020404" pitchFamily="49" charset="0"/>
+                <a:cs typeface="Courier MonoThai" panose="02070309020205020404" pitchFamily="49" charset="0"/>
+              </a:rPr>
+              <a:t> </a:t>
+            </a:r>
             <a:r>
               <a:rPr lang="en-US" sz="2800" dirty="0">
                 <a:latin typeface="PFDinTextCompPro-Italic"/>
                 <a:cs typeface="PFDinTextCompPro-Italic"/>
               </a:rPr>
-              <a:t>Create a scatter plot of the income vs. balance</a:t>
-            </a:r>
-          </a:p>
-          <a:p>
-            <a:pPr marL="669735" indent="-669735">
-              <a:buAutoNum type="arabicParenR"/>
-            </a:pPr>
+              <a:t>module and </a:t>
+            </a:r>
+            <a:r>
+              <a:rPr lang="en-US" sz="2800" dirty="0" err="1">
+                <a:latin typeface="Courier MonoThai" panose="02070309020205020404" pitchFamily="49" charset="0"/>
+                <a:cs typeface="Courier MonoThai" panose="02070309020205020404" pitchFamily="49" charset="0"/>
+              </a:rPr>
+              <a:t>smf.logit</a:t>
+            </a:r>
+            <a:r>
+              <a:rPr lang="en-US" sz="2800" dirty="0">
+                <a:latin typeface="Courier MonoThai" panose="02070309020205020404" pitchFamily="49" charset="0"/>
+                <a:cs typeface="Courier MonoThai" panose="02070309020205020404" pitchFamily="49" charset="0"/>
+              </a:rPr>
+              <a:t>()</a:t>
+            </a:r>
             <a:r>
               <a:rPr lang="en-US" sz="2800" dirty="0">
                 <a:latin typeface="PFDinTextCompPro-Italic"/>
                 <a:cs typeface="PFDinTextCompPro-Italic"/>
               </a:rPr>
-              <a:t>Mark defaults with a different color (and symbol)</a:t>
+              <a:t>function</a:t>
             </a:r>
           </a:p>
           <a:p>
             <a:pPr marL="669735" indent="-669735">
+              <a:buFont typeface="+mj-lt"/>
               <a:buAutoNum type="arabicParenR"/>
             </a:pPr>
             <a:r>
@@ -14315,7 +14455,73 @@
                 <a:latin typeface="PFDinTextCompPro-Italic"/>
                 <a:cs typeface="PFDinTextCompPro-Italic"/>
               </a:rPr>
-              <a:t>What can you infer from this plot?</a:t>
+              <a:t>Is the </a:t>
+            </a:r>
+            <a:r>
+              <a:rPr lang="en-US" sz="2800" dirty="0">
+                <a:latin typeface="Symbol" panose="05050102010706020507" pitchFamily="18" charset="2"/>
+                <a:cs typeface="PFDinTextCompPro-Italic"/>
+              </a:rPr>
+              <a:t>b</a:t>
+            </a:r>
+            <a:r>
+              <a:rPr lang="en-US" sz="2800" dirty="0">
+                <a:latin typeface="PFDinTextCompPro-Italic"/>
+                <a:cs typeface="PFDinTextCompPro-Italic"/>
+              </a:rPr>
+              <a:t>  value associated with balance significant?</a:t>
+            </a:r>
+          </a:p>
+          <a:p>
+            <a:pPr marL="669735" indent="-669735">
+              <a:buFont typeface="+mj-lt"/>
+              <a:buAutoNum type="arabicParenR"/>
+            </a:pPr>
+            <a:r>
+              <a:rPr lang="en-US" sz="2800" dirty="0">
+                <a:latin typeface="PFDinTextCompPro-Italic"/>
+                <a:cs typeface="PFDinTextCompPro-Italic"/>
+              </a:rPr>
+              <a:t>Predict the probability of default for someone with a balance of $1.2k and $1.5k</a:t>
+            </a:r>
+          </a:p>
+          <a:p>
+            <a:pPr marL="669735" indent="-669735">
+              <a:buFont typeface="+mj-lt"/>
+              <a:buAutoNum type="arabicParenR"/>
+            </a:pPr>
+            <a:r>
+              <a:rPr lang="en-US" sz="2800" dirty="0">
+                <a:latin typeface="PFDinTextCompPro-Italic"/>
+                <a:cs typeface="PFDinTextCompPro-Italic"/>
+              </a:rPr>
+              <a:t>Plot the fitted logistic function overtop of the data points</a:t>
+            </a:r>
+          </a:p>
+          <a:p>
+            <a:pPr marL="669735" indent="-669735">
+              <a:buFont typeface="+mj-lt"/>
+              <a:buAutoNum type="arabicParenR"/>
+            </a:pPr>
+            <a:r>
+              <a:rPr lang="en-US" sz="2800" dirty="0">
+                <a:latin typeface="PFDinTextCompPro-Italic"/>
+                <a:cs typeface="PFDinTextCompPro-Italic"/>
+              </a:rPr>
+              <a:t>Create predictions using the test set</a:t>
+            </a:r>
+          </a:p>
+          <a:p>
+            <a:pPr marL="669735" indent="-669735">
+              <a:buFont typeface="+mj-lt"/>
+              <a:buAutoNum type="arabicParenR"/>
+            </a:pPr>
+            <a:r>
+              <a:rPr lang="en-US" sz="2800" dirty="0">
+                <a:latin typeface="PFDinTextCompPro-Italic"/>
+                <a:cs typeface="PFDinTextCompPro-Italic"/>
+              </a:rPr>
+              <a:t>Compute the overall accuracy, the sensitivity and specificity</a:t>
             </a:r>
           </a:p>
         </p:txBody>
@@ -14325,7 +14531,7 @@
           <p:cNvPr id="7" name="Title 1">
             <a:extLst>
               <a:ext uri="{FF2B5EF4-FFF2-40B4-BE49-F238E27FC236}">
-                <a16:creationId xmlns:a16="http://schemas.microsoft.com/office/drawing/2014/main" id="{14250560-088A-FA43-9375-3D0559AC0C9F}"/>
+                <a16:creationId xmlns:a16="http://schemas.microsoft.com/office/drawing/2014/main" id="{8321A24C-6B46-2C41-8368-FF432727FBAF}"/>
               </a:ext>
             </a:extLst>
           </p:cNvPr>
@@ -14369,7 +14575,7 @@
           <a:p>
             <a:r>
               <a:rPr lang="en-US" sz="4000" b="0" cap="none" dirty="0"/>
-              <a:t>Predicting default	</a:t>
+              <a:t>Predicting default: hands-on	</a:t>
             </a:r>
           </a:p>
         </p:txBody>
@@ -14377,7 +14583,7 @@
     </p:spTree>
     <p:extLst>
       <p:ext uri="{BB962C8B-B14F-4D97-AF65-F5344CB8AC3E}">
-        <p14:creationId xmlns:p14="http://schemas.microsoft.com/office/powerpoint/2010/main" val="1445576111"/>
+        <p14:creationId xmlns:p14="http://schemas.microsoft.com/office/powerpoint/2010/main" val="2599422496"/>
       </p:ext>
     </p:extLst>
   </p:cSld>
@@ -14442,8 +14648,8 @@
         </p:nvSpPr>
         <p:spPr>
           <a:xfrm>
-            <a:off x="737969" y="1444544"/>
-            <a:ext cx="10914507" cy="4901342"/>
+            <a:off x="737969" y="1444545"/>
+            <a:ext cx="10914507" cy="2246769"/>
           </a:xfrm>
           <a:prstGeom prst="rect">
             <a:avLst/>
@@ -14458,170 +14664,56 @@
           <a:p>
             <a:pPr algn="l"/>
             <a:r>
+              <a:rPr lang="en-US" sz="2800" dirty="0">
+                <a:latin typeface="PFDinTextCompPro-Italic"/>
+                <a:cs typeface="PFDinTextCompPro-Italic"/>
+              </a:rPr>
+              <a:t>Q: What is a Generalized Linear Model (GLM)?</a:t>
+            </a:r>
+          </a:p>
+          <a:p>
+            <a:pPr algn="l"/>
+            <a:endParaRPr lang="en-US" sz="2800" dirty="0">
+              <a:latin typeface="PFDinTextCompPro-Italic"/>
+              <a:cs typeface="PFDinTextCompPro-Italic"/>
+            </a:endParaRPr>
+          </a:p>
+          <a:p>
+            <a:pPr algn="l"/>
+            <a:r>
+              <a:rPr lang="en-US" sz="2800" dirty="0">
+                <a:latin typeface="PFDinTextCompPro-Italic"/>
+                <a:cs typeface="PFDinTextCompPro-Italic"/>
+              </a:rPr>
+              <a:t>A: GLMs generalize the distribution of the </a:t>
+            </a:r>
+            <a:r>
               <a:rPr lang="en-US" sz="2800" b="1" dirty="0">
                 <a:latin typeface="PFDinTextCompPro-Italic"/>
                 <a:cs typeface="PFDinTextCompPro-Italic"/>
               </a:rPr>
-              <a:t>Part II: Logistic Regression</a:t>
-            </a:r>
-          </a:p>
-          <a:p>
-            <a:pPr marL="669735" indent="-669735">
-              <a:buAutoNum type="arabicParenR"/>
-            </a:pPr>
+              <a:t>error term</a:t>
+            </a:r>
             <a:r>
               <a:rPr lang="en-US" sz="2800" dirty="0">
                 <a:latin typeface="PFDinTextCompPro-Italic"/>
                 <a:cs typeface="PFDinTextCompPro-Italic"/>
               </a:rPr>
-              <a:t>Run a logistic regression on the balance variable </a:t>
-            </a:r>
-          </a:p>
-          <a:p>
-            <a:pPr marL="1482100" lvl="1" indent="-669735">
-              <a:buFont typeface="Arial" panose="020B0604020202020204" pitchFamily="34" charset="0"/>
-              <a:buChar char="•"/>
-            </a:pPr>
+              <a:t>, and allow the conditional mean of the response variable to be related to the linear model by a </a:t>
+            </a:r>
+            <a:r>
+              <a:rPr lang="en-US" sz="2800" dirty="0">
+                <a:latin typeface="PFDinTextCompPro-Medium"/>
+                <a:cs typeface="PFDinTextCompPro-Medium"/>
+              </a:rPr>
+              <a:t>link function</a:t>
+            </a:r>
             <a:r>
               <a:rPr lang="en-US" sz="2800" dirty="0">
                 <a:latin typeface="PFDinTextCompPro-Italic"/>
                 <a:cs typeface="PFDinTextCompPro-Italic"/>
               </a:rPr>
-              <a:t>Use the training set</a:t>
-            </a:r>
-          </a:p>
-          <a:p>
-            <a:pPr marL="1482100" lvl="1" indent="-669735">
-              <a:buFont typeface="Arial" panose="020B0604020202020204" pitchFamily="34" charset="0"/>
-              <a:buChar char="•"/>
-            </a:pPr>
-            <a:r>
-              <a:rPr lang="en-US" sz="2800" dirty="0">
-                <a:latin typeface="PFDinTextCompPro-Italic"/>
-                <a:cs typeface="PFDinTextCompPro-Italic"/>
-              </a:rPr>
-              <a:t>Use the </a:t>
-            </a:r>
-            <a:r>
-              <a:rPr lang="en-US" sz="2800" dirty="0" err="1">
-                <a:latin typeface="Courier MonoThai" panose="02070309020205020404" pitchFamily="49" charset="0"/>
-                <a:cs typeface="Courier MonoThai" panose="02070309020205020404" pitchFamily="49" charset="0"/>
-              </a:rPr>
-              <a:t>statsmodels.formula.api</a:t>
-            </a:r>
-            <a:r>
-              <a:rPr lang="en-US" sz="2800" dirty="0">
-                <a:latin typeface="Courier MonoThai" panose="02070309020205020404" pitchFamily="49" charset="0"/>
-                <a:cs typeface="Courier MonoThai" panose="02070309020205020404" pitchFamily="49" charset="0"/>
-              </a:rPr>
-              <a:t> </a:t>
-            </a:r>
-            <a:r>
-              <a:rPr lang="en-US" sz="2800" dirty="0">
-                <a:latin typeface="PFDinTextCompPro-Italic"/>
-                <a:cs typeface="PFDinTextCompPro-Italic"/>
-              </a:rPr>
-              <a:t>module and </a:t>
-            </a:r>
-            <a:r>
-              <a:rPr lang="en-US" sz="2800" dirty="0" err="1">
-                <a:latin typeface="Courier MonoThai" panose="02070309020205020404" pitchFamily="49" charset="0"/>
-                <a:cs typeface="Courier MonoThai" panose="02070309020205020404" pitchFamily="49" charset="0"/>
-              </a:rPr>
-              <a:t>smf.logit</a:t>
-            </a:r>
-            <a:r>
-              <a:rPr lang="en-US" sz="2800" dirty="0">
-                <a:latin typeface="Courier MonoThai" panose="02070309020205020404" pitchFamily="49" charset="0"/>
-                <a:cs typeface="Courier MonoThai" panose="02070309020205020404" pitchFamily="49" charset="0"/>
-              </a:rPr>
-              <a:t>()</a:t>
-            </a:r>
-            <a:r>
-              <a:rPr lang="en-US" sz="2800" dirty="0">
-                <a:latin typeface="PFDinTextCompPro-Italic"/>
-                <a:cs typeface="PFDinTextCompPro-Italic"/>
-              </a:rPr>
-              <a:t>function</a:t>
-            </a:r>
-          </a:p>
-          <a:p>
-            <a:pPr marL="669735" indent="-669735">
-              <a:buFont typeface="+mj-lt"/>
-              <a:buAutoNum type="arabicParenR"/>
-            </a:pPr>
-            <a:r>
-              <a:rPr lang="en-US" sz="2800" dirty="0">
-                <a:latin typeface="PFDinTextCompPro-Italic"/>
-                <a:cs typeface="PFDinTextCompPro-Italic"/>
-              </a:rPr>
-              <a:t>Is the </a:t>
-            </a:r>
-            <a:r>
-              <a:rPr lang="en-US" sz="2800" dirty="0">
-                <a:latin typeface="Symbol" panose="05050102010706020507" pitchFamily="18" charset="2"/>
-                <a:cs typeface="PFDinTextCompPro-Italic"/>
-              </a:rPr>
-              <a:t>b</a:t>
-            </a:r>
-            <a:r>
-              <a:rPr lang="en-US" sz="2800" dirty="0">
-                <a:latin typeface="PFDinTextCompPro-Italic"/>
-                <a:cs typeface="PFDinTextCompPro-Italic"/>
-              </a:rPr>
-              <a:t>  value associated with balance significant?</a:t>
-            </a:r>
-          </a:p>
-          <a:p>
-            <a:pPr marL="669735" indent="-669735">
-              <a:buFont typeface="+mj-lt"/>
-              <a:buAutoNum type="arabicParenR"/>
-            </a:pPr>
-            <a:r>
-              <a:rPr lang="en-US" sz="2800" dirty="0">
-                <a:latin typeface="PFDinTextCompPro-Italic"/>
-                <a:cs typeface="PFDinTextCompPro-Italic"/>
-              </a:rPr>
-              <a:t>Predict the probability of default for someone with a balance of $1.2k and $1.5k</a:t>
-            </a:r>
-          </a:p>
-          <a:p>
-            <a:pPr marL="669735" indent="-669735">
-              <a:buFont typeface="+mj-lt"/>
-              <a:buAutoNum type="arabicParenR"/>
-            </a:pPr>
-            <a:r>
-              <a:rPr lang="en-US" sz="2800" dirty="0">
-                <a:latin typeface="PFDinTextCompPro-Italic"/>
-                <a:cs typeface="PFDinTextCompPro-Italic"/>
-              </a:rPr>
-              <a:t>Plot the fitted logistic function overtop of the data points</a:t>
-            </a:r>
-          </a:p>
-          <a:p>
-            <a:pPr marL="669735" indent="-669735">
-              <a:buFont typeface="+mj-lt"/>
-              <a:buAutoNum type="arabicParenR"/>
-            </a:pPr>
-            <a:r>
-              <a:rPr lang="en-US" sz="2800" dirty="0">
-                <a:latin typeface="PFDinTextCompPro-Italic"/>
-                <a:cs typeface="PFDinTextCompPro-Italic"/>
-              </a:rPr>
-              <a:t>Create predictions using the test set</a:t>
-            </a:r>
-          </a:p>
-          <a:p>
-            <a:pPr marL="669735" indent="-669735">
-              <a:buFont typeface="+mj-lt"/>
-              <a:buAutoNum type="arabicParenR"/>
-            </a:pPr>
-            <a:r>
-              <a:rPr lang="en-US" sz="2800" dirty="0">
-                <a:latin typeface="PFDinTextCompPro-Italic"/>
-                <a:cs typeface="PFDinTextCompPro-Italic"/>
-              </a:rPr>
-              <a:t>Compute the overall accuracy, the sensitivity and specificity</a:t>
+              <a:t>.</a:t>
             </a:r>
           </a:p>
         </p:txBody>
@@ -14631,7 +14723,7 @@
           <p:cNvPr id="7" name="Title 1">
             <a:extLst>
               <a:ext uri="{FF2B5EF4-FFF2-40B4-BE49-F238E27FC236}">
-                <a16:creationId xmlns:a16="http://schemas.microsoft.com/office/drawing/2014/main" id="{8321A24C-6B46-2C41-8368-FF432727FBAF}"/>
+                <a16:creationId xmlns:a16="http://schemas.microsoft.com/office/drawing/2014/main" id="{ED8DBD3E-C62E-8245-845A-E68F972125FA}"/>
               </a:ext>
             </a:extLst>
           </p:cNvPr>
@@ -14675,7 +14767,7 @@
           <a:p>
             <a:r>
               <a:rPr lang="en-US" sz="4000" b="0" cap="none" dirty="0"/>
-              <a:t>Predicting default: hands-on	</a:t>
+              <a:t>Predicting default: review</a:t>
             </a:r>
           </a:p>
         </p:txBody>
@@ -14683,7 +14775,7 @@
     </p:spTree>
     <p:extLst>
       <p:ext uri="{BB962C8B-B14F-4D97-AF65-F5344CB8AC3E}">
-        <p14:creationId xmlns:p14="http://schemas.microsoft.com/office/powerpoint/2010/main" val="2599422496"/>
+        <p14:creationId xmlns:p14="http://schemas.microsoft.com/office/powerpoint/2010/main" val="3351051001"/>
       </p:ext>
     </p:extLst>
   </p:cSld>
@@ -14768,7 +14860,7 @@
                 <a:latin typeface="PFDinTextCompPro-Italic"/>
                 <a:cs typeface="PFDinTextCompPro-Italic"/>
               </a:rPr>
-              <a:t>Q: What is a Generalized Linear Model (GLM)?</a:t>
+              <a:t>Q: What is the error distribution and link function for the logistic regression?</a:t>
             </a:r>
           </a:p>
           <a:p>
@@ -14785,35 +14877,36 @@
                 <a:latin typeface="PFDinTextCompPro-Italic"/>
                 <a:cs typeface="PFDinTextCompPro-Italic"/>
               </a:rPr>
-              <a:t>A: GLMs generalize the distribution of the </a:t>
-            </a:r>
-            <a:r>
-              <a:rPr lang="en-US" sz="2800" b="1" dirty="0">
-                <a:latin typeface="PFDinTextCompPro-Italic"/>
-                <a:cs typeface="PFDinTextCompPro-Italic"/>
-              </a:rPr>
-              <a:t>error term</a:t>
+              <a:t>A: The error term follows a </a:t>
             </a:r>
             <a:r>
               <a:rPr lang="en-US" sz="2800" dirty="0">
                 <a:latin typeface="PFDinTextCompPro-Italic"/>
                 <a:cs typeface="PFDinTextCompPro-Italic"/>
-              </a:rPr>
-              <a:t>, and allow the conditional mean of the response variable to be related to the linear model by a </a:t>
-            </a:r>
-            <a:r>
-              <a:rPr lang="en-US" sz="2800" dirty="0">
-                <a:latin typeface="PFDinTextCompPro-Medium"/>
-                <a:cs typeface="PFDinTextCompPro-Medium"/>
-              </a:rPr>
-              <a:t>link function</a:t>
+                <a:hlinkClick r:id="rId3"/>
+              </a:rPr>
+              <a:t>Bernoulli distribution</a:t>
             </a:r>
             <a:r>
               <a:rPr lang="en-US" sz="2800" dirty="0">
                 <a:latin typeface="PFDinTextCompPro-Italic"/>
                 <a:cs typeface="PFDinTextCompPro-Italic"/>
               </a:rPr>
-              <a:t>.</a:t>
+              <a:t>, and the </a:t>
+            </a:r>
+            <a:r>
+              <a:rPr lang="en-US" sz="2800" dirty="0" err="1">
+                <a:latin typeface="PFDinTextCompPro-Italic"/>
+                <a:cs typeface="PFDinTextCompPro-Italic"/>
+              </a:rPr>
+              <a:t>logit</a:t>
+            </a:r>
+            <a:r>
+              <a:rPr lang="en-US" sz="2800" dirty="0">
+                <a:latin typeface="PFDinTextCompPro-Italic"/>
+                <a:cs typeface="PFDinTextCompPro-Italic"/>
+              </a:rPr>
+              <a:t> is the link function that connects us to the linear predictor.</a:t>
             </a:r>
           </a:p>
         </p:txBody>
@@ -14823,7 +14916,7 @@
           <p:cNvPr id="7" name="Title 1">
             <a:extLst>
               <a:ext uri="{FF2B5EF4-FFF2-40B4-BE49-F238E27FC236}">
-                <a16:creationId xmlns:a16="http://schemas.microsoft.com/office/drawing/2014/main" id="{ED8DBD3E-C62E-8245-845A-E68F972125FA}"/>
+                <a16:creationId xmlns:a16="http://schemas.microsoft.com/office/drawing/2014/main" id="{59FB7312-DC1E-1340-A9C8-72D22528434B}"/>
               </a:ext>
             </a:extLst>
           </p:cNvPr>
@@ -14875,7 +14968,7 @@
     </p:spTree>
     <p:extLst>
       <p:ext uri="{BB962C8B-B14F-4D97-AF65-F5344CB8AC3E}">
-        <p14:creationId xmlns:p14="http://schemas.microsoft.com/office/powerpoint/2010/main" val="3351051001"/>
+        <p14:creationId xmlns:p14="http://schemas.microsoft.com/office/powerpoint/2010/main" val="1844714465"/>
       </p:ext>
     </p:extLst>
   </p:cSld>
@@ -14941,7 +15034,7 @@
         <p:spPr>
           <a:xfrm>
             <a:off x="737969" y="1444545"/>
-            <a:ext cx="10914507" cy="2246769"/>
+            <a:ext cx="10914507" cy="1815882"/>
           </a:xfrm>
           <a:prstGeom prst="rect">
             <a:avLst/>
@@ -14960,7 +15053,21 @@
                 <a:latin typeface="PFDinTextCompPro-Italic"/>
                 <a:cs typeface="PFDinTextCompPro-Italic"/>
               </a:rPr>
-              <a:t>Q: What is the error distribution and link function for the logistic regression?</a:t>
+              <a:t>Q: Is the </a:t>
+            </a:r>
+            <a:r>
+              <a:rPr lang="en-US" sz="2800" dirty="0" err="1">
+                <a:latin typeface="PFDinTextCompPro-Italic"/>
+                <a:cs typeface="PFDinTextCompPro-Italic"/>
+              </a:rPr>
+              <a:t>logit</a:t>
+            </a:r>
+            <a:r>
+              <a:rPr lang="en-US" sz="2800" dirty="0">
+                <a:latin typeface="PFDinTextCompPro-Italic"/>
+                <a:cs typeface="PFDinTextCompPro-Italic"/>
+              </a:rPr>
+              <a:t> the only link function used for the Bernoulli distribution?</a:t>
             </a:r>
           </a:p>
           <a:p>
@@ -14977,22 +15084,37 @@
                 <a:latin typeface="PFDinTextCompPro-Italic"/>
                 <a:cs typeface="PFDinTextCompPro-Italic"/>
               </a:rPr>
-              <a:t>A: The error term follows a </a:t>
+              <a:t>A: No, other link functions include the </a:t>
+            </a:r>
+            <a:r>
+              <a:rPr lang="en-US" sz="2800" dirty="0" err="1">
+                <a:latin typeface="PFDinTextCompPro-Italic"/>
+                <a:cs typeface="PFDinTextCompPro-Italic"/>
+                <a:hlinkClick r:id="rId3"/>
+              </a:rPr>
+              <a:t>probit</a:t>
             </a:r>
             <a:r>
               <a:rPr lang="en-US" sz="2800" dirty="0">
                 <a:latin typeface="PFDinTextCompPro-Italic"/>
                 <a:cs typeface="PFDinTextCompPro-Italic"/>
-                <a:hlinkClick r:id="rId3"/>
-              </a:rPr>
-              <a:t>Bernoulli distribution</a:t>
+              </a:rPr>
+              <a:t> the </a:t>
+            </a:r>
+            <a:r>
+              <a:rPr lang="en-US" sz="2800" dirty="0" err="1">
+                <a:latin typeface="PFDinTextCompPro-Italic"/>
+                <a:cs typeface="PFDinTextCompPro-Italic"/>
+                <a:hlinkClick r:id="rId4"/>
+              </a:rPr>
+              <a:t>tobit</a:t>
             </a:r>
             <a:r>
               <a:rPr lang="en-US" sz="2800" dirty="0">
                 <a:latin typeface="PFDinTextCompPro-Italic"/>
                 <a:cs typeface="PFDinTextCompPro-Italic"/>
               </a:rPr>
-              <a:t>, and the </a:t>
+              <a:t> model. However, the </a:t>
             </a:r>
             <a:r>
               <a:rPr lang="en-US" sz="2800" dirty="0" err="1">
@@ -15006,8 +15128,12 @@
                 <a:latin typeface="PFDinTextCompPro-Italic"/>
                 <a:cs typeface="PFDinTextCompPro-Italic"/>
               </a:rPr>
-              <a:t> is the link function that connects us to the linear predictor.</a:t>
-            </a:r>
+              <a:t> simplifies things nicely and is probably the most commonly used.</a:t>
+            </a:r>
+            <a:endParaRPr lang="en-US" sz="2800" b="1" dirty="0">
+              <a:latin typeface="PFDinTextCompPro-Italic"/>
+              <a:cs typeface="PFDinTextCompPro-Italic"/>
+            </a:endParaRPr>
           </a:p>
         </p:txBody>
       </p:sp>
@@ -15016,7 +15142,7 @@
           <p:cNvPr id="7" name="Title 1">
             <a:extLst>
               <a:ext uri="{FF2B5EF4-FFF2-40B4-BE49-F238E27FC236}">
-                <a16:creationId xmlns:a16="http://schemas.microsoft.com/office/drawing/2014/main" id="{59FB7312-DC1E-1340-A9C8-72D22528434B}"/>
+                <a16:creationId xmlns:a16="http://schemas.microsoft.com/office/drawing/2014/main" id="{BDDA7240-9A85-AA45-9C54-227D853D8D5F}"/>
               </a:ext>
             </a:extLst>
           </p:cNvPr>
@@ -15068,7 +15194,7 @@
     </p:spTree>
     <p:extLst>
       <p:ext uri="{BB962C8B-B14F-4D97-AF65-F5344CB8AC3E}">
-        <p14:creationId xmlns:p14="http://schemas.microsoft.com/office/powerpoint/2010/main" val="1844714465"/>
+        <p14:creationId xmlns:p14="http://schemas.microsoft.com/office/powerpoint/2010/main" val="2214801930"/>
       </p:ext>
     </p:extLst>
   </p:cSld>
@@ -15134,232 +15260,6 @@
         <p:spPr>
           <a:xfrm>
             <a:off x="737969" y="1444545"/>
-            <a:ext cx="10914507" cy="1815882"/>
-          </a:xfrm>
-          <a:prstGeom prst="rect">
-            <a:avLst/>
-          </a:prstGeom>
-          <a:noFill/>
-        </p:spPr>
-        <p:txBody>
-          <a:bodyPr wrap="square" rtlCol="0">
-            <a:spAutoFit/>
-          </a:bodyPr>
-          <a:lstStyle/>
-          <a:p>
-            <a:pPr algn="l"/>
-            <a:r>
-              <a:rPr lang="en-US" sz="2800" dirty="0">
-                <a:latin typeface="PFDinTextCompPro-Italic"/>
-                <a:cs typeface="PFDinTextCompPro-Italic"/>
-              </a:rPr>
-              <a:t>Q: Is the </a:t>
-            </a:r>
-            <a:r>
-              <a:rPr lang="en-US" sz="2800" dirty="0" err="1">
-                <a:latin typeface="PFDinTextCompPro-Italic"/>
-                <a:cs typeface="PFDinTextCompPro-Italic"/>
-              </a:rPr>
-              <a:t>logit</a:t>
-            </a:r>
-            <a:r>
-              <a:rPr lang="en-US" sz="2800" dirty="0">
-                <a:latin typeface="PFDinTextCompPro-Italic"/>
-                <a:cs typeface="PFDinTextCompPro-Italic"/>
-              </a:rPr>
-              <a:t> the only link function used for the Bernoulli distribution?</a:t>
-            </a:r>
-          </a:p>
-          <a:p>
-            <a:pPr algn="l"/>
-            <a:endParaRPr lang="en-US" sz="2800" dirty="0">
-              <a:latin typeface="PFDinTextCompPro-Italic"/>
-              <a:cs typeface="PFDinTextCompPro-Italic"/>
-            </a:endParaRPr>
-          </a:p>
-          <a:p>
-            <a:pPr algn="l"/>
-            <a:r>
-              <a:rPr lang="en-US" sz="2800" dirty="0">
-                <a:latin typeface="PFDinTextCompPro-Italic"/>
-                <a:cs typeface="PFDinTextCompPro-Italic"/>
-              </a:rPr>
-              <a:t>A: No, other link functions include the </a:t>
-            </a:r>
-            <a:r>
-              <a:rPr lang="en-US" sz="2800" dirty="0" err="1">
-                <a:latin typeface="PFDinTextCompPro-Italic"/>
-                <a:cs typeface="PFDinTextCompPro-Italic"/>
-                <a:hlinkClick r:id="rId3"/>
-              </a:rPr>
-              <a:t>probit</a:t>
-            </a:r>
-            <a:r>
-              <a:rPr lang="en-US" sz="2800" dirty="0">
-                <a:latin typeface="PFDinTextCompPro-Italic"/>
-                <a:cs typeface="PFDinTextCompPro-Italic"/>
-              </a:rPr>
-              <a:t> the </a:t>
-            </a:r>
-            <a:r>
-              <a:rPr lang="en-US" sz="2800" dirty="0" err="1">
-                <a:latin typeface="PFDinTextCompPro-Italic"/>
-                <a:cs typeface="PFDinTextCompPro-Italic"/>
-                <a:hlinkClick r:id="rId4"/>
-              </a:rPr>
-              <a:t>tobit</a:t>
-            </a:r>
-            <a:r>
-              <a:rPr lang="en-US" sz="2800" dirty="0">
-                <a:latin typeface="PFDinTextCompPro-Italic"/>
-                <a:cs typeface="PFDinTextCompPro-Italic"/>
-              </a:rPr>
-              <a:t> model. However, the </a:t>
-            </a:r>
-            <a:r>
-              <a:rPr lang="en-US" sz="2800" dirty="0" err="1">
-                <a:latin typeface="PFDinTextCompPro-Italic"/>
-                <a:cs typeface="PFDinTextCompPro-Italic"/>
-              </a:rPr>
-              <a:t>logit</a:t>
-            </a:r>
-            <a:r>
-              <a:rPr lang="en-US" sz="2800" dirty="0">
-                <a:latin typeface="PFDinTextCompPro-Italic"/>
-                <a:cs typeface="PFDinTextCompPro-Italic"/>
-              </a:rPr>
-              <a:t> simplifies things nicely and is probably the most commonly used.</a:t>
-            </a:r>
-            <a:endParaRPr lang="en-US" sz="2800" b="1" dirty="0">
-              <a:latin typeface="PFDinTextCompPro-Italic"/>
-              <a:cs typeface="PFDinTextCompPro-Italic"/>
-            </a:endParaRPr>
-          </a:p>
-        </p:txBody>
-      </p:sp>
-      <p:sp>
-        <p:nvSpPr>
-          <p:cNvPr id="7" name="Title 1">
-            <a:extLst>
-              <a:ext uri="{FF2B5EF4-FFF2-40B4-BE49-F238E27FC236}">
-                <a16:creationId xmlns:a16="http://schemas.microsoft.com/office/drawing/2014/main" id="{BDDA7240-9A85-AA45-9C54-227D853D8D5F}"/>
-              </a:ext>
-            </a:extLst>
-          </p:cNvPr>
-          <p:cNvSpPr txBox="1">
-            <a:spLocks/>
-          </p:cNvSpPr>
-          <p:nvPr/>
-        </p:nvSpPr>
-        <p:spPr>
-          <a:xfrm>
-            <a:off x="838200" y="365125"/>
-            <a:ext cx="10515600" cy="1325563"/>
-          </a:xfrm>
-          <a:prstGeom prst="rect">
-            <a:avLst/>
-          </a:prstGeom>
-        </p:spPr>
-        <p:txBody>
-          <a:bodyPr vert="horz" lIns="0" tIns="32914" rIns="65828" bIns="32914" rtlCol="0" anchor="ctr">
-            <a:normAutofit/>
-          </a:bodyPr>
-          <a:lstStyle>
-            <a:lvl1pPr algn="l" defTabSz="914400" rtl="0" eaLnBrk="1" latinLnBrk="0" hangingPunct="1">
-              <a:lnSpc>
-                <a:spcPts val="4686"/>
-              </a:lnSpc>
-              <a:spcBef>
-                <a:spcPct val="0"/>
-              </a:spcBef>
-              <a:buNone/>
-              <a:defRPr sz="5078" b="1" kern="1200" cap="all" baseline="0">
-                <a:solidFill>
-                  <a:schemeClr val="tx1"/>
-                </a:solidFill>
-                <a:latin typeface="+mj-lt"/>
-                <a:ea typeface="+mj-ea"/>
-                <a:cs typeface="+mj-cs"/>
-              </a:defRPr>
-            </a:lvl1pPr>
-          </a:lstStyle>
-          <a:p>
-            <a:r>
-              <a:rPr lang="en-US" sz="4000" b="0" cap="none" dirty="0"/>
-              <a:t>Predicting default: review</a:t>
-            </a:r>
-          </a:p>
-        </p:txBody>
-      </p:sp>
-    </p:spTree>
-    <p:extLst>
-      <p:ext uri="{BB962C8B-B14F-4D97-AF65-F5344CB8AC3E}">
-        <p14:creationId xmlns:p14="http://schemas.microsoft.com/office/powerpoint/2010/main" val="2214801930"/>
-      </p:ext>
-    </p:extLst>
-  </p:cSld>
-  <p:clrMapOvr>
-    <a:masterClrMapping/>
-  </p:clrMapOvr>
-  <p:transition/>
-</p:sld>
-</file>
-
-<file path=ppt/slides/slide36.xml><?xml version="1.0" encoding="utf-8"?>
-<p:sld xmlns:a="http://schemas.openxmlformats.org/drawingml/2006/main" xmlns:r="http://schemas.openxmlformats.org/officeDocument/2006/relationships" xmlns:p="http://schemas.openxmlformats.org/presentationml/2006/main">
-  <p:cSld>
-    <p:spTree>
-      <p:nvGrpSpPr>
-        <p:cNvPr id="1" name=""/>
-        <p:cNvGrpSpPr/>
-        <p:nvPr/>
-      </p:nvGrpSpPr>
-      <p:grpSpPr>
-        <a:xfrm>
-          <a:off x="0" y="0"/>
-          <a:ext cx="0" cy="0"/>
-          <a:chOff x="0" y="0"/>
-          <a:chExt cx="0" cy="0"/>
-        </a:xfrm>
-      </p:grpSpPr>
-      <p:sp>
-        <p:nvSpPr>
-          <p:cNvPr id="8" name="Slide Number Placeholder 3"/>
-          <p:cNvSpPr>
-            <a:spLocks noGrp="1"/>
-          </p:cNvSpPr>
-          <p:nvPr>
-            <p:ph type="sldNum" sz="quarter" idx="13"/>
-          </p:nvPr>
-        </p:nvSpPr>
-        <p:spPr/>
-        <p:txBody>
-          <a:bodyPr/>
-          <a:lstStyle/>
-          <a:p>
-            <a:pPr>
-              <a:defRPr/>
-            </a:pPr>
-            <a:fld id="{BD5AD749-DAD1-6A4A-A2AA-CB20EAD0AEB7}" type="slidenum">
-              <a:rPr lang="en-US"/>
-              <a:pPr>
-                <a:defRPr/>
-              </a:pPr>
-              <a:t>36</a:t>
-            </a:fld>
-            <a:endParaRPr lang="en-US"/>
-          </a:p>
-        </p:txBody>
-      </p:sp>
-      <p:sp>
-        <p:nvSpPr>
-          <p:cNvPr id="9" name="TextBox 8"/>
-          <p:cNvSpPr txBox="1"/>
-          <p:nvPr/>
-        </p:nvSpPr>
-        <p:spPr>
-          <a:xfrm>
-            <a:off x="737969" y="1444545"/>
             <a:ext cx="10914507" cy="3108543"/>
           </a:xfrm>
           <a:prstGeom prst="rect">
@@ -15447,7 +15347,7 @@
           <a:graphicData uri="http://schemas.openxmlformats.org/presentationml/2006/ole">
             <mc:AlternateContent xmlns:mc="http://schemas.openxmlformats.org/markup-compatibility/2006">
               <mc:Choice xmlns:v="urn:schemas-microsoft-com:vml" Requires="v">
-                <p:oleObj spid="_x0000_s20502" name="Equation" r:id="rId4" imgW="634680" imgH="419040" progId="Equation.3">
+                <p:oleObj spid="_x0000_s20508" name="Equation" r:id="rId4" imgW="634680" imgH="419040" progId="Equation.3">
                   <p:embed/>
                 </p:oleObj>
               </mc:Choice>
@@ -15530,7 +15430,7 @@
           <a:graphicData uri="http://schemas.openxmlformats.org/presentationml/2006/ole">
             <mc:AlternateContent xmlns:mc="http://schemas.openxmlformats.org/markup-compatibility/2006">
               <mc:Choice xmlns:v="urn:schemas-microsoft-com:vml" Requires="v">
-                <p:oleObj spid="_x0000_s20503" name="Equation" r:id="rId6" imgW="685800" imgH="393480" progId="Equation.3">
+                <p:oleObj spid="_x0000_s20509" name="Equation" r:id="rId6" imgW="685800" imgH="393480" progId="Equation.3">
                   <p:embed/>
                 </p:oleObj>
               </mc:Choice>
@@ -15613,7 +15513,7 @@
           <a:graphicData uri="http://schemas.openxmlformats.org/presentationml/2006/ole">
             <mc:AlternateContent xmlns:mc="http://schemas.openxmlformats.org/markup-compatibility/2006">
               <mc:Choice xmlns:v="urn:schemas-microsoft-com:vml" Requires="v">
-                <p:oleObj spid="_x0000_s20504" name="Equation" r:id="rId8" imgW="444240" imgH="393480" progId="Equation.3">
+                <p:oleObj spid="_x0000_s20510" name="Equation" r:id="rId8" imgW="444240" imgH="393480" progId="Equation.3">
                   <p:embed/>
                 </p:oleObj>
               </mc:Choice>
@@ -15742,7 +15642,7 @@
 </p:sld>
 </file>
 
-<file path=ppt/slides/slide37.xml><?xml version="1.0" encoding="utf-8"?>
+<file path=ppt/slides/slide36.xml><?xml version="1.0" encoding="utf-8"?>
 <p:sld xmlns:a="http://schemas.openxmlformats.org/drawingml/2006/main" xmlns:r="http://schemas.openxmlformats.org/officeDocument/2006/relationships" xmlns:p="http://schemas.openxmlformats.org/presentationml/2006/main">
   <p:cSld>
     <p:spTree>
@@ -15782,7 +15682,7 @@
               <a:pPr>
                 <a:defRPr/>
               </a:pPr>
-              <a:t>37</a:t>
+              <a:t>36</a:t>
             </a:fld>
             <a:endParaRPr lang="en-US"/>
           </a:p>
@@ -15985,7 +15885,7 @@
 </p:sld>
 </file>
 
-<file path=ppt/slides/slide38.xml><?xml version="1.0" encoding="utf-8"?>
+<file path=ppt/slides/slide37.xml><?xml version="1.0" encoding="utf-8"?>
 <p:sld xmlns:a="http://schemas.openxmlformats.org/drawingml/2006/main" xmlns:r="http://schemas.openxmlformats.org/officeDocument/2006/relationships" xmlns:p="http://schemas.openxmlformats.org/presentationml/2006/main">
   <p:cSld>
     <p:spTree>
@@ -16025,7 +15925,7 @@
               <a:pPr>
                 <a:defRPr/>
               </a:pPr>
-              <a:t>38</a:t>
+              <a:t>37</a:t>
             </a:fld>
             <a:endParaRPr lang="en-US"/>
           </a:p>
@@ -17108,7 +17008,7 @@
           <a:graphicData uri="http://schemas.openxmlformats.org/presentationml/2006/ole">
             <mc:AlternateContent xmlns:mc="http://schemas.openxmlformats.org/markup-compatibility/2006">
               <mc:Choice xmlns:v="urn:schemas-microsoft-com:vml" Requires="v">
-                <p:oleObj spid="_x0000_s1039" name="Equation" r:id="rId4" imgW="1726920" imgH="419040" progId="Equation.3">
+                <p:oleObj spid="_x0000_s1043" name="Equation" r:id="rId4" imgW="1726920" imgH="419040" progId="Equation.3">
                   <p:embed/>
                 </p:oleObj>
               </mc:Choice>
@@ -17191,7 +17091,7 @@
           <a:graphicData uri="http://schemas.openxmlformats.org/presentationml/2006/ole">
             <mc:AlternateContent xmlns:mc="http://schemas.openxmlformats.org/markup-compatibility/2006">
               <mc:Choice xmlns:v="urn:schemas-microsoft-com:vml" Requires="v">
-                <p:oleObj spid="_x0000_s1040" name="Equation" r:id="rId6" imgW="787320" imgH="228600" progId="Equation.3">
+                <p:oleObj spid="_x0000_s1044" name="Equation" r:id="rId6" imgW="787320" imgH="228600" progId="Equation.3">
                   <p:embed/>
                 </p:oleObj>
               </mc:Choice>
@@ -17487,7 +17387,7 @@
           <a:graphicData uri="http://schemas.openxmlformats.org/presentationml/2006/ole">
             <mc:AlternateContent xmlns:mc="http://schemas.openxmlformats.org/markup-compatibility/2006">
               <mc:Choice xmlns:v="urn:schemas-microsoft-com:vml" Requires="v">
-                <p:oleObj spid="_x0000_s21517" name="Equation" r:id="rId4" imgW="1726920" imgH="419040" progId="Equation.3">
+                <p:oleObj spid="_x0000_s21521" name="Equation" r:id="rId4" imgW="1726920" imgH="419040" progId="Equation.3">
                   <p:embed/>
                 </p:oleObj>
               </mc:Choice>
@@ -17566,7 +17466,7 @@
           <a:graphicData uri="http://schemas.openxmlformats.org/presentationml/2006/ole">
             <mc:AlternateContent xmlns:mc="http://schemas.openxmlformats.org/markup-compatibility/2006">
               <mc:Choice xmlns:v="urn:schemas-microsoft-com:vml" Requires="v">
-                <p:oleObj spid="_x0000_s21518" name="Equation" r:id="rId6" imgW="787320" imgH="228600" progId="Equation.3">
+                <p:oleObj spid="_x0000_s21522" name="Equation" r:id="rId6" imgW="787320" imgH="228600" progId="Equation.3">
                   <p:embed/>
                 </p:oleObj>
               </mc:Choice>
@@ -17891,7 +17791,7 @@
           <a:graphicData uri="http://schemas.openxmlformats.org/presentationml/2006/ole">
             <mc:AlternateContent xmlns:mc="http://schemas.openxmlformats.org/markup-compatibility/2006">
               <mc:Choice xmlns:v="urn:schemas-microsoft-com:vml" Requires="v">
-                <p:oleObj spid="_x0000_s3080" name="Equation" r:id="rId4" imgW="876240" imgH="419040" progId="Equation.3">
+                <p:oleObj spid="_x0000_s3082" name="Equation" r:id="rId4" imgW="876240" imgH="419040" progId="Equation.3">
                   <p:embed/>
                 </p:oleObj>
               </mc:Choice>

</xml_diff>

<commit_message>
update log reg slides + ouitline
</commit_message>
<xml_diff>
--- a/slides/09_logistic_regression_classification.pptx
+++ b/slides/09_logistic_regression_classification.pptx
@@ -5,7 +5,7 @@
     <p:sldMasterId id="2147483648" r:id="rId1"/>
   </p:sldMasterIdLst>
   <p:notesMasterIdLst>
-    <p:notesMasterId r:id="rId50"/>
+    <p:notesMasterId r:id="rId48"/>
   </p:notesMasterIdLst>
   <p:sldIdLst>
     <p:sldId id="256" r:id="rId2"/>
@@ -50,12 +50,10 @@
     <p:sldId id="787" r:id="rId41"/>
     <p:sldId id="803" r:id="rId42"/>
     <p:sldId id="804" r:id="rId43"/>
-    <p:sldId id="752" r:id="rId44"/>
-    <p:sldId id="785" r:id="rId45"/>
-    <p:sldId id="786" r:id="rId46"/>
-    <p:sldId id="790" r:id="rId47"/>
-    <p:sldId id="753" r:id="rId48"/>
-    <p:sldId id="805" r:id="rId49"/>
+    <p:sldId id="790" r:id="rId44"/>
+    <p:sldId id="753" r:id="rId45"/>
+    <p:sldId id="805" r:id="rId46"/>
+    <p:sldId id="814" r:id="rId47"/>
   </p:sldIdLst>
   <p:sldSz cx="12192000" cy="6858000"/>
   <p:notesSz cx="6858000" cy="9144000"/>
@@ -3367,7 +3365,7 @@
     </p:spTree>
     <p:extLst>
       <p:ext uri="{BB962C8B-B14F-4D97-AF65-F5344CB8AC3E}">
-        <p14:creationId xmlns:p14="http://schemas.microsoft.com/office/powerpoint/2010/main" val="1875264665"/>
+        <p14:creationId xmlns:p14="http://schemas.microsoft.com/office/powerpoint/2010/main" val="475404432"/>
       </p:ext>
     </p:extLst>
   </p:cSld>
@@ -3438,13 +3436,16 @@
               <a:tabLst/>
               <a:defRPr/>
             </a:pPr>
-            <a:endParaRPr lang="en-US" sz="1200" baseline="0" dirty="0">
-              <a:solidFill>
-                <a:prstClr val="black"/>
-              </a:solidFill>
-              <a:latin typeface="ArialMT"/>
-              <a:sym typeface="Wingdings"/>
-            </a:endParaRPr>
+            <a:r>
+              <a:rPr lang="en-US" sz="1200" baseline="0" dirty="0">
+                <a:solidFill>
+                  <a:prstClr val="black"/>
+                </a:solidFill>
+                <a:latin typeface="ArialMT"/>
+                <a:sym typeface="Wingdings"/>
+              </a:rPr>
+              <a:t> </a:t>
+            </a:r>
           </a:p>
         </p:txBody>
       </p:sp>
@@ -3474,7 +3475,7 @@
     </p:spTree>
     <p:extLst>
       <p:ext uri="{BB962C8B-B14F-4D97-AF65-F5344CB8AC3E}">
-        <p14:creationId xmlns:p14="http://schemas.microsoft.com/office/powerpoint/2010/main" val="143471683"/>
+        <p14:creationId xmlns:p14="http://schemas.microsoft.com/office/powerpoint/2010/main" val="3865113638"/>
       </p:ext>
     </p:extLst>
   </p:cSld>
@@ -3584,7 +3585,7 @@
     </p:spTree>
     <p:extLst>
       <p:ext uri="{BB962C8B-B14F-4D97-AF65-F5344CB8AC3E}">
-        <p14:creationId xmlns:p14="http://schemas.microsoft.com/office/powerpoint/2010/main" val="2039942227"/>
+        <p14:creationId xmlns:p14="http://schemas.microsoft.com/office/powerpoint/2010/main" val="2919725441"/>
       </p:ext>
     </p:extLst>
   </p:cSld>
@@ -3694,227 +3695,7 @@
     </p:spTree>
     <p:extLst>
       <p:ext uri="{BB962C8B-B14F-4D97-AF65-F5344CB8AC3E}">
-        <p14:creationId xmlns:p14="http://schemas.microsoft.com/office/powerpoint/2010/main" val="475404432"/>
-      </p:ext>
-    </p:extLst>
-  </p:cSld>
-  <p:clrMapOvr>
-    <a:masterClrMapping/>
-  </p:clrMapOvr>
-</p:notes>
-</file>
-
-<file path=ppt/notesSlides/notesSlide35.xml><?xml version="1.0" encoding="utf-8"?>
-<p:notes xmlns:a="http://schemas.openxmlformats.org/drawingml/2006/main" xmlns:r="http://schemas.openxmlformats.org/officeDocument/2006/relationships" xmlns:p="http://schemas.openxmlformats.org/presentationml/2006/main">
-  <p:cSld>
-    <p:spTree>
-      <p:nvGrpSpPr>
-        <p:cNvPr id="1" name=""/>
-        <p:cNvGrpSpPr/>
-        <p:nvPr/>
-      </p:nvGrpSpPr>
-      <p:grpSpPr>
-        <a:xfrm>
-          <a:off x="0" y="0"/>
-          <a:ext cx="0" cy="0"/>
-          <a:chOff x="0" y="0"/>
-          <a:chExt cx="0" cy="0"/>
-        </a:xfrm>
-      </p:grpSpPr>
-      <p:sp>
-        <p:nvSpPr>
-          <p:cNvPr id="2" name="Slide Image Placeholder 1"/>
-          <p:cNvSpPr>
-            <a:spLocks noGrp="1" noRot="1" noChangeAspect="1"/>
-          </p:cNvSpPr>
-          <p:nvPr>
-            <p:ph type="sldImg"/>
-          </p:nvPr>
-        </p:nvSpPr>
-        <p:spPr/>
-      </p:sp>
-      <p:sp>
-        <p:nvSpPr>
-          <p:cNvPr id="3" name="Notes Placeholder 2"/>
-          <p:cNvSpPr>
-            <a:spLocks noGrp="1"/>
-          </p:cNvSpPr>
-          <p:nvPr>
-            <p:ph type="body" idx="1"/>
-          </p:nvPr>
-        </p:nvSpPr>
-        <p:spPr/>
-        <p:txBody>
-          <a:bodyPr/>
-          <a:lstStyle/>
-          <a:p>
-            <a:pPr marL="0" marR="0" indent="0" algn="l" defTabSz="457200" rtl="0" eaLnBrk="1" fontAlgn="auto" latinLnBrk="0" hangingPunct="1">
-              <a:lnSpc>
-                <a:spcPct val="100000"/>
-              </a:lnSpc>
-              <a:spcBef>
-                <a:spcPts val="0"/>
-              </a:spcBef>
-              <a:spcAft>
-                <a:spcPts val="0"/>
-              </a:spcAft>
-              <a:buClrTx/>
-              <a:buSzTx/>
-              <a:buFontTx/>
-              <a:buNone/>
-              <a:tabLst/>
-              <a:defRPr/>
-            </a:pPr>
-            <a:r>
-              <a:rPr lang="en-US" sz="1200" baseline="0" dirty="0">
-                <a:solidFill>
-                  <a:prstClr val="black"/>
-                </a:solidFill>
-                <a:latin typeface="ArialMT"/>
-                <a:sym typeface="Wingdings"/>
-              </a:rPr>
-              <a:t> </a:t>
-            </a:r>
-          </a:p>
-        </p:txBody>
-      </p:sp>
-      <p:sp>
-        <p:nvSpPr>
-          <p:cNvPr id="4" name="Slide Number Placeholder 3"/>
-          <p:cNvSpPr>
-            <a:spLocks noGrp="1"/>
-          </p:cNvSpPr>
-          <p:nvPr>
-            <p:ph type="sldNum" sz="quarter" idx="10"/>
-          </p:nvPr>
-        </p:nvSpPr>
-        <p:spPr/>
-        <p:txBody>
-          <a:bodyPr/>
-          <a:lstStyle/>
-          <a:p>
-            <a:fld id="{ADD4B5B7-85EF-4E48-AC80-2380FACD9C23}" type="slidenum">
-              <a:rPr lang="en-US" smtClean="0"/>
-              <a:t>47</a:t>
-            </a:fld>
-            <a:endParaRPr lang="en-US"/>
-          </a:p>
-        </p:txBody>
-      </p:sp>
-    </p:spTree>
-    <p:extLst>
-      <p:ext uri="{BB962C8B-B14F-4D97-AF65-F5344CB8AC3E}">
-        <p14:creationId xmlns:p14="http://schemas.microsoft.com/office/powerpoint/2010/main" val="3865113638"/>
-      </p:ext>
-    </p:extLst>
-  </p:cSld>
-  <p:clrMapOvr>
-    <a:masterClrMapping/>
-  </p:clrMapOvr>
-</p:notes>
-</file>
-
-<file path=ppt/notesSlides/notesSlide36.xml><?xml version="1.0" encoding="utf-8"?>
-<p:notes xmlns:a="http://schemas.openxmlformats.org/drawingml/2006/main" xmlns:r="http://schemas.openxmlformats.org/officeDocument/2006/relationships" xmlns:p="http://schemas.openxmlformats.org/presentationml/2006/main">
-  <p:cSld>
-    <p:spTree>
-      <p:nvGrpSpPr>
-        <p:cNvPr id="1" name=""/>
-        <p:cNvGrpSpPr/>
-        <p:nvPr/>
-      </p:nvGrpSpPr>
-      <p:grpSpPr>
-        <a:xfrm>
-          <a:off x="0" y="0"/>
-          <a:ext cx="0" cy="0"/>
-          <a:chOff x="0" y="0"/>
-          <a:chExt cx="0" cy="0"/>
-        </a:xfrm>
-      </p:grpSpPr>
-      <p:sp>
-        <p:nvSpPr>
-          <p:cNvPr id="2" name="Slide Image Placeholder 1"/>
-          <p:cNvSpPr>
-            <a:spLocks noGrp="1" noRot="1" noChangeAspect="1"/>
-          </p:cNvSpPr>
-          <p:nvPr>
-            <p:ph type="sldImg"/>
-          </p:nvPr>
-        </p:nvSpPr>
-        <p:spPr/>
-      </p:sp>
-      <p:sp>
-        <p:nvSpPr>
-          <p:cNvPr id="3" name="Notes Placeholder 2"/>
-          <p:cNvSpPr>
-            <a:spLocks noGrp="1"/>
-          </p:cNvSpPr>
-          <p:nvPr>
-            <p:ph type="body" idx="1"/>
-          </p:nvPr>
-        </p:nvSpPr>
-        <p:spPr/>
-        <p:txBody>
-          <a:bodyPr/>
-          <a:lstStyle/>
-          <a:p>
-            <a:pPr marL="0" marR="0" indent="0" algn="l" defTabSz="457200" rtl="0" eaLnBrk="1" fontAlgn="auto" latinLnBrk="0" hangingPunct="1">
-              <a:lnSpc>
-                <a:spcPct val="100000"/>
-              </a:lnSpc>
-              <a:spcBef>
-                <a:spcPts val="0"/>
-              </a:spcBef>
-              <a:spcAft>
-                <a:spcPts val="0"/>
-              </a:spcAft>
-              <a:buClrTx/>
-              <a:buSzTx/>
-              <a:buFontTx/>
-              <a:buNone/>
-              <a:tabLst/>
-              <a:defRPr/>
-            </a:pPr>
-            <a:r>
-              <a:rPr lang="en-US" sz="1200" baseline="0" dirty="0">
-                <a:solidFill>
-                  <a:prstClr val="black"/>
-                </a:solidFill>
-                <a:latin typeface="ArialMT"/>
-                <a:sym typeface="Wingdings"/>
-              </a:rPr>
-              <a:t> </a:t>
-            </a:r>
-          </a:p>
-        </p:txBody>
-      </p:sp>
-      <p:sp>
-        <p:nvSpPr>
-          <p:cNvPr id="4" name="Slide Number Placeholder 3"/>
-          <p:cNvSpPr>
-            <a:spLocks noGrp="1"/>
-          </p:cNvSpPr>
-          <p:nvPr>
-            <p:ph type="sldNum" sz="quarter" idx="10"/>
-          </p:nvPr>
-        </p:nvSpPr>
-        <p:spPr/>
-        <p:txBody>
-          <a:bodyPr/>
-          <a:lstStyle/>
-          <a:p>
-            <a:fld id="{ADD4B5B7-85EF-4E48-AC80-2380FACD9C23}" type="slidenum">
-              <a:rPr lang="en-US" smtClean="0"/>
-              <a:t>48</a:t>
-            </a:fld>
-            <a:endParaRPr lang="en-US"/>
-          </a:p>
-        </p:txBody>
-      </p:sp>
-    </p:spTree>
-    <p:extLst>
-      <p:ext uri="{BB962C8B-B14F-4D97-AF65-F5344CB8AC3E}">
-        <p14:creationId xmlns:p14="http://schemas.microsoft.com/office/powerpoint/2010/main" val="2919725441"/>
+        <p14:creationId xmlns:p14="http://schemas.microsoft.com/office/powerpoint/2010/main" val="1501991562"/>
       </p:ext>
     </p:extLst>
   </p:cSld>
@@ -8610,7 +8391,7 @@
           <a:graphicData uri="http://schemas.openxmlformats.org/presentationml/2006/ole">
             <mc:AlternateContent xmlns:mc="http://schemas.openxmlformats.org/markup-compatibility/2006">
               <mc:Choice xmlns:v="urn:schemas-microsoft-com:vml" Requires="v">
-                <p:oleObj spid="_x0000_s1053" name="Equation" r:id="rId5" imgW="1726920" imgH="419040" progId="Equation.3">
+                <p:oleObj spid="_x0000_s1057" name="Equation" r:id="rId5" imgW="1726920" imgH="419040" progId="Equation.3">
                   <p:embed/>
                 </p:oleObj>
               </mc:Choice>
@@ -8693,7 +8474,7 @@
           <a:graphicData uri="http://schemas.openxmlformats.org/presentationml/2006/ole">
             <mc:AlternateContent xmlns:mc="http://schemas.openxmlformats.org/markup-compatibility/2006">
               <mc:Choice xmlns:v="urn:schemas-microsoft-com:vml" Requires="v">
-                <p:oleObj spid="_x0000_s1054" name="Equation" r:id="rId7" imgW="787320" imgH="228600" progId="Equation.3">
+                <p:oleObj spid="_x0000_s1058" name="Equation" r:id="rId7" imgW="787320" imgH="228600" progId="Equation.3">
                   <p:embed/>
                 </p:oleObj>
               </mc:Choice>
@@ -9142,7 +8923,7 @@
           <a:graphicData uri="http://schemas.openxmlformats.org/presentationml/2006/ole">
             <mc:AlternateContent xmlns:mc="http://schemas.openxmlformats.org/markup-compatibility/2006">
               <mc:Choice xmlns:v="urn:schemas-microsoft-com:vml" Requires="v">
-                <p:oleObj spid="_x0000_s21529" name="Equation" r:id="rId4" imgW="1726920" imgH="419040" progId="Equation.3">
+                <p:oleObj spid="_x0000_s21533" name="Equation" r:id="rId4" imgW="1726920" imgH="419040" progId="Equation.3">
                   <p:embed/>
                 </p:oleObj>
               </mc:Choice>
@@ -9221,7 +9002,7 @@
           <a:graphicData uri="http://schemas.openxmlformats.org/presentationml/2006/ole">
             <mc:AlternateContent xmlns:mc="http://schemas.openxmlformats.org/markup-compatibility/2006">
               <mc:Choice xmlns:v="urn:schemas-microsoft-com:vml" Requires="v">
-                <p:oleObj spid="_x0000_s21530" name="Equation" r:id="rId6" imgW="787320" imgH="228600" progId="Equation.3">
+                <p:oleObj spid="_x0000_s21534" name="Equation" r:id="rId6" imgW="787320" imgH="228600" progId="Equation.3">
                   <p:embed/>
                 </p:oleObj>
               </mc:Choice>
@@ -9546,7 +9327,7 @@
           <a:graphicData uri="http://schemas.openxmlformats.org/presentationml/2006/ole">
             <mc:AlternateContent xmlns:mc="http://schemas.openxmlformats.org/markup-compatibility/2006">
               <mc:Choice xmlns:v="urn:schemas-microsoft-com:vml" Requires="v">
-                <p:oleObj spid="_x0000_s3088" name="Equation" r:id="rId4" imgW="876240" imgH="419040" progId="Equation.3">
+                <p:oleObj spid="_x0000_s3090" name="Equation" r:id="rId4" imgW="876240" imgH="419040" progId="Equation.3">
                   <p:embed/>
                 </p:oleObj>
               </mc:Choice>
@@ -9818,7 +9599,7 @@
           <a:graphicData uri="http://schemas.openxmlformats.org/presentationml/2006/ole">
             <mc:AlternateContent xmlns:mc="http://schemas.openxmlformats.org/markup-compatibility/2006">
               <mc:Choice xmlns:v="urn:schemas-microsoft-com:vml" Requires="v">
-                <p:oleObj spid="_x0000_s5135" name="Equation" r:id="rId4" imgW="876240" imgH="419040" progId="Equation.3">
+                <p:oleObj spid="_x0000_s5137" name="Equation" r:id="rId4" imgW="876240" imgH="419040" progId="Equation.3">
                   <p:embed/>
                 </p:oleObj>
               </mc:Choice>
@@ -10631,7 +10412,7 @@
           <a:graphicData uri="http://schemas.openxmlformats.org/presentationml/2006/ole">
             <mc:AlternateContent xmlns:mc="http://schemas.openxmlformats.org/markup-compatibility/2006">
               <mc:Choice xmlns:v="urn:schemas-microsoft-com:vml" Requires="v">
-                <p:oleObj spid="_x0000_s25614" name="Equation" r:id="rId4" imgW="825480" imgH="393480" progId="Equation.3">
+                <p:oleObj spid="_x0000_s25616" name="Equation" r:id="rId4" imgW="825480" imgH="393480" progId="Equation.3">
                   <p:embed/>
                 </p:oleObj>
               </mc:Choice>
@@ -11146,7 +10927,7 @@
           <a:graphicData uri="http://schemas.openxmlformats.org/presentationml/2006/ole">
             <mc:AlternateContent xmlns:mc="http://schemas.openxmlformats.org/markup-compatibility/2006">
               <mc:Choice xmlns:v="urn:schemas-microsoft-com:vml" Requires="v">
-                <p:oleObj spid="_x0000_s27661" name="Equation" r:id="rId4" imgW="825480" imgH="393480" progId="Equation.3">
+                <p:oleObj spid="_x0000_s27663" name="Equation" r:id="rId4" imgW="825480" imgH="393480" progId="Equation.3">
                   <p:embed/>
                 </p:oleObj>
               </mc:Choice>
@@ -11539,7 +11320,7 @@
           <a:graphicData uri="http://schemas.openxmlformats.org/presentationml/2006/ole">
             <mc:AlternateContent xmlns:mc="http://schemas.openxmlformats.org/markup-compatibility/2006">
               <mc:Choice xmlns:v="urn:schemas-microsoft-com:vml" Requires="v">
-                <p:oleObj spid="_x0000_s28686" name="Equation" r:id="rId4" imgW="1587240" imgH="393480" progId="Equation.3">
+                <p:oleObj spid="_x0000_s28688" name="Equation" r:id="rId4" imgW="1587240" imgH="393480" progId="Equation.3">
                   <p:embed/>
                 </p:oleObj>
               </mc:Choice>
@@ -11787,7 +11568,7 @@
           <a:graphicData uri="http://schemas.openxmlformats.org/presentationml/2006/ole">
             <mc:AlternateContent xmlns:mc="http://schemas.openxmlformats.org/markup-compatibility/2006">
               <mc:Choice xmlns:v="urn:schemas-microsoft-com:vml" Requires="v">
-                <p:oleObj spid="_x0000_s12303" name="Equation" r:id="rId4" imgW="1815840" imgH="457200" progId="Equation.3">
+                <p:oleObj spid="_x0000_s12305" name="Equation" r:id="rId4" imgW="1815840" imgH="457200" progId="Equation.3">
                   <p:embed/>
                 </p:oleObj>
               </mc:Choice>
@@ -12046,7 +11827,7 @@
           <a:graphicData uri="http://schemas.openxmlformats.org/presentationml/2006/ole">
             <mc:AlternateContent xmlns:mc="http://schemas.openxmlformats.org/markup-compatibility/2006">
               <mc:Choice xmlns:v="urn:schemas-microsoft-com:vml" Requires="v">
-                <p:oleObj spid="_x0000_s13341" name="Equation" r:id="rId4" imgW="1815840" imgH="457200" progId="Equation.3">
+                <p:oleObj spid="_x0000_s13345" name="Equation" r:id="rId4" imgW="1815840" imgH="457200" progId="Equation.3">
                   <p:embed/>
                 </p:oleObj>
               </mc:Choice>
@@ -12129,7 +11910,7 @@
           <a:graphicData uri="http://schemas.openxmlformats.org/presentationml/2006/ole">
             <mc:AlternateContent xmlns:mc="http://schemas.openxmlformats.org/markup-compatibility/2006">
               <mc:Choice xmlns:v="urn:schemas-microsoft-com:vml" Requires="v">
-                <p:oleObj spid="_x0000_s13342" name="Equation" r:id="rId6" imgW="3340080" imgH="457200" progId="Equation.3">
+                <p:oleObj spid="_x0000_s13346" name="Equation" r:id="rId6" imgW="3340080" imgH="457200" progId="Equation.3">
                   <p:embed/>
                 </p:oleObj>
               </mc:Choice>
@@ -12388,7 +12169,7 @@
           <a:graphicData uri="http://schemas.openxmlformats.org/presentationml/2006/ole">
             <mc:AlternateContent xmlns:mc="http://schemas.openxmlformats.org/markup-compatibility/2006">
               <mc:Choice xmlns:v="urn:schemas-microsoft-com:vml" Requires="v">
-                <p:oleObj spid="_x0000_s14352" name="Equation" r:id="rId4" imgW="2120760" imgH="393480" progId="Equation.3">
+                <p:oleObj spid="_x0000_s14354" name="Equation" r:id="rId4" imgW="2120760" imgH="393480" progId="Equation.3">
                   <p:embed/>
                 </p:oleObj>
               </mc:Choice>
@@ -12806,7 +12587,7 @@
           <a:graphicData uri="http://schemas.openxmlformats.org/presentationml/2006/ole">
             <mc:AlternateContent xmlns:mc="http://schemas.openxmlformats.org/markup-compatibility/2006">
               <mc:Choice xmlns:v="urn:schemas-microsoft-com:vml" Requires="v">
-                <p:oleObj spid="_x0000_s16401" name="Equation" r:id="rId4" imgW="2120760" imgH="393480" progId="Equation.3">
+                <p:oleObj spid="_x0000_s16403" name="Equation" r:id="rId4" imgW="2120760" imgH="393480" progId="Equation.3">
                   <p:embed/>
                 </p:oleObj>
               </mc:Choice>
@@ -13714,7 +13495,7 @@
           <a:graphicData uri="http://schemas.openxmlformats.org/presentationml/2006/ole">
             <mc:AlternateContent xmlns:mc="http://schemas.openxmlformats.org/markup-compatibility/2006">
               <mc:Choice xmlns:v="urn:schemas-microsoft-com:vml" Requires="v">
-                <p:oleObj spid="_x0000_s31757" name="Equation" r:id="rId4" imgW="215640" imgH="203040" progId="Equation.3">
+                <p:oleObj spid="_x0000_s31759" name="Equation" r:id="rId4" imgW="215640" imgH="203040" progId="Equation.3">
                   <p:embed/>
                 </p:oleObj>
               </mc:Choice>
@@ -14687,7 +14468,7 @@
           <a:graphicData uri="http://schemas.openxmlformats.org/presentationml/2006/ole">
             <mc:AlternateContent xmlns:mc="http://schemas.openxmlformats.org/markup-compatibility/2006">
               <mc:Choice xmlns:v="urn:schemas-microsoft-com:vml" Requires="v">
-                <p:oleObj spid="_x0000_s18448" name="Equation" r:id="rId4" imgW="2425680" imgH="393480" progId="Equation.3">
+                <p:oleObj spid="_x0000_s18450" name="Equation" r:id="rId4" imgW="2425680" imgH="393480" progId="Equation.3">
                   <p:embed/>
                 </p:oleObj>
               </mc:Choice>
@@ -14998,7 +14779,7 @@
           <a:graphicData uri="http://schemas.openxmlformats.org/presentationml/2006/ole">
             <mc:AlternateContent xmlns:mc="http://schemas.openxmlformats.org/markup-compatibility/2006">
               <mc:Choice xmlns:v="urn:schemas-microsoft-com:vml" Requires="v">
-                <p:oleObj spid="_x0000_s19485" name="Equation" r:id="rId4" imgW="2425680" imgH="393480" progId="Equation.3">
+                <p:oleObj spid="_x0000_s19489" name="Equation" r:id="rId4" imgW="2425680" imgH="393480" progId="Equation.3">
                   <p:embed/>
                 </p:oleObj>
               </mc:Choice>
@@ -15077,7 +14858,7 @@
           <a:graphicData uri="http://schemas.openxmlformats.org/presentationml/2006/ole">
             <mc:AlternateContent xmlns:mc="http://schemas.openxmlformats.org/markup-compatibility/2006">
               <mc:Choice xmlns:v="urn:schemas-microsoft-com:vml" Requires="v">
-                <p:oleObj spid="_x0000_s19486" name="Equation" r:id="rId6" imgW="1523880" imgH="444240" progId="Equation.3">
+                <p:oleObj spid="_x0000_s19490" name="Equation" r:id="rId6" imgW="1523880" imgH="444240" progId="Equation.3">
                   <p:embed/>
                 </p:oleObj>
               </mc:Choice>
@@ -20275,617 +20056,6 @@
         <p:spPr>
           <a:xfrm>
             <a:off x="737969" y="1444545"/>
-            <a:ext cx="10914507" cy="2246769"/>
-          </a:xfrm>
-          <a:prstGeom prst="rect">
-            <a:avLst/>
-          </a:prstGeom>
-          <a:noFill/>
-        </p:spPr>
-        <p:txBody>
-          <a:bodyPr wrap="square" rtlCol="0">
-            <a:spAutoFit/>
-          </a:bodyPr>
-          <a:lstStyle/>
-          <a:p>
-            <a:pPr algn="l"/>
-            <a:r>
-              <a:rPr lang="en-US" sz="2800" dirty="0">
-                <a:latin typeface="PFDinTextCompPro-Italic"/>
-                <a:cs typeface="PFDinTextCompPro-Italic"/>
-              </a:rPr>
-              <a:t>Q: What is a Generalized Linear Model (GLM)?</a:t>
-            </a:r>
-          </a:p>
-          <a:p>
-            <a:pPr algn="l"/>
-            <a:endParaRPr lang="en-US" sz="2800" dirty="0">
-              <a:latin typeface="PFDinTextCompPro-Italic"/>
-              <a:cs typeface="PFDinTextCompPro-Italic"/>
-            </a:endParaRPr>
-          </a:p>
-          <a:p>
-            <a:pPr algn="l"/>
-            <a:r>
-              <a:rPr lang="en-US" sz="2800" dirty="0">
-                <a:latin typeface="PFDinTextCompPro-Italic"/>
-                <a:cs typeface="PFDinTextCompPro-Italic"/>
-              </a:rPr>
-              <a:t>A: GLMs generalize the distribution of the </a:t>
-            </a:r>
-            <a:r>
-              <a:rPr lang="en-US" sz="2800" b="1" dirty="0">
-                <a:latin typeface="PFDinTextCompPro-Italic"/>
-                <a:cs typeface="PFDinTextCompPro-Italic"/>
-              </a:rPr>
-              <a:t>error term</a:t>
-            </a:r>
-            <a:r>
-              <a:rPr lang="en-US" sz="2800" dirty="0">
-                <a:latin typeface="PFDinTextCompPro-Italic"/>
-                <a:cs typeface="PFDinTextCompPro-Italic"/>
-              </a:rPr>
-              <a:t>, and allow the conditional mean of the response variable to be related to the linear model by a </a:t>
-            </a:r>
-            <a:r>
-              <a:rPr lang="en-US" sz="2800" dirty="0">
-                <a:latin typeface="PFDinTextCompPro-Medium"/>
-                <a:cs typeface="PFDinTextCompPro-Medium"/>
-              </a:rPr>
-              <a:t>link function</a:t>
-            </a:r>
-            <a:r>
-              <a:rPr lang="en-US" sz="2800" dirty="0">
-                <a:latin typeface="PFDinTextCompPro-Italic"/>
-                <a:cs typeface="PFDinTextCompPro-Italic"/>
-              </a:rPr>
-              <a:t>.</a:t>
-            </a:r>
-          </a:p>
-        </p:txBody>
-      </p:sp>
-      <p:sp>
-        <p:nvSpPr>
-          <p:cNvPr id="7" name="Title 1">
-            <a:extLst>
-              <a:ext uri="{FF2B5EF4-FFF2-40B4-BE49-F238E27FC236}">
-                <a16:creationId xmlns:a16="http://schemas.microsoft.com/office/drawing/2014/main" id="{ED8DBD3E-C62E-8245-845A-E68F972125FA}"/>
-              </a:ext>
-            </a:extLst>
-          </p:cNvPr>
-          <p:cNvSpPr txBox="1">
-            <a:spLocks/>
-          </p:cNvSpPr>
-          <p:nvPr/>
-        </p:nvSpPr>
-        <p:spPr>
-          <a:xfrm>
-            <a:off x="838200" y="365125"/>
-            <a:ext cx="10515600" cy="1325563"/>
-          </a:xfrm>
-          <a:prstGeom prst="rect">
-            <a:avLst/>
-          </a:prstGeom>
-        </p:spPr>
-        <p:txBody>
-          <a:bodyPr vert="horz" lIns="0" tIns="32914" rIns="65828" bIns="32914" rtlCol="0" anchor="ctr">
-            <a:normAutofit/>
-          </a:bodyPr>
-          <a:lstStyle>
-            <a:lvl1pPr algn="l" defTabSz="914400" rtl="0" eaLnBrk="1" latinLnBrk="0" hangingPunct="1">
-              <a:lnSpc>
-                <a:spcPts val="4686"/>
-              </a:lnSpc>
-              <a:spcBef>
-                <a:spcPct val="0"/>
-              </a:spcBef>
-              <a:buNone/>
-              <a:defRPr sz="5078" b="1" kern="1200" cap="all" baseline="0">
-                <a:solidFill>
-                  <a:schemeClr val="tx1"/>
-                </a:solidFill>
-                <a:latin typeface="+mj-lt"/>
-                <a:ea typeface="+mj-ea"/>
-                <a:cs typeface="+mj-cs"/>
-              </a:defRPr>
-            </a:lvl1pPr>
-          </a:lstStyle>
-          <a:p>
-            <a:r>
-              <a:rPr lang="en-US" sz="4000" b="0" cap="none" dirty="0"/>
-              <a:t>Predicting default: review</a:t>
-            </a:r>
-          </a:p>
-        </p:txBody>
-      </p:sp>
-    </p:spTree>
-    <p:extLst>
-      <p:ext uri="{BB962C8B-B14F-4D97-AF65-F5344CB8AC3E}">
-        <p14:creationId xmlns:p14="http://schemas.microsoft.com/office/powerpoint/2010/main" val="3351051001"/>
-      </p:ext>
-    </p:extLst>
-  </p:cSld>
-  <p:clrMapOvr>
-    <a:masterClrMapping/>
-  </p:clrMapOvr>
-  <p:transition/>
-</p:sld>
-</file>
-
-<file path=ppt/slides/slide44.xml><?xml version="1.0" encoding="utf-8"?>
-<p:sld xmlns:a="http://schemas.openxmlformats.org/drawingml/2006/main" xmlns:r="http://schemas.openxmlformats.org/officeDocument/2006/relationships" xmlns:p="http://schemas.openxmlformats.org/presentationml/2006/main">
-  <p:cSld>
-    <p:spTree>
-      <p:nvGrpSpPr>
-        <p:cNvPr id="1" name=""/>
-        <p:cNvGrpSpPr/>
-        <p:nvPr/>
-      </p:nvGrpSpPr>
-      <p:grpSpPr>
-        <a:xfrm>
-          <a:off x="0" y="0"/>
-          <a:ext cx="0" cy="0"/>
-          <a:chOff x="0" y="0"/>
-          <a:chExt cx="0" cy="0"/>
-        </a:xfrm>
-      </p:grpSpPr>
-      <p:sp>
-        <p:nvSpPr>
-          <p:cNvPr id="8" name="Slide Number Placeholder 3"/>
-          <p:cNvSpPr>
-            <a:spLocks noGrp="1"/>
-          </p:cNvSpPr>
-          <p:nvPr>
-            <p:ph type="sldNum" sz="quarter" idx="13"/>
-          </p:nvPr>
-        </p:nvSpPr>
-        <p:spPr/>
-        <p:txBody>
-          <a:bodyPr/>
-          <a:lstStyle/>
-          <a:p>
-            <a:pPr>
-              <a:defRPr/>
-            </a:pPr>
-            <a:fld id="{BD5AD749-DAD1-6A4A-A2AA-CB20EAD0AEB7}" type="slidenum">
-              <a:rPr lang="en-US"/>
-              <a:pPr>
-                <a:defRPr/>
-              </a:pPr>
-              <a:t>44</a:t>
-            </a:fld>
-            <a:endParaRPr lang="en-US"/>
-          </a:p>
-        </p:txBody>
-      </p:sp>
-      <p:sp>
-        <p:nvSpPr>
-          <p:cNvPr id="9" name="TextBox 8"/>
-          <p:cNvSpPr txBox="1"/>
-          <p:nvPr/>
-        </p:nvSpPr>
-        <p:spPr>
-          <a:xfrm>
-            <a:off x="737969" y="1444545"/>
-            <a:ext cx="10914507" cy="2246769"/>
-          </a:xfrm>
-          <a:prstGeom prst="rect">
-            <a:avLst/>
-          </a:prstGeom>
-          <a:noFill/>
-        </p:spPr>
-        <p:txBody>
-          <a:bodyPr wrap="square" rtlCol="0">
-            <a:spAutoFit/>
-          </a:bodyPr>
-          <a:lstStyle/>
-          <a:p>
-            <a:pPr algn="l"/>
-            <a:r>
-              <a:rPr lang="en-US" sz="2800" dirty="0">
-                <a:latin typeface="PFDinTextCompPro-Italic"/>
-                <a:cs typeface="PFDinTextCompPro-Italic"/>
-              </a:rPr>
-              <a:t>Q: What is the error distribution and link function for the logistic regression?</a:t>
-            </a:r>
-          </a:p>
-          <a:p>
-            <a:pPr algn="l"/>
-            <a:endParaRPr lang="en-US" sz="2800" dirty="0">
-              <a:latin typeface="PFDinTextCompPro-Italic"/>
-              <a:cs typeface="PFDinTextCompPro-Italic"/>
-            </a:endParaRPr>
-          </a:p>
-          <a:p>
-            <a:pPr algn="l"/>
-            <a:r>
-              <a:rPr lang="en-US" sz="2800" dirty="0">
-                <a:latin typeface="PFDinTextCompPro-Italic"/>
-                <a:cs typeface="PFDinTextCompPro-Italic"/>
-              </a:rPr>
-              <a:t>A: The error term follows a </a:t>
-            </a:r>
-            <a:r>
-              <a:rPr lang="en-US" sz="2800" dirty="0">
-                <a:latin typeface="PFDinTextCompPro-Italic"/>
-                <a:cs typeface="PFDinTextCompPro-Italic"/>
-                <a:hlinkClick r:id="rId3"/>
-              </a:rPr>
-              <a:t>Bernoulli distribution</a:t>
-            </a:r>
-            <a:r>
-              <a:rPr lang="en-US" sz="2800" dirty="0">
-                <a:latin typeface="PFDinTextCompPro-Italic"/>
-                <a:cs typeface="PFDinTextCompPro-Italic"/>
-              </a:rPr>
-              <a:t>, and the </a:t>
-            </a:r>
-            <a:r>
-              <a:rPr lang="en-US" sz="2800" dirty="0" err="1">
-                <a:latin typeface="PFDinTextCompPro-Italic"/>
-                <a:cs typeface="PFDinTextCompPro-Italic"/>
-              </a:rPr>
-              <a:t>logit</a:t>
-            </a:r>
-            <a:r>
-              <a:rPr lang="en-US" sz="2800" dirty="0">
-                <a:latin typeface="PFDinTextCompPro-Italic"/>
-                <a:cs typeface="PFDinTextCompPro-Italic"/>
-              </a:rPr>
-              <a:t> is the link function that connects us to the linear predictor.</a:t>
-            </a:r>
-          </a:p>
-        </p:txBody>
-      </p:sp>
-      <p:sp>
-        <p:nvSpPr>
-          <p:cNvPr id="7" name="Title 1">
-            <a:extLst>
-              <a:ext uri="{FF2B5EF4-FFF2-40B4-BE49-F238E27FC236}">
-                <a16:creationId xmlns:a16="http://schemas.microsoft.com/office/drawing/2014/main" id="{59FB7312-DC1E-1340-A9C8-72D22528434B}"/>
-              </a:ext>
-            </a:extLst>
-          </p:cNvPr>
-          <p:cNvSpPr txBox="1">
-            <a:spLocks/>
-          </p:cNvSpPr>
-          <p:nvPr/>
-        </p:nvSpPr>
-        <p:spPr>
-          <a:xfrm>
-            <a:off x="838200" y="365125"/>
-            <a:ext cx="10515600" cy="1325563"/>
-          </a:xfrm>
-          <a:prstGeom prst="rect">
-            <a:avLst/>
-          </a:prstGeom>
-        </p:spPr>
-        <p:txBody>
-          <a:bodyPr vert="horz" lIns="0" tIns="32914" rIns="65828" bIns="32914" rtlCol="0" anchor="ctr">
-            <a:normAutofit/>
-          </a:bodyPr>
-          <a:lstStyle>
-            <a:lvl1pPr algn="l" defTabSz="914400" rtl="0" eaLnBrk="1" latinLnBrk="0" hangingPunct="1">
-              <a:lnSpc>
-                <a:spcPts val="4686"/>
-              </a:lnSpc>
-              <a:spcBef>
-                <a:spcPct val="0"/>
-              </a:spcBef>
-              <a:buNone/>
-              <a:defRPr sz="5078" b="1" kern="1200" cap="all" baseline="0">
-                <a:solidFill>
-                  <a:schemeClr val="tx1"/>
-                </a:solidFill>
-                <a:latin typeface="+mj-lt"/>
-                <a:ea typeface="+mj-ea"/>
-                <a:cs typeface="+mj-cs"/>
-              </a:defRPr>
-            </a:lvl1pPr>
-          </a:lstStyle>
-          <a:p>
-            <a:r>
-              <a:rPr lang="en-US" sz="4000" b="0" cap="none" dirty="0"/>
-              <a:t>Predicting default: review</a:t>
-            </a:r>
-          </a:p>
-        </p:txBody>
-      </p:sp>
-    </p:spTree>
-    <p:extLst>
-      <p:ext uri="{BB962C8B-B14F-4D97-AF65-F5344CB8AC3E}">
-        <p14:creationId xmlns:p14="http://schemas.microsoft.com/office/powerpoint/2010/main" val="1844714465"/>
-      </p:ext>
-    </p:extLst>
-  </p:cSld>
-  <p:clrMapOvr>
-    <a:masterClrMapping/>
-  </p:clrMapOvr>
-  <p:transition/>
-</p:sld>
-</file>
-
-<file path=ppt/slides/slide45.xml><?xml version="1.0" encoding="utf-8"?>
-<p:sld xmlns:a="http://schemas.openxmlformats.org/drawingml/2006/main" xmlns:r="http://schemas.openxmlformats.org/officeDocument/2006/relationships" xmlns:p="http://schemas.openxmlformats.org/presentationml/2006/main">
-  <p:cSld>
-    <p:spTree>
-      <p:nvGrpSpPr>
-        <p:cNvPr id="1" name=""/>
-        <p:cNvGrpSpPr/>
-        <p:nvPr/>
-      </p:nvGrpSpPr>
-      <p:grpSpPr>
-        <a:xfrm>
-          <a:off x="0" y="0"/>
-          <a:ext cx="0" cy="0"/>
-          <a:chOff x="0" y="0"/>
-          <a:chExt cx="0" cy="0"/>
-        </a:xfrm>
-      </p:grpSpPr>
-      <p:sp>
-        <p:nvSpPr>
-          <p:cNvPr id="8" name="Slide Number Placeholder 3"/>
-          <p:cNvSpPr>
-            <a:spLocks noGrp="1"/>
-          </p:cNvSpPr>
-          <p:nvPr>
-            <p:ph type="sldNum" sz="quarter" idx="13"/>
-          </p:nvPr>
-        </p:nvSpPr>
-        <p:spPr/>
-        <p:txBody>
-          <a:bodyPr/>
-          <a:lstStyle/>
-          <a:p>
-            <a:pPr>
-              <a:defRPr/>
-            </a:pPr>
-            <a:fld id="{BD5AD749-DAD1-6A4A-A2AA-CB20EAD0AEB7}" type="slidenum">
-              <a:rPr lang="en-US"/>
-              <a:pPr>
-                <a:defRPr/>
-              </a:pPr>
-              <a:t>45</a:t>
-            </a:fld>
-            <a:endParaRPr lang="en-US"/>
-          </a:p>
-        </p:txBody>
-      </p:sp>
-      <p:sp>
-        <p:nvSpPr>
-          <p:cNvPr id="9" name="TextBox 8"/>
-          <p:cNvSpPr txBox="1"/>
-          <p:nvPr/>
-        </p:nvSpPr>
-        <p:spPr>
-          <a:xfrm>
-            <a:off x="737969" y="1444545"/>
-            <a:ext cx="10914507" cy="1815882"/>
-          </a:xfrm>
-          <a:prstGeom prst="rect">
-            <a:avLst/>
-          </a:prstGeom>
-          <a:noFill/>
-        </p:spPr>
-        <p:txBody>
-          <a:bodyPr wrap="square" rtlCol="0">
-            <a:spAutoFit/>
-          </a:bodyPr>
-          <a:lstStyle/>
-          <a:p>
-            <a:pPr algn="l"/>
-            <a:r>
-              <a:rPr lang="en-US" sz="2800" dirty="0">
-                <a:latin typeface="PFDinTextCompPro-Italic"/>
-                <a:cs typeface="PFDinTextCompPro-Italic"/>
-              </a:rPr>
-              <a:t>Q: Is the </a:t>
-            </a:r>
-            <a:r>
-              <a:rPr lang="en-US" sz="2800" dirty="0" err="1">
-                <a:latin typeface="PFDinTextCompPro-Italic"/>
-                <a:cs typeface="PFDinTextCompPro-Italic"/>
-              </a:rPr>
-              <a:t>logit</a:t>
-            </a:r>
-            <a:r>
-              <a:rPr lang="en-US" sz="2800" dirty="0">
-                <a:latin typeface="PFDinTextCompPro-Italic"/>
-                <a:cs typeface="PFDinTextCompPro-Italic"/>
-              </a:rPr>
-              <a:t> the only link function used for the Bernoulli distribution?</a:t>
-            </a:r>
-          </a:p>
-          <a:p>
-            <a:pPr algn="l"/>
-            <a:endParaRPr lang="en-US" sz="2800" dirty="0">
-              <a:latin typeface="PFDinTextCompPro-Italic"/>
-              <a:cs typeface="PFDinTextCompPro-Italic"/>
-            </a:endParaRPr>
-          </a:p>
-          <a:p>
-            <a:pPr algn="l"/>
-            <a:r>
-              <a:rPr lang="en-US" sz="2800" dirty="0">
-                <a:latin typeface="PFDinTextCompPro-Italic"/>
-                <a:cs typeface="PFDinTextCompPro-Italic"/>
-              </a:rPr>
-              <a:t>A: No, other link functions include the </a:t>
-            </a:r>
-            <a:r>
-              <a:rPr lang="en-US" sz="2800" dirty="0" err="1">
-                <a:latin typeface="PFDinTextCompPro-Italic"/>
-                <a:cs typeface="PFDinTextCompPro-Italic"/>
-                <a:hlinkClick r:id="rId3"/>
-              </a:rPr>
-              <a:t>probit</a:t>
-            </a:r>
-            <a:r>
-              <a:rPr lang="en-US" sz="2800" dirty="0">
-                <a:latin typeface="PFDinTextCompPro-Italic"/>
-                <a:cs typeface="PFDinTextCompPro-Italic"/>
-              </a:rPr>
-              <a:t> the </a:t>
-            </a:r>
-            <a:r>
-              <a:rPr lang="en-US" sz="2800" dirty="0" err="1">
-                <a:latin typeface="PFDinTextCompPro-Italic"/>
-                <a:cs typeface="PFDinTextCompPro-Italic"/>
-                <a:hlinkClick r:id="rId4"/>
-              </a:rPr>
-              <a:t>tobit</a:t>
-            </a:r>
-            <a:r>
-              <a:rPr lang="en-US" sz="2800" dirty="0">
-                <a:latin typeface="PFDinTextCompPro-Italic"/>
-                <a:cs typeface="PFDinTextCompPro-Italic"/>
-              </a:rPr>
-              <a:t> model. However, the </a:t>
-            </a:r>
-            <a:r>
-              <a:rPr lang="en-US" sz="2800" dirty="0" err="1">
-                <a:latin typeface="PFDinTextCompPro-Italic"/>
-                <a:cs typeface="PFDinTextCompPro-Italic"/>
-              </a:rPr>
-              <a:t>logit</a:t>
-            </a:r>
-            <a:r>
-              <a:rPr lang="en-US" sz="2800" dirty="0">
-                <a:latin typeface="PFDinTextCompPro-Italic"/>
-                <a:cs typeface="PFDinTextCompPro-Italic"/>
-              </a:rPr>
-              <a:t> simplifies things nicely and is probably the most commonly used.</a:t>
-            </a:r>
-            <a:endParaRPr lang="en-US" sz="2800" b="1" dirty="0">
-              <a:latin typeface="PFDinTextCompPro-Italic"/>
-              <a:cs typeface="PFDinTextCompPro-Italic"/>
-            </a:endParaRPr>
-          </a:p>
-        </p:txBody>
-      </p:sp>
-      <p:sp>
-        <p:nvSpPr>
-          <p:cNvPr id="7" name="Title 1">
-            <a:extLst>
-              <a:ext uri="{FF2B5EF4-FFF2-40B4-BE49-F238E27FC236}">
-                <a16:creationId xmlns:a16="http://schemas.microsoft.com/office/drawing/2014/main" id="{BDDA7240-9A85-AA45-9C54-227D853D8D5F}"/>
-              </a:ext>
-            </a:extLst>
-          </p:cNvPr>
-          <p:cNvSpPr txBox="1">
-            <a:spLocks/>
-          </p:cNvSpPr>
-          <p:nvPr/>
-        </p:nvSpPr>
-        <p:spPr>
-          <a:xfrm>
-            <a:off x="838200" y="365125"/>
-            <a:ext cx="10515600" cy="1325563"/>
-          </a:xfrm>
-          <a:prstGeom prst="rect">
-            <a:avLst/>
-          </a:prstGeom>
-        </p:spPr>
-        <p:txBody>
-          <a:bodyPr vert="horz" lIns="0" tIns="32914" rIns="65828" bIns="32914" rtlCol="0" anchor="ctr">
-            <a:normAutofit/>
-          </a:bodyPr>
-          <a:lstStyle>
-            <a:lvl1pPr algn="l" defTabSz="914400" rtl="0" eaLnBrk="1" latinLnBrk="0" hangingPunct="1">
-              <a:lnSpc>
-                <a:spcPts val="4686"/>
-              </a:lnSpc>
-              <a:spcBef>
-                <a:spcPct val="0"/>
-              </a:spcBef>
-              <a:buNone/>
-              <a:defRPr sz="5078" b="1" kern="1200" cap="all" baseline="0">
-                <a:solidFill>
-                  <a:schemeClr val="tx1"/>
-                </a:solidFill>
-                <a:latin typeface="+mj-lt"/>
-                <a:ea typeface="+mj-ea"/>
-                <a:cs typeface="+mj-cs"/>
-              </a:defRPr>
-            </a:lvl1pPr>
-          </a:lstStyle>
-          <a:p>
-            <a:r>
-              <a:rPr lang="en-US" sz="4000" b="0" cap="none" dirty="0"/>
-              <a:t>Predicting default: review</a:t>
-            </a:r>
-          </a:p>
-        </p:txBody>
-      </p:sp>
-    </p:spTree>
-    <p:extLst>
-      <p:ext uri="{BB962C8B-B14F-4D97-AF65-F5344CB8AC3E}">
-        <p14:creationId xmlns:p14="http://schemas.microsoft.com/office/powerpoint/2010/main" val="2214801930"/>
-      </p:ext>
-    </p:extLst>
-  </p:cSld>
-  <p:clrMapOvr>
-    <a:masterClrMapping/>
-  </p:clrMapOvr>
-  <p:transition/>
-</p:sld>
-</file>
-
-<file path=ppt/slides/slide46.xml><?xml version="1.0" encoding="utf-8"?>
-<p:sld xmlns:a="http://schemas.openxmlformats.org/drawingml/2006/main" xmlns:r="http://schemas.openxmlformats.org/officeDocument/2006/relationships" xmlns:p="http://schemas.openxmlformats.org/presentationml/2006/main">
-  <p:cSld>
-    <p:spTree>
-      <p:nvGrpSpPr>
-        <p:cNvPr id="1" name=""/>
-        <p:cNvGrpSpPr/>
-        <p:nvPr/>
-      </p:nvGrpSpPr>
-      <p:grpSpPr>
-        <a:xfrm>
-          <a:off x="0" y="0"/>
-          <a:ext cx="0" cy="0"/>
-          <a:chOff x="0" y="0"/>
-          <a:chExt cx="0" cy="0"/>
-        </a:xfrm>
-      </p:grpSpPr>
-      <p:sp>
-        <p:nvSpPr>
-          <p:cNvPr id="8" name="Slide Number Placeholder 3"/>
-          <p:cNvSpPr>
-            <a:spLocks noGrp="1"/>
-          </p:cNvSpPr>
-          <p:nvPr>
-            <p:ph type="sldNum" sz="quarter" idx="13"/>
-          </p:nvPr>
-        </p:nvSpPr>
-        <p:spPr/>
-        <p:txBody>
-          <a:bodyPr/>
-          <a:lstStyle/>
-          <a:p>
-            <a:pPr>
-              <a:defRPr/>
-            </a:pPr>
-            <a:fld id="{BD5AD749-DAD1-6A4A-A2AA-CB20EAD0AEB7}" type="slidenum">
-              <a:rPr lang="en-US"/>
-              <a:pPr>
-                <a:defRPr/>
-              </a:pPr>
-              <a:t>46</a:t>
-            </a:fld>
-            <a:endParaRPr lang="en-US"/>
-          </a:p>
-        </p:txBody>
-      </p:sp>
-      <p:sp>
-        <p:nvSpPr>
-          <p:cNvPr id="9" name="TextBox 8"/>
-          <p:cNvSpPr txBox="1"/>
-          <p:nvPr/>
-        </p:nvSpPr>
-        <p:spPr>
-          <a:xfrm>
-            <a:off x="737969" y="1444545"/>
             <a:ext cx="10914507" cy="3108543"/>
           </a:xfrm>
           <a:prstGeom prst="rect">
@@ -20973,7 +20143,7 @@
           <a:graphicData uri="http://schemas.openxmlformats.org/presentationml/2006/ole">
             <mc:AlternateContent xmlns:mc="http://schemas.openxmlformats.org/markup-compatibility/2006">
               <mc:Choice xmlns:v="urn:schemas-microsoft-com:vml" Requires="v">
-                <p:oleObj spid="_x0000_s20520" name="Equation" r:id="rId4" imgW="634680" imgH="419040" progId="Equation.3">
+                <p:oleObj spid="_x0000_s20526" name="Equation" r:id="rId4" imgW="634680" imgH="419040" progId="Equation.3">
                   <p:embed/>
                 </p:oleObj>
               </mc:Choice>
@@ -21056,7 +20226,7 @@
           <a:graphicData uri="http://schemas.openxmlformats.org/presentationml/2006/ole">
             <mc:AlternateContent xmlns:mc="http://schemas.openxmlformats.org/markup-compatibility/2006">
               <mc:Choice xmlns:v="urn:schemas-microsoft-com:vml" Requires="v">
-                <p:oleObj spid="_x0000_s20521" name="Equation" r:id="rId6" imgW="685800" imgH="393480" progId="Equation.3">
+                <p:oleObj spid="_x0000_s20527" name="Equation" r:id="rId6" imgW="685800" imgH="393480" progId="Equation.3">
                   <p:embed/>
                 </p:oleObj>
               </mc:Choice>
@@ -21139,7 +20309,7 @@
           <a:graphicData uri="http://schemas.openxmlformats.org/presentationml/2006/ole">
             <mc:AlternateContent xmlns:mc="http://schemas.openxmlformats.org/markup-compatibility/2006">
               <mc:Choice xmlns:v="urn:schemas-microsoft-com:vml" Requires="v">
-                <p:oleObj spid="_x0000_s20522" name="Equation" r:id="rId8" imgW="444240" imgH="393480" progId="Equation.3">
+                <p:oleObj spid="_x0000_s20528" name="Equation" r:id="rId8" imgW="444240" imgH="393480" progId="Equation.3">
                   <p:embed/>
                 </p:oleObj>
               </mc:Choice>
@@ -21268,7 +20438,7 @@
 </p:sld>
 </file>
 
-<file path=ppt/slides/slide47.xml><?xml version="1.0" encoding="utf-8"?>
+<file path=ppt/slides/slide44.xml><?xml version="1.0" encoding="utf-8"?>
 <p:sld xmlns:a="http://schemas.openxmlformats.org/drawingml/2006/main" xmlns:r="http://schemas.openxmlformats.org/officeDocument/2006/relationships" xmlns:p="http://schemas.openxmlformats.org/presentationml/2006/main">
   <p:cSld>
     <p:spTree>
@@ -21308,7 +20478,7 @@
               <a:pPr>
                 <a:defRPr/>
               </a:pPr>
-              <a:t>47</a:t>
+              <a:t>44</a:t>
             </a:fld>
             <a:endParaRPr lang="en-US"/>
           </a:p>
@@ -21511,7 +20681,7 @@
 </p:sld>
 </file>
 
-<file path=ppt/slides/slide48.xml><?xml version="1.0" encoding="utf-8"?>
+<file path=ppt/slides/slide45.xml><?xml version="1.0" encoding="utf-8"?>
 <p:sld xmlns:a="http://schemas.openxmlformats.org/drawingml/2006/main" xmlns:r="http://schemas.openxmlformats.org/officeDocument/2006/relationships" xmlns:p="http://schemas.openxmlformats.org/presentationml/2006/main">
   <p:cSld>
     <p:spTree>
@@ -21551,7 +20721,7 @@
               <a:pPr>
                 <a:defRPr/>
               </a:pPr>
-              <a:t>48</a:t>
+              <a:t>45</a:t>
             </a:fld>
             <a:endParaRPr lang="en-US"/>
           </a:p>
@@ -21845,6 +21015,350 @@
     <p:extLst>
       <p:ext uri="{BB962C8B-B14F-4D97-AF65-F5344CB8AC3E}">
         <p14:creationId xmlns:p14="http://schemas.microsoft.com/office/powerpoint/2010/main" val="2323627828"/>
+      </p:ext>
+    </p:extLst>
+  </p:cSld>
+  <p:clrMapOvr>
+    <a:masterClrMapping/>
+  </p:clrMapOvr>
+  <p:transition/>
+</p:sld>
+</file>
+
+<file path=ppt/slides/slide46.xml><?xml version="1.0" encoding="utf-8"?>
+<p:sld xmlns:a="http://schemas.openxmlformats.org/drawingml/2006/main" xmlns:r="http://schemas.openxmlformats.org/officeDocument/2006/relationships" xmlns:p="http://schemas.openxmlformats.org/presentationml/2006/main">
+  <p:cSld>
+    <p:spTree>
+      <p:nvGrpSpPr>
+        <p:cNvPr id="1" name=""/>
+        <p:cNvGrpSpPr/>
+        <p:nvPr/>
+      </p:nvGrpSpPr>
+      <p:grpSpPr>
+        <a:xfrm>
+          <a:off x="0" y="0"/>
+          <a:ext cx="0" cy="0"/>
+          <a:chOff x="0" y="0"/>
+          <a:chExt cx="0" cy="0"/>
+        </a:xfrm>
+      </p:grpSpPr>
+      <p:sp>
+        <p:nvSpPr>
+          <p:cNvPr id="8" name="Slide Number Placeholder 3"/>
+          <p:cNvSpPr>
+            <a:spLocks noGrp="1"/>
+          </p:cNvSpPr>
+          <p:nvPr>
+            <p:ph type="sldNum" sz="quarter" idx="13"/>
+          </p:nvPr>
+        </p:nvSpPr>
+        <p:spPr/>
+        <p:txBody>
+          <a:bodyPr/>
+          <a:lstStyle/>
+          <a:p>
+            <a:pPr>
+              <a:defRPr/>
+            </a:pPr>
+            <a:fld id="{BD5AD749-DAD1-6A4A-A2AA-CB20EAD0AEB7}" type="slidenum">
+              <a:rPr lang="en-US"/>
+              <a:pPr>
+                <a:defRPr/>
+              </a:pPr>
+              <a:t>46</a:t>
+            </a:fld>
+            <a:endParaRPr lang="en-US"/>
+          </a:p>
+        </p:txBody>
+      </p:sp>
+      <p:sp>
+        <p:nvSpPr>
+          <p:cNvPr id="9" name="TextBox 8"/>
+          <p:cNvSpPr txBox="1"/>
+          <p:nvPr/>
+        </p:nvSpPr>
+        <p:spPr>
+          <a:xfrm>
+            <a:off x="737969" y="1444545"/>
+            <a:ext cx="10914507" cy="4832092"/>
+          </a:xfrm>
+          <a:prstGeom prst="rect">
+            <a:avLst/>
+          </a:prstGeom>
+          <a:noFill/>
+        </p:spPr>
+        <p:txBody>
+          <a:bodyPr wrap="square" rtlCol="0">
+            <a:spAutoFit/>
+          </a:bodyPr>
+          <a:lstStyle/>
+          <a:p>
+            <a:pPr algn="l"/>
+            <a:r>
+              <a:rPr lang="en-US" sz="2800" dirty="0">
+                <a:latin typeface="PFDinTextCompPro-Italic"/>
+                <a:cs typeface="PFDinTextCompPro-Italic"/>
+              </a:rPr>
+              <a:t>Q: How do we derive coefficients using maximum likelihood?</a:t>
+            </a:r>
+          </a:p>
+          <a:p>
+            <a:pPr algn="l"/>
+            <a:r>
+              <a:rPr lang="en-US" sz="2800" dirty="0">
+                <a:latin typeface="PFDinTextCompPro-Italic"/>
+                <a:cs typeface="PFDinTextCompPro-Italic"/>
+              </a:rPr>
+              <a:t>A: We find the coefficients that are the most likely, given the observed data. Formally, we estimate the coefficients that maximize the likelihood function. This is done using an iterative procedure.</a:t>
+            </a:r>
+          </a:p>
+          <a:p>
+            <a:pPr algn="l"/>
+            <a:endParaRPr lang="en-US" sz="2800" dirty="0">
+              <a:latin typeface="PFDinTextCompPro-Italic"/>
+              <a:cs typeface="PFDinTextCompPro-Italic"/>
+            </a:endParaRPr>
+          </a:p>
+          <a:p>
+            <a:pPr algn="l"/>
+            <a:endParaRPr lang="en-US" sz="2800" dirty="0">
+              <a:latin typeface="PFDinTextCompPro-Italic"/>
+              <a:cs typeface="PFDinTextCompPro-Italic"/>
+            </a:endParaRPr>
+          </a:p>
+          <a:p>
+            <a:pPr algn="l"/>
+            <a:endParaRPr lang="en-US" sz="2800" dirty="0">
+              <a:latin typeface="PFDinTextCompPro-Italic"/>
+              <a:cs typeface="PFDinTextCompPro-Italic"/>
+            </a:endParaRPr>
+          </a:p>
+          <a:p>
+            <a:pPr algn="l"/>
+            <a:endParaRPr lang="en-US" sz="2800" dirty="0">
+              <a:latin typeface="PFDinTextCompPro-Italic"/>
+              <a:cs typeface="PFDinTextCompPro-Italic"/>
+            </a:endParaRPr>
+          </a:p>
+          <a:p>
+            <a:pPr algn="l"/>
+            <a:endParaRPr lang="en-US" sz="2800" dirty="0">
+              <a:latin typeface="PFDinTextCompPro-Italic"/>
+              <a:cs typeface="PFDinTextCompPro-Italic"/>
+            </a:endParaRPr>
+          </a:p>
+          <a:p>
+            <a:r>
+              <a:rPr lang="en-US" sz="2800" dirty="0">
+                <a:latin typeface="PFDinTextCompPro-Italic"/>
+                <a:cs typeface="PFDinTextCompPro-Italic"/>
+              </a:rPr>
+              <a:t>Check out </a:t>
+            </a:r>
+            <a:r>
+              <a:rPr lang="en-US" sz="2800" dirty="0">
+                <a:latin typeface="PFDinTextCompPro-Italic"/>
+                <a:cs typeface="PFDinTextCompPro-Italic"/>
+                <a:hlinkClick r:id="rId3"/>
+              </a:rPr>
+              <a:t>http://www.stat.cmu.edu/~cshalizi/uADA/12/lectures/ch12.pdf</a:t>
+            </a:r>
+            <a:r>
+              <a:rPr lang="en-US" sz="2800" dirty="0">
+                <a:latin typeface="PFDinTextCompPro-Italic"/>
+                <a:cs typeface="PFDinTextCompPro-Italic"/>
+              </a:rPr>
+              <a:t>  for details on the estimation of the coefficients.</a:t>
+            </a:r>
+          </a:p>
+        </p:txBody>
+      </p:sp>
+      <p:pic>
+        <p:nvPicPr>
+          <p:cNvPr id="50178" name="Picture 2"/>
+          <p:cNvPicPr>
+            <a:picLocks noChangeAspect="1" noChangeArrowheads="1"/>
+          </p:cNvPicPr>
+          <p:nvPr/>
+        </p:nvPicPr>
+        <p:blipFill rotWithShape="1">
+          <a:blip r:embed="rId4">
+            <a:extLst>
+              <a:ext uri="{28A0092B-C50C-407E-A947-70E740481C1C}">
+                <a14:useLocalDpi xmlns:a14="http://schemas.microsoft.com/office/drawing/2010/main" val="0"/>
+              </a:ext>
+            </a:extLst>
+          </a:blip>
+          <a:srcRect b="10952"/>
+          <a:stretch/>
+        </p:blipFill>
+        <p:spPr bwMode="auto">
+          <a:xfrm>
+            <a:off x="2292464" y="3388740"/>
+            <a:ext cx="6318136" cy="1456653"/>
+          </a:xfrm>
+          <a:prstGeom prst="rect">
+            <a:avLst/>
+          </a:prstGeom>
+          <a:noFill/>
+          <a:ln>
+            <a:noFill/>
+          </a:ln>
+          <a:extLst>
+            <a:ext uri="{909E8E84-426E-40DD-AFC4-6F175D3DCCD1}">
+              <a14:hiddenFill xmlns:a14="http://schemas.microsoft.com/office/drawing/2010/main">
+                <a:solidFill>
+                  <a:schemeClr val="accent1"/>
+                </a:solidFill>
+              </a14:hiddenFill>
+            </a:ext>
+            <a:ext uri="{91240B29-F687-4F45-9708-019B960494DF}">
+              <a14:hiddenLine xmlns:a14="http://schemas.microsoft.com/office/drawing/2010/main" w="9525">
+                <a:solidFill>
+                  <a:schemeClr val="tx1"/>
+                </a:solidFill>
+                <a:miter lim="800000"/>
+                <a:headEnd/>
+                <a:tailEnd/>
+              </a14:hiddenLine>
+            </a:ext>
+          </a:extLst>
+        </p:spPr>
+      </p:pic>
+      <p:cxnSp>
+        <p:nvCxnSpPr>
+          <p:cNvPr id="7" name="Straight Arrow Connector 6"/>
+          <p:cNvCxnSpPr>
+            <a:cxnSpLocks/>
+          </p:cNvCxnSpPr>
+          <p:nvPr/>
+        </p:nvCxnSpPr>
+        <p:spPr bwMode="auto">
+          <a:xfrm flipH="1" flipV="1">
+            <a:off x="5161020" y="4566795"/>
+            <a:ext cx="2379945" cy="406907"/>
+          </a:xfrm>
+          <a:prstGeom prst="straightConnector1">
+            <a:avLst/>
+          </a:prstGeom>
+          <a:solidFill>
+            <a:schemeClr val="accent1"/>
+          </a:solidFill>
+          <a:ln w="19050" cap="flat" cmpd="sng" algn="ctr">
+            <a:solidFill>
+              <a:srgbClr val="FF0000"/>
+            </a:solidFill>
+            <a:prstDash val="solid"/>
+            <a:round/>
+            <a:headEnd type="none" w="med" len="med"/>
+            <a:tailEnd type="triangle" w="med" len="med"/>
+          </a:ln>
+          <a:effectLst/>
+          <a:extLst>
+            <a:ext uri="{AF507438-7753-43E0-B8FC-AC1667EBCBE1}">
+              <a14:hiddenEffects xmlns:a14="http://schemas.microsoft.com/office/drawing/2010/main">
+                <a:effectLst>
+                  <a:outerShdw blurRad="63500" dist="38099" dir="2700000" algn="ctr" rotWithShape="0">
+                    <a:schemeClr val="bg2">
+                      <a:alpha val="74998"/>
+                    </a:schemeClr>
+                  </a:outerShdw>
+                </a:effectLst>
+              </a14:hiddenEffects>
+            </a:ext>
+          </a:extLst>
+        </p:spPr>
+      </p:cxnSp>
+      <p:sp>
+        <p:nvSpPr>
+          <p:cNvPr id="10" name="Rectangle 9"/>
+          <p:cNvSpPr/>
+          <p:nvPr/>
+        </p:nvSpPr>
+        <p:spPr>
+          <a:xfrm>
+            <a:off x="7794007" y="4419957"/>
+            <a:ext cx="4099143" cy="813813"/>
+          </a:xfrm>
+          <a:prstGeom prst="rect">
+            <a:avLst/>
+          </a:prstGeom>
+        </p:spPr>
+        <p:txBody>
+          <a:bodyPr wrap="square">
+            <a:spAutoFit/>
+          </a:bodyPr>
+          <a:lstStyle/>
+          <a:p>
+            <a:pPr algn="l"/>
+            <a:r>
+              <a:rPr lang="en-US" sz="2344" dirty="0">
+                <a:latin typeface="PF Din Text Comp Pro" panose="02000506020000020004" pitchFamily="2" charset="0"/>
+                <a:cs typeface="PFDinTextCompPro-Italic"/>
+              </a:rPr>
+              <a:t>Notation for the product of a series</a:t>
+            </a:r>
+          </a:p>
+        </p:txBody>
+      </p:sp>
+      <p:sp>
+        <p:nvSpPr>
+          <p:cNvPr id="11" name="Title 1">
+            <a:extLst>
+              <a:ext uri="{FF2B5EF4-FFF2-40B4-BE49-F238E27FC236}">
+                <a16:creationId xmlns:a16="http://schemas.microsoft.com/office/drawing/2014/main" id="{E3F3E771-3D29-8346-9BDE-16A464C4B683}"/>
+              </a:ext>
+            </a:extLst>
+          </p:cNvPr>
+          <p:cNvSpPr txBox="1">
+            <a:spLocks/>
+          </p:cNvSpPr>
+          <p:nvPr/>
+        </p:nvSpPr>
+        <p:spPr>
+          <a:xfrm>
+            <a:off x="838200" y="365125"/>
+            <a:ext cx="10515600" cy="1325563"/>
+          </a:xfrm>
+          <a:prstGeom prst="rect">
+            <a:avLst/>
+          </a:prstGeom>
+        </p:spPr>
+        <p:txBody>
+          <a:bodyPr vert="horz" lIns="0" tIns="32914" rIns="65828" bIns="32914" rtlCol="0" anchor="ctr">
+            <a:normAutofit/>
+          </a:bodyPr>
+          <a:lstStyle>
+            <a:lvl1pPr algn="l" defTabSz="914400" rtl="0" eaLnBrk="1" latinLnBrk="0" hangingPunct="1">
+              <a:lnSpc>
+                <a:spcPts val="4686"/>
+              </a:lnSpc>
+              <a:spcBef>
+                <a:spcPct val="0"/>
+              </a:spcBef>
+              <a:buNone/>
+              <a:defRPr sz="5078" b="1" kern="1200" cap="all" baseline="0">
+                <a:solidFill>
+                  <a:schemeClr val="tx1"/>
+                </a:solidFill>
+                <a:latin typeface="+mj-lt"/>
+                <a:ea typeface="+mj-ea"/>
+                <a:cs typeface="+mj-cs"/>
+              </a:defRPr>
+            </a:lvl1pPr>
+          </a:lstStyle>
+          <a:p>
+            <a:r>
+              <a:rPr lang="en-US" sz="4000" b="0" cap="none" dirty="0"/>
+              <a:t>Predicting default: review</a:t>
+            </a:r>
+          </a:p>
+        </p:txBody>
+      </p:sp>
+    </p:spTree>
+    <p:extLst>
+      <p:ext uri="{BB962C8B-B14F-4D97-AF65-F5344CB8AC3E}">
+        <p14:creationId xmlns:p14="http://schemas.microsoft.com/office/powerpoint/2010/main" val="3089980706"/>
       </p:ext>
     </p:extLst>
   </p:cSld>

</xml_diff>